<commit_message>
Plan de présentation diapo
</commit_message>
<xml_diff>
--- a/LIVRABLE-4/Présentation livrable 4.pptx
+++ b/LIVRABLE-4/Présentation livrable 4.pptx
@@ -5,14 +5,35 @@
     <p:sldMasterId id="2147483687" r:id="rId1"/>
   </p:sldMasterIdLst>
   <p:notesMasterIdLst>
-    <p:notesMasterId r:id="rId7"/>
+    <p:notesMasterId r:id="rId28"/>
   </p:notesMasterIdLst>
   <p:sldIdLst>
     <p:sldId id="256" r:id="rId2"/>
     <p:sldId id="257" r:id="rId3"/>
     <p:sldId id="272" r:id="rId4"/>
-    <p:sldId id="273" r:id="rId5"/>
-    <p:sldId id="274" r:id="rId6"/>
+    <p:sldId id="275" r:id="rId5"/>
+    <p:sldId id="277" r:id="rId6"/>
+    <p:sldId id="273" r:id="rId7"/>
+    <p:sldId id="274" r:id="rId8"/>
+    <p:sldId id="276" r:id="rId9"/>
+    <p:sldId id="278" r:id="rId10"/>
+    <p:sldId id="280" r:id="rId11"/>
+    <p:sldId id="279" r:id="rId12"/>
+    <p:sldId id="281" r:id="rId13"/>
+    <p:sldId id="282" r:id="rId14"/>
+    <p:sldId id="283" r:id="rId15"/>
+    <p:sldId id="284" r:id="rId16"/>
+    <p:sldId id="285" r:id="rId17"/>
+    <p:sldId id="286" r:id="rId18"/>
+    <p:sldId id="287" r:id="rId19"/>
+    <p:sldId id="288" r:id="rId20"/>
+    <p:sldId id="290" r:id="rId21"/>
+    <p:sldId id="291" r:id="rId22"/>
+    <p:sldId id="289" r:id="rId23"/>
+    <p:sldId id="292" r:id="rId24"/>
+    <p:sldId id="293" r:id="rId25"/>
+    <p:sldId id="294" r:id="rId26"/>
+    <p:sldId id="295" r:id="rId27"/>
   </p:sldIdLst>
   <p:sldSz cx="12192000" cy="6858000"/>
   <p:notesSz cx="6858000" cy="9144000"/>
@@ -6837,6 +6858,824 @@
 </p:sld>
 </file>
 
+<file path=ppt/slides/slide10.xml><?xml version="1.0" encoding="utf-8"?>
+<p:sld xmlns:a="http://schemas.openxmlformats.org/drawingml/2006/main" xmlns:r="http://schemas.openxmlformats.org/officeDocument/2006/relationships" xmlns:p="http://schemas.openxmlformats.org/presentationml/2006/main">
+  <p:cSld>
+    <p:spTree>
+      <p:nvGrpSpPr>
+        <p:cNvPr id="1" name=""/>
+        <p:cNvGrpSpPr/>
+        <p:nvPr/>
+      </p:nvGrpSpPr>
+      <p:grpSpPr>
+        <a:xfrm>
+          <a:off x="0" y="0"/>
+          <a:ext cx="0" cy="0"/>
+          <a:chOff x="0" y="0"/>
+          <a:chExt cx="0" cy="0"/>
+        </a:xfrm>
+      </p:grpSpPr>
+      <p:sp>
+        <p:nvSpPr>
+          <p:cNvPr id="2" name="Titre 1">
+            <a:extLst>
+              <a:ext uri="{FF2B5EF4-FFF2-40B4-BE49-F238E27FC236}">
+                <a16:creationId xmlns:a16="http://schemas.microsoft.com/office/drawing/2014/main" id="{A1DD71D5-2663-B041-9836-791DD68948AB}"/>
+              </a:ext>
+            </a:extLst>
+          </p:cNvPr>
+          <p:cNvSpPr>
+            <a:spLocks noGrp="1"/>
+          </p:cNvSpPr>
+          <p:nvPr>
+            <p:ph type="title"/>
+          </p:nvPr>
+        </p:nvSpPr>
+        <p:spPr>
+          <a:xfrm>
+            <a:off x="1086643" y="236220"/>
+            <a:ext cx="10018713" cy="1752599"/>
+          </a:xfrm>
+        </p:spPr>
+        <p:txBody>
+          <a:bodyPr>
+            <a:normAutofit/>
+          </a:bodyPr>
+          <a:lstStyle/>
+          <a:p>
+            <a:r>
+              <a:rPr lang="fr-FR" sz="5400" b="1" dirty="0"/>
+              <a:t>Technique</a:t>
+            </a:r>
+          </a:p>
+        </p:txBody>
+      </p:sp>
+    </p:spTree>
+    <p:extLst>
+      <p:ext uri="{BB962C8B-B14F-4D97-AF65-F5344CB8AC3E}">
+        <p14:creationId xmlns:p14="http://schemas.microsoft.com/office/powerpoint/2010/main" val="155951835"/>
+      </p:ext>
+    </p:extLst>
+  </p:cSld>
+  <p:clrMapOvr>
+    <a:masterClrMapping/>
+  </p:clrMapOvr>
+</p:sld>
+</file>
+
+<file path=ppt/slides/slide11.xml><?xml version="1.0" encoding="utf-8"?>
+<p:sld xmlns:a="http://schemas.openxmlformats.org/drawingml/2006/main" xmlns:r="http://schemas.openxmlformats.org/officeDocument/2006/relationships" xmlns:p="http://schemas.openxmlformats.org/presentationml/2006/main">
+  <p:cSld>
+    <p:spTree>
+      <p:nvGrpSpPr>
+        <p:cNvPr id="1" name=""/>
+        <p:cNvGrpSpPr/>
+        <p:nvPr/>
+      </p:nvGrpSpPr>
+      <p:grpSpPr>
+        <a:xfrm>
+          <a:off x="0" y="0"/>
+          <a:ext cx="0" cy="0"/>
+          <a:chOff x="0" y="0"/>
+          <a:chExt cx="0" cy="0"/>
+        </a:xfrm>
+      </p:grpSpPr>
+      <p:sp>
+        <p:nvSpPr>
+          <p:cNvPr id="2" name="Titre 1">
+            <a:extLst>
+              <a:ext uri="{FF2B5EF4-FFF2-40B4-BE49-F238E27FC236}">
+                <a16:creationId xmlns:a16="http://schemas.microsoft.com/office/drawing/2014/main" id="{C2F60A29-4E64-4EAA-A409-B78ACC7960C2}"/>
+              </a:ext>
+            </a:extLst>
+          </p:cNvPr>
+          <p:cNvSpPr>
+            <a:spLocks noGrp="1"/>
+          </p:cNvSpPr>
+          <p:nvPr>
+            <p:ph type="title"/>
+          </p:nvPr>
+        </p:nvSpPr>
+        <p:spPr/>
+        <p:txBody>
+          <a:bodyPr/>
+          <a:lstStyle/>
+          <a:p>
+            <a:r>
+              <a:rPr lang="fr-FR" dirty="0"/>
+              <a:t>Langage</a:t>
+            </a:r>
+          </a:p>
+        </p:txBody>
+      </p:sp>
+      <p:sp>
+        <p:nvSpPr>
+          <p:cNvPr id="3" name="Espace réservé du contenu 2">
+            <a:extLst>
+              <a:ext uri="{FF2B5EF4-FFF2-40B4-BE49-F238E27FC236}">
+                <a16:creationId xmlns:a16="http://schemas.microsoft.com/office/drawing/2014/main" id="{3A00E401-CAE3-45CA-8D65-438B44E28491}"/>
+              </a:ext>
+            </a:extLst>
+          </p:cNvPr>
+          <p:cNvSpPr>
+            <a:spLocks noGrp="1"/>
+          </p:cNvSpPr>
+          <p:nvPr>
+            <p:ph idx="1"/>
+          </p:nvPr>
+        </p:nvSpPr>
+        <p:spPr/>
+        <p:txBody>
+          <a:bodyPr/>
+          <a:lstStyle/>
+          <a:p>
+            <a:r>
+              <a:rPr lang="fr-FR" dirty="0"/>
+              <a:t>Allan</a:t>
+            </a:r>
+          </a:p>
+        </p:txBody>
+      </p:sp>
+    </p:spTree>
+    <p:extLst>
+      <p:ext uri="{BB962C8B-B14F-4D97-AF65-F5344CB8AC3E}">
+        <p14:creationId xmlns:p14="http://schemas.microsoft.com/office/powerpoint/2010/main" val="1628331343"/>
+      </p:ext>
+    </p:extLst>
+  </p:cSld>
+  <p:clrMapOvr>
+    <a:masterClrMapping/>
+  </p:clrMapOvr>
+</p:sld>
+</file>
+
+<file path=ppt/slides/slide12.xml><?xml version="1.0" encoding="utf-8"?>
+<p:sld xmlns:a="http://schemas.openxmlformats.org/drawingml/2006/main" xmlns:r="http://schemas.openxmlformats.org/officeDocument/2006/relationships" xmlns:p="http://schemas.openxmlformats.org/presentationml/2006/main">
+  <p:cSld>
+    <p:spTree>
+      <p:nvGrpSpPr>
+        <p:cNvPr id="1" name=""/>
+        <p:cNvGrpSpPr/>
+        <p:nvPr/>
+      </p:nvGrpSpPr>
+      <p:grpSpPr>
+        <a:xfrm>
+          <a:off x="0" y="0"/>
+          <a:ext cx="0" cy="0"/>
+          <a:chOff x="0" y="0"/>
+          <a:chExt cx="0" cy="0"/>
+        </a:xfrm>
+      </p:grpSpPr>
+      <p:sp>
+        <p:nvSpPr>
+          <p:cNvPr id="2" name="Titre 1">
+            <a:extLst>
+              <a:ext uri="{FF2B5EF4-FFF2-40B4-BE49-F238E27FC236}">
+                <a16:creationId xmlns:a16="http://schemas.microsoft.com/office/drawing/2014/main" id="{C6FF438A-F415-4ACE-B03B-4E3E1C1FB923}"/>
+              </a:ext>
+            </a:extLst>
+          </p:cNvPr>
+          <p:cNvSpPr>
+            <a:spLocks noGrp="1"/>
+          </p:cNvSpPr>
+          <p:nvPr>
+            <p:ph type="title"/>
+          </p:nvPr>
+        </p:nvSpPr>
+        <p:spPr/>
+        <p:txBody>
+          <a:bodyPr/>
+          <a:lstStyle/>
+          <a:p>
+            <a:r>
+              <a:rPr lang="fr-FR" dirty="0"/>
+              <a:t>Outils</a:t>
+            </a:r>
+          </a:p>
+        </p:txBody>
+      </p:sp>
+      <p:sp>
+        <p:nvSpPr>
+          <p:cNvPr id="3" name="Espace réservé du contenu 2">
+            <a:extLst>
+              <a:ext uri="{FF2B5EF4-FFF2-40B4-BE49-F238E27FC236}">
+                <a16:creationId xmlns:a16="http://schemas.microsoft.com/office/drawing/2014/main" id="{14B5F129-37B9-477C-BD40-2906CC3E93F7}"/>
+              </a:ext>
+            </a:extLst>
+          </p:cNvPr>
+          <p:cNvSpPr>
+            <a:spLocks noGrp="1"/>
+          </p:cNvSpPr>
+          <p:nvPr>
+            <p:ph idx="1"/>
+          </p:nvPr>
+        </p:nvSpPr>
+        <p:spPr/>
+        <p:txBody>
+          <a:bodyPr/>
+          <a:lstStyle/>
+          <a:p>
+            <a:r>
+              <a:rPr lang="fr-FR" dirty="0"/>
+              <a:t>Allan</a:t>
+            </a:r>
+          </a:p>
+        </p:txBody>
+      </p:sp>
+    </p:spTree>
+    <p:extLst>
+      <p:ext uri="{BB962C8B-B14F-4D97-AF65-F5344CB8AC3E}">
+        <p14:creationId xmlns:p14="http://schemas.microsoft.com/office/powerpoint/2010/main" val="696368023"/>
+      </p:ext>
+    </p:extLst>
+  </p:cSld>
+  <p:clrMapOvr>
+    <a:masterClrMapping/>
+  </p:clrMapOvr>
+</p:sld>
+</file>
+
+<file path=ppt/slides/slide13.xml><?xml version="1.0" encoding="utf-8"?>
+<p:sld xmlns:a="http://schemas.openxmlformats.org/drawingml/2006/main" xmlns:r="http://schemas.openxmlformats.org/officeDocument/2006/relationships" xmlns:p="http://schemas.openxmlformats.org/presentationml/2006/main">
+  <p:cSld>
+    <p:spTree>
+      <p:nvGrpSpPr>
+        <p:cNvPr id="1" name=""/>
+        <p:cNvGrpSpPr/>
+        <p:nvPr/>
+      </p:nvGrpSpPr>
+      <p:grpSpPr>
+        <a:xfrm>
+          <a:off x="0" y="0"/>
+          <a:ext cx="0" cy="0"/>
+          <a:chOff x="0" y="0"/>
+          <a:chExt cx="0" cy="0"/>
+        </a:xfrm>
+      </p:grpSpPr>
+      <p:sp>
+        <p:nvSpPr>
+          <p:cNvPr id="2" name="Titre 1">
+            <a:extLst>
+              <a:ext uri="{FF2B5EF4-FFF2-40B4-BE49-F238E27FC236}">
+                <a16:creationId xmlns:a16="http://schemas.microsoft.com/office/drawing/2014/main" id="{6C4477FA-CD64-4473-9CCC-2312506BBD7B}"/>
+              </a:ext>
+            </a:extLst>
+          </p:cNvPr>
+          <p:cNvSpPr>
+            <a:spLocks noGrp="1"/>
+          </p:cNvSpPr>
+          <p:nvPr>
+            <p:ph type="title"/>
+          </p:nvPr>
+        </p:nvSpPr>
+        <p:spPr/>
+        <p:txBody>
+          <a:bodyPr/>
+          <a:lstStyle/>
+          <a:p>
+            <a:r>
+              <a:rPr lang="fr-FR" dirty="0"/>
+              <a:t>Architecture</a:t>
+            </a:r>
+          </a:p>
+        </p:txBody>
+      </p:sp>
+      <p:sp>
+        <p:nvSpPr>
+          <p:cNvPr id="3" name="Espace réservé du contenu 2">
+            <a:extLst>
+              <a:ext uri="{FF2B5EF4-FFF2-40B4-BE49-F238E27FC236}">
+                <a16:creationId xmlns:a16="http://schemas.microsoft.com/office/drawing/2014/main" id="{EDED6002-3EB0-4AB7-9077-FB9646AC3294}"/>
+              </a:ext>
+            </a:extLst>
+          </p:cNvPr>
+          <p:cNvSpPr>
+            <a:spLocks noGrp="1"/>
+          </p:cNvSpPr>
+          <p:nvPr>
+            <p:ph idx="1"/>
+          </p:nvPr>
+        </p:nvSpPr>
+        <p:spPr/>
+        <p:txBody>
+          <a:bodyPr/>
+          <a:lstStyle/>
+          <a:p>
+            <a:r>
+              <a:rPr lang="fr-FR" dirty="0"/>
+              <a:t>Allan</a:t>
+            </a:r>
+          </a:p>
+        </p:txBody>
+      </p:sp>
+    </p:spTree>
+    <p:extLst>
+      <p:ext uri="{BB962C8B-B14F-4D97-AF65-F5344CB8AC3E}">
+        <p14:creationId xmlns:p14="http://schemas.microsoft.com/office/powerpoint/2010/main" val="2509229958"/>
+      </p:ext>
+    </p:extLst>
+  </p:cSld>
+  <p:clrMapOvr>
+    <a:masterClrMapping/>
+  </p:clrMapOvr>
+</p:sld>
+</file>
+
+<file path=ppt/slides/slide14.xml><?xml version="1.0" encoding="utf-8"?>
+<p:sld xmlns:a="http://schemas.openxmlformats.org/drawingml/2006/main" xmlns:r="http://schemas.openxmlformats.org/officeDocument/2006/relationships" xmlns:p="http://schemas.openxmlformats.org/presentationml/2006/main">
+  <p:cSld>
+    <p:spTree>
+      <p:nvGrpSpPr>
+        <p:cNvPr id="1" name=""/>
+        <p:cNvGrpSpPr/>
+        <p:nvPr/>
+      </p:nvGrpSpPr>
+      <p:grpSpPr>
+        <a:xfrm>
+          <a:off x="0" y="0"/>
+          <a:ext cx="0" cy="0"/>
+          <a:chOff x="0" y="0"/>
+          <a:chExt cx="0" cy="0"/>
+        </a:xfrm>
+      </p:grpSpPr>
+      <p:sp>
+        <p:nvSpPr>
+          <p:cNvPr id="2" name="Titre 1">
+            <a:extLst>
+              <a:ext uri="{FF2B5EF4-FFF2-40B4-BE49-F238E27FC236}">
+                <a16:creationId xmlns:a16="http://schemas.microsoft.com/office/drawing/2014/main" id="{8ABBF1C3-9DE8-4A87-AF53-D60821FD7C5E}"/>
+              </a:ext>
+            </a:extLst>
+          </p:cNvPr>
+          <p:cNvSpPr>
+            <a:spLocks noGrp="1"/>
+          </p:cNvSpPr>
+          <p:nvPr>
+            <p:ph type="title"/>
+          </p:nvPr>
+        </p:nvSpPr>
+        <p:spPr/>
+        <p:txBody>
+          <a:bodyPr/>
+          <a:lstStyle/>
+          <a:p>
+            <a:r>
+              <a:rPr lang="fr-FR" dirty="0"/>
+              <a:t>UML</a:t>
+            </a:r>
+          </a:p>
+        </p:txBody>
+      </p:sp>
+      <p:sp>
+        <p:nvSpPr>
+          <p:cNvPr id="3" name="Espace réservé du contenu 2">
+            <a:extLst>
+              <a:ext uri="{FF2B5EF4-FFF2-40B4-BE49-F238E27FC236}">
+                <a16:creationId xmlns:a16="http://schemas.microsoft.com/office/drawing/2014/main" id="{52DE8C0A-9A29-4899-8C9F-0EF3B6952449}"/>
+              </a:ext>
+            </a:extLst>
+          </p:cNvPr>
+          <p:cNvSpPr>
+            <a:spLocks noGrp="1"/>
+          </p:cNvSpPr>
+          <p:nvPr>
+            <p:ph idx="1"/>
+          </p:nvPr>
+        </p:nvSpPr>
+        <p:spPr/>
+        <p:txBody>
+          <a:bodyPr/>
+          <a:lstStyle/>
+          <a:p>
+            <a:r>
+              <a:rPr lang="fr-FR" dirty="0"/>
+              <a:t>Ulrich</a:t>
+            </a:r>
+          </a:p>
+        </p:txBody>
+      </p:sp>
+    </p:spTree>
+    <p:extLst>
+      <p:ext uri="{BB962C8B-B14F-4D97-AF65-F5344CB8AC3E}">
+        <p14:creationId xmlns:p14="http://schemas.microsoft.com/office/powerpoint/2010/main" val="3539923233"/>
+      </p:ext>
+    </p:extLst>
+  </p:cSld>
+  <p:clrMapOvr>
+    <a:masterClrMapping/>
+  </p:clrMapOvr>
+</p:sld>
+</file>
+
+<file path=ppt/slides/slide15.xml><?xml version="1.0" encoding="utf-8"?>
+<p:sld xmlns:a="http://schemas.openxmlformats.org/drawingml/2006/main" xmlns:r="http://schemas.openxmlformats.org/officeDocument/2006/relationships" xmlns:p="http://schemas.openxmlformats.org/presentationml/2006/main">
+  <p:cSld>
+    <p:spTree>
+      <p:nvGrpSpPr>
+        <p:cNvPr id="1" name=""/>
+        <p:cNvGrpSpPr/>
+        <p:nvPr/>
+      </p:nvGrpSpPr>
+      <p:grpSpPr>
+        <a:xfrm>
+          <a:off x="0" y="0"/>
+          <a:ext cx="0" cy="0"/>
+          <a:chOff x="0" y="0"/>
+          <a:chExt cx="0" cy="0"/>
+        </a:xfrm>
+      </p:grpSpPr>
+      <p:sp>
+        <p:nvSpPr>
+          <p:cNvPr id="2" name="Titre 1">
+            <a:extLst>
+              <a:ext uri="{FF2B5EF4-FFF2-40B4-BE49-F238E27FC236}">
+                <a16:creationId xmlns:a16="http://schemas.microsoft.com/office/drawing/2014/main" id="{93070180-E849-4CF5-A162-E86D881201EF}"/>
+              </a:ext>
+            </a:extLst>
+          </p:cNvPr>
+          <p:cNvSpPr>
+            <a:spLocks noGrp="1"/>
+          </p:cNvSpPr>
+          <p:nvPr>
+            <p:ph type="title"/>
+          </p:nvPr>
+        </p:nvSpPr>
+        <p:spPr/>
+        <p:txBody>
+          <a:bodyPr/>
+          <a:lstStyle/>
+          <a:p>
+            <a:r>
+              <a:rPr lang="fr-FR" dirty="0"/>
+              <a:t>MCD</a:t>
+            </a:r>
+          </a:p>
+        </p:txBody>
+      </p:sp>
+      <p:sp>
+        <p:nvSpPr>
+          <p:cNvPr id="3" name="Espace réservé du contenu 2">
+            <a:extLst>
+              <a:ext uri="{FF2B5EF4-FFF2-40B4-BE49-F238E27FC236}">
+                <a16:creationId xmlns:a16="http://schemas.microsoft.com/office/drawing/2014/main" id="{BBA321E4-D855-4AE1-B334-FBDCFEA00B5F}"/>
+              </a:ext>
+            </a:extLst>
+          </p:cNvPr>
+          <p:cNvSpPr>
+            <a:spLocks noGrp="1"/>
+          </p:cNvSpPr>
+          <p:nvPr>
+            <p:ph idx="1"/>
+          </p:nvPr>
+        </p:nvSpPr>
+        <p:spPr/>
+        <p:txBody>
+          <a:bodyPr/>
+          <a:lstStyle/>
+          <a:p>
+            <a:r>
+              <a:rPr lang="fr-FR" dirty="0"/>
+              <a:t>Romain</a:t>
+            </a:r>
+          </a:p>
+        </p:txBody>
+      </p:sp>
+    </p:spTree>
+    <p:extLst>
+      <p:ext uri="{BB962C8B-B14F-4D97-AF65-F5344CB8AC3E}">
+        <p14:creationId xmlns:p14="http://schemas.microsoft.com/office/powerpoint/2010/main" val="806132848"/>
+      </p:ext>
+    </p:extLst>
+  </p:cSld>
+  <p:clrMapOvr>
+    <a:masterClrMapping/>
+  </p:clrMapOvr>
+</p:sld>
+</file>
+
+<file path=ppt/slides/slide16.xml><?xml version="1.0" encoding="utf-8"?>
+<p:sld xmlns:a="http://schemas.openxmlformats.org/drawingml/2006/main" xmlns:r="http://schemas.openxmlformats.org/officeDocument/2006/relationships" xmlns:p="http://schemas.openxmlformats.org/presentationml/2006/main">
+  <p:cSld>
+    <p:spTree>
+      <p:nvGrpSpPr>
+        <p:cNvPr id="1" name=""/>
+        <p:cNvGrpSpPr/>
+        <p:nvPr/>
+      </p:nvGrpSpPr>
+      <p:grpSpPr>
+        <a:xfrm>
+          <a:off x="0" y="0"/>
+          <a:ext cx="0" cy="0"/>
+          <a:chOff x="0" y="0"/>
+          <a:chExt cx="0" cy="0"/>
+        </a:xfrm>
+      </p:grpSpPr>
+      <p:sp>
+        <p:nvSpPr>
+          <p:cNvPr id="2" name="Titre 1">
+            <a:extLst>
+              <a:ext uri="{FF2B5EF4-FFF2-40B4-BE49-F238E27FC236}">
+                <a16:creationId xmlns:a16="http://schemas.microsoft.com/office/drawing/2014/main" id="{14D82790-1415-4BBA-8DB6-5B16D6043AD1}"/>
+              </a:ext>
+            </a:extLst>
+          </p:cNvPr>
+          <p:cNvSpPr>
+            <a:spLocks noGrp="1"/>
+          </p:cNvSpPr>
+          <p:nvPr>
+            <p:ph type="title"/>
+          </p:nvPr>
+        </p:nvSpPr>
+        <p:spPr/>
+        <p:txBody>
+          <a:bodyPr/>
+          <a:lstStyle/>
+          <a:p>
+            <a:r>
+              <a:rPr lang="fr-FR" dirty="0"/>
+              <a:t>Déploiement</a:t>
+            </a:r>
+          </a:p>
+        </p:txBody>
+      </p:sp>
+      <p:sp>
+        <p:nvSpPr>
+          <p:cNvPr id="3" name="Espace réservé du contenu 2">
+            <a:extLst>
+              <a:ext uri="{FF2B5EF4-FFF2-40B4-BE49-F238E27FC236}">
+                <a16:creationId xmlns:a16="http://schemas.microsoft.com/office/drawing/2014/main" id="{D56D2AA2-5E45-4EB7-BA0E-428AAFF10052}"/>
+              </a:ext>
+            </a:extLst>
+          </p:cNvPr>
+          <p:cNvSpPr>
+            <a:spLocks noGrp="1"/>
+          </p:cNvSpPr>
+          <p:nvPr>
+            <p:ph idx="1"/>
+          </p:nvPr>
+        </p:nvSpPr>
+        <p:spPr/>
+        <p:txBody>
+          <a:bodyPr/>
+          <a:lstStyle/>
+          <a:p>
+            <a:r>
+              <a:rPr lang="fr-FR" dirty="0"/>
+              <a:t>Allan</a:t>
+            </a:r>
+          </a:p>
+        </p:txBody>
+      </p:sp>
+    </p:spTree>
+    <p:extLst>
+      <p:ext uri="{BB962C8B-B14F-4D97-AF65-F5344CB8AC3E}">
+        <p14:creationId xmlns:p14="http://schemas.microsoft.com/office/powerpoint/2010/main" val="2879687095"/>
+      </p:ext>
+    </p:extLst>
+  </p:cSld>
+  <p:clrMapOvr>
+    <a:masterClrMapping/>
+  </p:clrMapOvr>
+</p:sld>
+</file>
+
+<file path=ppt/slides/slide17.xml><?xml version="1.0" encoding="utf-8"?>
+<p:sld xmlns:a="http://schemas.openxmlformats.org/drawingml/2006/main" xmlns:r="http://schemas.openxmlformats.org/officeDocument/2006/relationships" xmlns:p="http://schemas.openxmlformats.org/presentationml/2006/main">
+  <p:cSld>
+    <p:spTree>
+      <p:nvGrpSpPr>
+        <p:cNvPr id="1" name=""/>
+        <p:cNvGrpSpPr/>
+        <p:nvPr/>
+      </p:nvGrpSpPr>
+      <p:grpSpPr>
+        <a:xfrm>
+          <a:off x="0" y="0"/>
+          <a:ext cx="0" cy="0"/>
+          <a:chOff x="0" y="0"/>
+          <a:chExt cx="0" cy="0"/>
+        </a:xfrm>
+      </p:grpSpPr>
+      <p:sp>
+        <p:nvSpPr>
+          <p:cNvPr id="2" name="Titre 1">
+            <a:extLst>
+              <a:ext uri="{FF2B5EF4-FFF2-40B4-BE49-F238E27FC236}">
+                <a16:creationId xmlns:a16="http://schemas.microsoft.com/office/drawing/2014/main" id="{A1DD71D5-2663-B041-9836-791DD68948AB}"/>
+              </a:ext>
+            </a:extLst>
+          </p:cNvPr>
+          <p:cNvSpPr>
+            <a:spLocks noGrp="1"/>
+          </p:cNvSpPr>
+          <p:nvPr>
+            <p:ph type="title"/>
+          </p:nvPr>
+        </p:nvSpPr>
+        <p:spPr>
+          <a:xfrm>
+            <a:off x="1086643" y="236220"/>
+            <a:ext cx="10018713" cy="1752599"/>
+          </a:xfrm>
+        </p:spPr>
+        <p:txBody>
+          <a:bodyPr>
+            <a:normAutofit/>
+          </a:bodyPr>
+          <a:lstStyle/>
+          <a:p>
+            <a:r>
+              <a:rPr lang="fr-FR" sz="5400" b="1" dirty="0"/>
+              <a:t>Maintenance</a:t>
+            </a:r>
+          </a:p>
+        </p:txBody>
+      </p:sp>
+    </p:spTree>
+    <p:extLst>
+      <p:ext uri="{BB962C8B-B14F-4D97-AF65-F5344CB8AC3E}">
+        <p14:creationId xmlns:p14="http://schemas.microsoft.com/office/powerpoint/2010/main" val="598889089"/>
+      </p:ext>
+    </p:extLst>
+  </p:cSld>
+  <p:clrMapOvr>
+    <a:masterClrMapping/>
+  </p:clrMapOvr>
+</p:sld>
+</file>
+
+<file path=ppt/slides/slide18.xml><?xml version="1.0" encoding="utf-8"?>
+<p:sld xmlns:a="http://schemas.openxmlformats.org/drawingml/2006/main" xmlns:r="http://schemas.openxmlformats.org/officeDocument/2006/relationships" xmlns:p="http://schemas.openxmlformats.org/presentationml/2006/main">
+  <p:cSld>
+    <p:spTree>
+      <p:nvGrpSpPr>
+        <p:cNvPr id="1" name=""/>
+        <p:cNvGrpSpPr/>
+        <p:nvPr/>
+      </p:nvGrpSpPr>
+      <p:grpSpPr>
+        <a:xfrm>
+          <a:off x="0" y="0"/>
+          <a:ext cx="0" cy="0"/>
+          <a:chOff x="0" y="0"/>
+          <a:chExt cx="0" cy="0"/>
+        </a:xfrm>
+      </p:grpSpPr>
+      <p:sp>
+        <p:nvSpPr>
+          <p:cNvPr id="2" name="Titre 1">
+            <a:extLst>
+              <a:ext uri="{FF2B5EF4-FFF2-40B4-BE49-F238E27FC236}">
+                <a16:creationId xmlns:a16="http://schemas.microsoft.com/office/drawing/2014/main" id="{14D82790-1415-4BBA-8DB6-5B16D6043AD1}"/>
+              </a:ext>
+            </a:extLst>
+          </p:cNvPr>
+          <p:cNvSpPr>
+            <a:spLocks noGrp="1"/>
+          </p:cNvSpPr>
+          <p:nvPr>
+            <p:ph type="title"/>
+          </p:nvPr>
+        </p:nvSpPr>
+        <p:spPr/>
+        <p:txBody>
+          <a:bodyPr/>
+          <a:lstStyle/>
+          <a:p>
+            <a:r>
+              <a:rPr lang="fr-FR" dirty="0"/>
+              <a:t>Support/Demande d'évolution</a:t>
+            </a:r>
+          </a:p>
+        </p:txBody>
+      </p:sp>
+      <p:sp>
+        <p:nvSpPr>
+          <p:cNvPr id="3" name="Espace réservé du contenu 2">
+            <a:extLst>
+              <a:ext uri="{FF2B5EF4-FFF2-40B4-BE49-F238E27FC236}">
+                <a16:creationId xmlns:a16="http://schemas.microsoft.com/office/drawing/2014/main" id="{D56D2AA2-5E45-4EB7-BA0E-428AAFF10052}"/>
+              </a:ext>
+            </a:extLst>
+          </p:cNvPr>
+          <p:cNvSpPr>
+            <a:spLocks noGrp="1"/>
+          </p:cNvSpPr>
+          <p:nvPr>
+            <p:ph idx="1"/>
+          </p:nvPr>
+        </p:nvSpPr>
+        <p:spPr/>
+        <p:txBody>
+          <a:bodyPr/>
+          <a:lstStyle/>
+          <a:p>
+            <a:r>
+              <a:rPr lang="fr-FR" dirty="0"/>
+              <a:t>Romain</a:t>
+            </a:r>
+          </a:p>
+        </p:txBody>
+      </p:sp>
+    </p:spTree>
+    <p:extLst>
+      <p:ext uri="{BB962C8B-B14F-4D97-AF65-F5344CB8AC3E}">
+        <p14:creationId xmlns:p14="http://schemas.microsoft.com/office/powerpoint/2010/main" val="300817343"/>
+      </p:ext>
+    </p:extLst>
+  </p:cSld>
+  <p:clrMapOvr>
+    <a:masterClrMapping/>
+  </p:clrMapOvr>
+</p:sld>
+</file>
+
+<file path=ppt/slides/slide19.xml><?xml version="1.0" encoding="utf-8"?>
+<p:sld xmlns:a="http://schemas.openxmlformats.org/drawingml/2006/main" xmlns:r="http://schemas.openxmlformats.org/officeDocument/2006/relationships" xmlns:p="http://schemas.openxmlformats.org/presentationml/2006/main">
+  <p:cSld>
+    <p:spTree>
+      <p:nvGrpSpPr>
+        <p:cNvPr id="1" name=""/>
+        <p:cNvGrpSpPr/>
+        <p:nvPr/>
+      </p:nvGrpSpPr>
+      <p:grpSpPr>
+        <a:xfrm>
+          <a:off x="0" y="0"/>
+          <a:ext cx="0" cy="0"/>
+          <a:chOff x="0" y="0"/>
+          <a:chExt cx="0" cy="0"/>
+        </a:xfrm>
+      </p:grpSpPr>
+      <p:sp>
+        <p:nvSpPr>
+          <p:cNvPr id="2" name="Titre 1">
+            <a:extLst>
+              <a:ext uri="{FF2B5EF4-FFF2-40B4-BE49-F238E27FC236}">
+                <a16:creationId xmlns:a16="http://schemas.microsoft.com/office/drawing/2014/main" id="{D639027B-149E-42D7-8474-5344A48396ED}"/>
+              </a:ext>
+            </a:extLst>
+          </p:cNvPr>
+          <p:cNvSpPr>
+            <a:spLocks noGrp="1"/>
+          </p:cNvSpPr>
+          <p:nvPr>
+            <p:ph type="title"/>
+          </p:nvPr>
+        </p:nvSpPr>
+        <p:spPr/>
+        <p:txBody>
+          <a:bodyPr/>
+          <a:lstStyle/>
+          <a:p>
+            <a:r>
+              <a:rPr lang="fr-FR" dirty="0"/>
+              <a:t>Formation</a:t>
+            </a:r>
+          </a:p>
+        </p:txBody>
+      </p:sp>
+      <p:sp>
+        <p:nvSpPr>
+          <p:cNvPr id="3" name="Espace réservé du contenu 2">
+            <a:extLst>
+              <a:ext uri="{FF2B5EF4-FFF2-40B4-BE49-F238E27FC236}">
+                <a16:creationId xmlns:a16="http://schemas.microsoft.com/office/drawing/2014/main" id="{A19867AC-A518-4A3B-980B-0851F728885D}"/>
+              </a:ext>
+            </a:extLst>
+          </p:cNvPr>
+          <p:cNvSpPr>
+            <a:spLocks noGrp="1"/>
+          </p:cNvSpPr>
+          <p:nvPr>
+            <p:ph idx="1"/>
+          </p:nvPr>
+        </p:nvSpPr>
+        <p:spPr/>
+        <p:txBody>
+          <a:bodyPr/>
+          <a:lstStyle/>
+          <a:p>
+            <a:r>
+              <a:rPr lang="fr-FR" dirty="0"/>
+              <a:t>Ulrich</a:t>
+            </a:r>
+          </a:p>
+        </p:txBody>
+      </p:sp>
+    </p:spTree>
+    <p:extLst>
+      <p:ext uri="{BB962C8B-B14F-4D97-AF65-F5344CB8AC3E}">
+        <p14:creationId xmlns:p14="http://schemas.microsoft.com/office/powerpoint/2010/main" val="2289876067"/>
+      </p:ext>
+    </p:extLst>
+  </p:cSld>
+  <p:clrMapOvr>
+    <a:masterClrMapping/>
+  </p:clrMapOvr>
+</p:sld>
+</file>
+
 <file path=ppt/slides/slide2.xml><?xml version="1.0" encoding="utf-8"?>
 <p:sld xmlns:a="http://schemas.openxmlformats.org/drawingml/2006/main" xmlns:r="http://schemas.openxmlformats.org/officeDocument/2006/relationships" xmlns:p="http://schemas.openxmlformats.org/presentationml/2006/main">
   <p:cSld>
@@ -6927,6 +7766,588 @@
   <p:transition spd="slow">
     <p:cover/>
   </p:transition>
+</p:sld>
+</file>
+
+<file path=ppt/slides/slide20.xml><?xml version="1.0" encoding="utf-8"?>
+<p:sld xmlns:a="http://schemas.openxmlformats.org/drawingml/2006/main" xmlns:r="http://schemas.openxmlformats.org/officeDocument/2006/relationships" xmlns:p="http://schemas.openxmlformats.org/presentationml/2006/main">
+  <p:cSld>
+    <p:spTree>
+      <p:nvGrpSpPr>
+        <p:cNvPr id="1" name=""/>
+        <p:cNvGrpSpPr/>
+        <p:nvPr/>
+      </p:nvGrpSpPr>
+      <p:grpSpPr>
+        <a:xfrm>
+          <a:off x="0" y="0"/>
+          <a:ext cx="0" cy="0"/>
+          <a:chOff x="0" y="0"/>
+          <a:chExt cx="0" cy="0"/>
+        </a:xfrm>
+      </p:grpSpPr>
+      <p:sp>
+        <p:nvSpPr>
+          <p:cNvPr id="2" name="Titre 1">
+            <a:extLst>
+              <a:ext uri="{FF2B5EF4-FFF2-40B4-BE49-F238E27FC236}">
+                <a16:creationId xmlns:a16="http://schemas.microsoft.com/office/drawing/2014/main" id="{A1DD71D5-2663-B041-9836-791DD68948AB}"/>
+              </a:ext>
+            </a:extLst>
+          </p:cNvPr>
+          <p:cNvSpPr>
+            <a:spLocks noGrp="1"/>
+          </p:cNvSpPr>
+          <p:nvPr>
+            <p:ph type="title"/>
+          </p:nvPr>
+        </p:nvSpPr>
+        <p:spPr>
+          <a:xfrm>
+            <a:off x="1086643" y="236220"/>
+            <a:ext cx="10018713" cy="1752599"/>
+          </a:xfrm>
+        </p:spPr>
+        <p:txBody>
+          <a:bodyPr>
+            <a:normAutofit/>
+          </a:bodyPr>
+          <a:lstStyle/>
+          <a:p>
+            <a:r>
+              <a:rPr lang="fr-FR" sz="5400" b="1" dirty="0"/>
+              <a:t>Clôture de projet</a:t>
+            </a:r>
+          </a:p>
+        </p:txBody>
+      </p:sp>
+    </p:spTree>
+    <p:extLst>
+      <p:ext uri="{BB962C8B-B14F-4D97-AF65-F5344CB8AC3E}">
+        <p14:creationId xmlns:p14="http://schemas.microsoft.com/office/powerpoint/2010/main" val="610667150"/>
+      </p:ext>
+    </p:extLst>
+  </p:cSld>
+  <p:clrMapOvr>
+    <a:masterClrMapping/>
+  </p:clrMapOvr>
+</p:sld>
+</file>
+
+<file path=ppt/slides/slide21.xml><?xml version="1.0" encoding="utf-8"?>
+<p:sld xmlns:a="http://schemas.openxmlformats.org/drawingml/2006/main" xmlns:r="http://schemas.openxmlformats.org/officeDocument/2006/relationships" xmlns:p="http://schemas.openxmlformats.org/presentationml/2006/main">
+  <p:cSld>
+    <p:spTree>
+      <p:nvGrpSpPr>
+        <p:cNvPr id="1" name=""/>
+        <p:cNvGrpSpPr/>
+        <p:nvPr/>
+      </p:nvGrpSpPr>
+      <p:grpSpPr>
+        <a:xfrm>
+          <a:off x="0" y="0"/>
+          <a:ext cx="0" cy="0"/>
+          <a:chOff x="0" y="0"/>
+          <a:chExt cx="0" cy="0"/>
+        </a:xfrm>
+      </p:grpSpPr>
+      <p:sp>
+        <p:nvSpPr>
+          <p:cNvPr id="2" name="Titre 1">
+            <a:extLst>
+              <a:ext uri="{FF2B5EF4-FFF2-40B4-BE49-F238E27FC236}">
+                <a16:creationId xmlns:a16="http://schemas.microsoft.com/office/drawing/2014/main" id="{EADADCE4-51D1-4185-916D-A3FF21A77835}"/>
+              </a:ext>
+            </a:extLst>
+          </p:cNvPr>
+          <p:cNvSpPr>
+            <a:spLocks noGrp="1"/>
+          </p:cNvSpPr>
+          <p:nvPr>
+            <p:ph type="title"/>
+          </p:nvPr>
+        </p:nvSpPr>
+        <p:spPr/>
+        <p:txBody>
+          <a:bodyPr/>
+          <a:lstStyle/>
+          <a:p>
+            <a:r>
+              <a:rPr lang="fr-FR" dirty="0"/>
+              <a:t>Planning Final</a:t>
+            </a:r>
+          </a:p>
+        </p:txBody>
+      </p:sp>
+      <p:sp>
+        <p:nvSpPr>
+          <p:cNvPr id="3" name="Espace réservé du contenu 2">
+            <a:extLst>
+              <a:ext uri="{FF2B5EF4-FFF2-40B4-BE49-F238E27FC236}">
+                <a16:creationId xmlns:a16="http://schemas.microsoft.com/office/drawing/2014/main" id="{A812E78B-25DC-4687-B46F-45D73BCF810D}"/>
+              </a:ext>
+            </a:extLst>
+          </p:cNvPr>
+          <p:cNvSpPr>
+            <a:spLocks noGrp="1"/>
+          </p:cNvSpPr>
+          <p:nvPr>
+            <p:ph idx="1"/>
+          </p:nvPr>
+        </p:nvSpPr>
+        <p:spPr/>
+        <p:txBody>
+          <a:bodyPr/>
+          <a:lstStyle/>
+          <a:p>
+            <a:r>
+              <a:rPr lang="fr-FR" dirty="0"/>
+              <a:t>Romain</a:t>
+            </a:r>
+          </a:p>
+        </p:txBody>
+      </p:sp>
+    </p:spTree>
+    <p:extLst>
+      <p:ext uri="{BB962C8B-B14F-4D97-AF65-F5344CB8AC3E}">
+        <p14:creationId xmlns:p14="http://schemas.microsoft.com/office/powerpoint/2010/main" val="64621286"/>
+      </p:ext>
+    </p:extLst>
+  </p:cSld>
+  <p:clrMapOvr>
+    <a:masterClrMapping/>
+  </p:clrMapOvr>
+</p:sld>
+</file>
+
+<file path=ppt/slides/slide22.xml><?xml version="1.0" encoding="utf-8"?>
+<p:sld xmlns:a="http://schemas.openxmlformats.org/drawingml/2006/main" xmlns:r="http://schemas.openxmlformats.org/officeDocument/2006/relationships" xmlns:p="http://schemas.openxmlformats.org/presentationml/2006/main">
+  <p:cSld>
+    <p:spTree>
+      <p:nvGrpSpPr>
+        <p:cNvPr id="1" name=""/>
+        <p:cNvGrpSpPr/>
+        <p:nvPr/>
+      </p:nvGrpSpPr>
+      <p:grpSpPr>
+        <a:xfrm>
+          <a:off x="0" y="0"/>
+          <a:ext cx="0" cy="0"/>
+          <a:chOff x="0" y="0"/>
+          <a:chExt cx="0" cy="0"/>
+        </a:xfrm>
+      </p:grpSpPr>
+      <p:sp>
+        <p:nvSpPr>
+          <p:cNvPr id="2" name="Titre 1">
+            <a:extLst>
+              <a:ext uri="{FF2B5EF4-FFF2-40B4-BE49-F238E27FC236}">
+                <a16:creationId xmlns:a16="http://schemas.microsoft.com/office/drawing/2014/main" id="{353942F7-D71A-49F2-8C04-7804B7F82C00}"/>
+              </a:ext>
+            </a:extLst>
+          </p:cNvPr>
+          <p:cNvSpPr>
+            <a:spLocks noGrp="1"/>
+          </p:cNvSpPr>
+          <p:nvPr>
+            <p:ph type="title"/>
+          </p:nvPr>
+        </p:nvSpPr>
+        <p:spPr/>
+        <p:txBody>
+          <a:bodyPr/>
+          <a:lstStyle/>
+          <a:p>
+            <a:r>
+              <a:rPr lang="fr-FR" dirty="0"/>
+              <a:t>Budget</a:t>
+            </a:r>
+          </a:p>
+        </p:txBody>
+      </p:sp>
+      <p:sp>
+        <p:nvSpPr>
+          <p:cNvPr id="3" name="Espace réservé du contenu 2">
+            <a:extLst>
+              <a:ext uri="{FF2B5EF4-FFF2-40B4-BE49-F238E27FC236}">
+                <a16:creationId xmlns:a16="http://schemas.microsoft.com/office/drawing/2014/main" id="{89318577-C2F8-4D99-A387-D5DDEE279A21}"/>
+              </a:ext>
+            </a:extLst>
+          </p:cNvPr>
+          <p:cNvSpPr>
+            <a:spLocks noGrp="1"/>
+          </p:cNvSpPr>
+          <p:nvPr>
+            <p:ph idx="1"/>
+          </p:nvPr>
+        </p:nvSpPr>
+        <p:spPr/>
+        <p:txBody>
+          <a:bodyPr/>
+          <a:lstStyle/>
+          <a:p>
+            <a:r>
+              <a:rPr lang="fr-FR" dirty="0"/>
+              <a:t>Ulrich A VOIR</a:t>
+            </a:r>
+          </a:p>
+        </p:txBody>
+      </p:sp>
+    </p:spTree>
+    <p:extLst>
+      <p:ext uri="{BB962C8B-B14F-4D97-AF65-F5344CB8AC3E}">
+        <p14:creationId xmlns:p14="http://schemas.microsoft.com/office/powerpoint/2010/main" val="2138315123"/>
+      </p:ext>
+    </p:extLst>
+  </p:cSld>
+  <p:clrMapOvr>
+    <a:masterClrMapping/>
+  </p:clrMapOvr>
+</p:sld>
+</file>
+
+<file path=ppt/slides/slide23.xml><?xml version="1.0" encoding="utf-8"?>
+<p:sld xmlns:a="http://schemas.openxmlformats.org/drawingml/2006/main" xmlns:r="http://schemas.openxmlformats.org/officeDocument/2006/relationships" xmlns:p="http://schemas.openxmlformats.org/presentationml/2006/main">
+  <p:cSld>
+    <p:spTree>
+      <p:nvGrpSpPr>
+        <p:cNvPr id="1" name=""/>
+        <p:cNvGrpSpPr/>
+        <p:nvPr/>
+      </p:nvGrpSpPr>
+      <p:grpSpPr>
+        <a:xfrm>
+          <a:off x="0" y="0"/>
+          <a:ext cx="0" cy="0"/>
+          <a:chOff x="0" y="0"/>
+          <a:chExt cx="0" cy="0"/>
+        </a:xfrm>
+      </p:grpSpPr>
+      <p:sp>
+        <p:nvSpPr>
+          <p:cNvPr id="2" name="Titre 1">
+            <a:extLst>
+              <a:ext uri="{FF2B5EF4-FFF2-40B4-BE49-F238E27FC236}">
+                <a16:creationId xmlns:a16="http://schemas.microsoft.com/office/drawing/2014/main" id="{18015CD5-9FED-4659-96EF-C5F5DA0912CB}"/>
+              </a:ext>
+            </a:extLst>
+          </p:cNvPr>
+          <p:cNvSpPr>
+            <a:spLocks noGrp="1"/>
+          </p:cNvSpPr>
+          <p:nvPr>
+            <p:ph type="title"/>
+          </p:nvPr>
+        </p:nvSpPr>
+        <p:spPr/>
+        <p:txBody>
+          <a:bodyPr/>
+          <a:lstStyle/>
+          <a:p>
+            <a:r>
+              <a:rPr lang="fr-FR" dirty="0"/>
+              <a:t>Indicateurs</a:t>
+            </a:r>
+          </a:p>
+        </p:txBody>
+      </p:sp>
+      <p:sp>
+        <p:nvSpPr>
+          <p:cNvPr id="3" name="Espace réservé du contenu 2">
+            <a:extLst>
+              <a:ext uri="{FF2B5EF4-FFF2-40B4-BE49-F238E27FC236}">
+                <a16:creationId xmlns:a16="http://schemas.microsoft.com/office/drawing/2014/main" id="{38B4C681-5FF3-4E57-B678-1163312F7F18}"/>
+              </a:ext>
+            </a:extLst>
+          </p:cNvPr>
+          <p:cNvSpPr>
+            <a:spLocks noGrp="1"/>
+          </p:cNvSpPr>
+          <p:nvPr>
+            <p:ph idx="1"/>
+          </p:nvPr>
+        </p:nvSpPr>
+        <p:spPr/>
+        <p:txBody>
+          <a:bodyPr/>
+          <a:lstStyle/>
+          <a:p>
+            <a:r>
+              <a:rPr lang="fr-FR" dirty="0"/>
+              <a:t>Romain</a:t>
+            </a:r>
+          </a:p>
+        </p:txBody>
+      </p:sp>
+    </p:spTree>
+    <p:extLst>
+      <p:ext uri="{BB962C8B-B14F-4D97-AF65-F5344CB8AC3E}">
+        <p14:creationId xmlns:p14="http://schemas.microsoft.com/office/powerpoint/2010/main" val="3767110654"/>
+      </p:ext>
+    </p:extLst>
+  </p:cSld>
+  <p:clrMapOvr>
+    <a:masterClrMapping/>
+  </p:clrMapOvr>
+</p:sld>
+</file>
+
+<file path=ppt/slides/slide24.xml><?xml version="1.0" encoding="utf-8"?>
+<p:sld xmlns:a="http://schemas.openxmlformats.org/drawingml/2006/main" xmlns:r="http://schemas.openxmlformats.org/officeDocument/2006/relationships" xmlns:p="http://schemas.openxmlformats.org/presentationml/2006/main">
+  <p:cSld>
+    <p:spTree>
+      <p:nvGrpSpPr>
+        <p:cNvPr id="1" name=""/>
+        <p:cNvGrpSpPr/>
+        <p:nvPr/>
+      </p:nvGrpSpPr>
+      <p:grpSpPr>
+        <a:xfrm>
+          <a:off x="0" y="0"/>
+          <a:ext cx="0" cy="0"/>
+          <a:chOff x="0" y="0"/>
+          <a:chExt cx="0" cy="0"/>
+        </a:xfrm>
+      </p:grpSpPr>
+      <p:sp>
+        <p:nvSpPr>
+          <p:cNvPr id="2" name="Titre 1">
+            <a:extLst>
+              <a:ext uri="{FF2B5EF4-FFF2-40B4-BE49-F238E27FC236}">
+                <a16:creationId xmlns:a16="http://schemas.microsoft.com/office/drawing/2014/main" id="{25FAE84C-A7DC-404A-92F0-376655844FD3}"/>
+              </a:ext>
+            </a:extLst>
+          </p:cNvPr>
+          <p:cNvSpPr>
+            <a:spLocks noGrp="1"/>
+          </p:cNvSpPr>
+          <p:nvPr>
+            <p:ph type="title"/>
+          </p:nvPr>
+        </p:nvSpPr>
+        <p:spPr/>
+        <p:txBody>
+          <a:bodyPr/>
+          <a:lstStyle/>
+          <a:p>
+            <a:r>
+              <a:rPr lang="fr-FR" dirty="0"/>
+              <a:t>COVID-19</a:t>
+            </a:r>
+          </a:p>
+        </p:txBody>
+      </p:sp>
+      <p:sp>
+        <p:nvSpPr>
+          <p:cNvPr id="3" name="Espace réservé du contenu 2">
+            <a:extLst>
+              <a:ext uri="{FF2B5EF4-FFF2-40B4-BE49-F238E27FC236}">
+                <a16:creationId xmlns:a16="http://schemas.microsoft.com/office/drawing/2014/main" id="{B6EAF4FE-2019-493A-BC9D-0C03CEDBB67F}"/>
+              </a:ext>
+            </a:extLst>
+          </p:cNvPr>
+          <p:cNvSpPr>
+            <a:spLocks noGrp="1"/>
+          </p:cNvSpPr>
+          <p:nvPr>
+            <p:ph idx="1"/>
+          </p:nvPr>
+        </p:nvSpPr>
+        <p:spPr/>
+        <p:txBody>
+          <a:bodyPr/>
+          <a:lstStyle/>
+          <a:p>
+            <a:r>
+              <a:rPr lang="fr-FR" dirty="0" err="1"/>
+              <a:t>Valou</a:t>
+            </a:r>
+            <a:endParaRPr lang="fr-FR" dirty="0"/>
+          </a:p>
+        </p:txBody>
+      </p:sp>
+    </p:spTree>
+    <p:extLst>
+      <p:ext uri="{BB962C8B-B14F-4D97-AF65-F5344CB8AC3E}">
+        <p14:creationId xmlns:p14="http://schemas.microsoft.com/office/powerpoint/2010/main" val="2057923470"/>
+      </p:ext>
+    </p:extLst>
+  </p:cSld>
+  <p:clrMapOvr>
+    <a:masterClrMapping/>
+  </p:clrMapOvr>
+</p:sld>
+</file>
+
+<file path=ppt/slides/slide25.xml><?xml version="1.0" encoding="utf-8"?>
+<p:sld xmlns:a="http://schemas.openxmlformats.org/drawingml/2006/main" xmlns:r="http://schemas.openxmlformats.org/officeDocument/2006/relationships" xmlns:p="http://schemas.openxmlformats.org/presentationml/2006/main">
+  <p:cSld>
+    <p:spTree>
+      <p:nvGrpSpPr>
+        <p:cNvPr id="1" name=""/>
+        <p:cNvGrpSpPr/>
+        <p:nvPr/>
+      </p:nvGrpSpPr>
+      <p:grpSpPr>
+        <a:xfrm>
+          <a:off x="0" y="0"/>
+          <a:ext cx="0" cy="0"/>
+          <a:chOff x="0" y="0"/>
+          <a:chExt cx="0" cy="0"/>
+        </a:xfrm>
+      </p:grpSpPr>
+      <p:sp>
+        <p:nvSpPr>
+          <p:cNvPr id="2" name="Titre 1">
+            <a:extLst>
+              <a:ext uri="{FF2B5EF4-FFF2-40B4-BE49-F238E27FC236}">
+                <a16:creationId xmlns:a16="http://schemas.microsoft.com/office/drawing/2014/main" id="{AAE16FDE-1420-4490-BF39-FEA497428E68}"/>
+              </a:ext>
+            </a:extLst>
+          </p:cNvPr>
+          <p:cNvSpPr>
+            <a:spLocks noGrp="1"/>
+          </p:cNvSpPr>
+          <p:nvPr>
+            <p:ph type="title"/>
+          </p:nvPr>
+        </p:nvSpPr>
+        <p:spPr/>
+        <p:txBody>
+          <a:bodyPr/>
+          <a:lstStyle/>
+          <a:p>
+            <a:r>
+              <a:rPr lang="fr-FR" dirty="0"/>
+              <a:t>REX MADERA</a:t>
+            </a:r>
+          </a:p>
+        </p:txBody>
+      </p:sp>
+      <p:sp>
+        <p:nvSpPr>
+          <p:cNvPr id="3" name="Espace réservé du contenu 2">
+            <a:extLst>
+              <a:ext uri="{FF2B5EF4-FFF2-40B4-BE49-F238E27FC236}">
+                <a16:creationId xmlns:a16="http://schemas.microsoft.com/office/drawing/2014/main" id="{B969E691-13B5-448F-A683-3388DE5F52FB}"/>
+              </a:ext>
+            </a:extLst>
+          </p:cNvPr>
+          <p:cNvSpPr>
+            <a:spLocks noGrp="1"/>
+          </p:cNvSpPr>
+          <p:nvPr>
+            <p:ph idx="1"/>
+          </p:nvPr>
+        </p:nvSpPr>
+        <p:spPr/>
+        <p:txBody>
+          <a:bodyPr/>
+          <a:lstStyle/>
+          <a:p>
+            <a:r>
+              <a:rPr lang="fr-FR" dirty="0"/>
+              <a:t>TOUT LE MONDE (Slide -&gt; NOM)</a:t>
+            </a:r>
+          </a:p>
+        </p:txBody>
+      </p:sp>
+    </p:spTree>
+    <p:extLst>
+      <p:ext uri="{BB962C8B-B14F-4D97-AF65-F5344CB8AC3E}">
+        <p14:creationId xmlns:p14="http://schemas.microsoft.com/office/powerpoint/2010/main" val="1280301743"/>
+      </p:ext>
+    </p:extLst>
+  </p:cSld>
+  <p:clrMapOvr>
+    <a:masterClrMapping/>
+  </p:clrMapOvr>
+</p:sld>
+</file>
+
+<file path=ppt/slides/slide26.xml><?xml version="1.0" encoding="utf-8"?>
+<p:sld xmlns:a="http://schemas.openxmlformats.org/drawingml/2006/main" xmlns:r="http://schemas.openxmlformats.org/officeDocument/2006/relationships" xmlns:p="http://schemas.openxmlformats.org/presentationml/2006/main">
+  <p:cSld>
+    <p:spTree>
+      <p:nvGrpSpPr>
+        <p:cNvPr id="1" name=""/>
+        <p:cNvGrpSpPr/>
+        <p:nvPr/>
+      </p:nvGrpSpPr>
+      <p:grpSpPr>
+        <a:xfrm>
+          <a:off x="0" y="0"/>
+          <a:ext cx="0" cy="0"/>
+          <a:chOff x="0" y="0"/>
+          <a:chExt cx="0" cy="0"/>
+        </a:xfrm>
+      </p:grpSpPr>
+      <p:sp>
+        <p:nvSpPr>
+          <p:cNvPr id="2" name="Titre 1">
+            <a:extLst>
+              <a:ext uri="{FF2B5EF4-FFF2-40B4-BE49-F238E27FC236}">
+                <a16:creationId xmlns:a16="http://schemas.microsoft.com/office/drawing/2014/main" id="{C66F5317-EF2D-497F-B4B1-095EEF05E1F3}"/>
+              </a:ext>
+            </a:extLst>
+          </p:cNvPr>
+          <p:cNvSpPr>
+            <a:spLocks noGrp="1"/>
+          </p:cNvSpPr>
+          <p:nvPr>
+            <p:ph type="title"/>
+          </p:nvPr>
+        </p:nvSpPr>
+        <p:spPr/>
+        <p:txBody>
+          <a:bodyPr/>
+          <a:lstStyle/>
+          <a:p>
+            <a:r>
+              <a:rPr lang="fr-FR" dirty="0"/>
+              <a:t>REX Etudiant</a:t>
+            </a:r>
+          </a:p>
+        </p:txBody>
+      </p:sp>
+      <p:sp>
+        <p:nvSpPr>
+          <p:cNvPr id="3" name="Espace réservé du contenu 2">
+            <a:extLst>
+              <a:ext uri="{FF2B5EF4-FFF2-40B4-BE49-F238E27FC236}">
+                <a16:creationId xmlns:a16="http://schemas.microsoft.com/office/drawing/2014/main" id="{DAADFC33-325F-42BD-B351-17C2A855DC38}"/>
+              </a:ext>
+            </a:extLst>
+          </p:cNvPr>
+          <p:cNvSpPr>
+            <a:spLocks noGrp="1"/>
+          </p:cNvSpPr>
+          <p:nvPr>
+            <p:ph idx="1"/>
+          </p:nvPr>
+        </p:nvSpPr>
+        <p:spPr/>
+        <p:txBody>
+          <a:bodyPr/>
+          <a:lstStyle/>
+          <a:p>
+            <a:r>
+              <a:rPr lang="fr-FR" dirty="0"/>
+              <a:t>TOUT LE MONDE (Slide -&gt; NOM)</a:t>
+            </a:r>
+          </a:p>
+        </p:txBody>
+      </p:sp>
+    </p:spTree>
+    <p:extLst>
+      <p:ext uri="{BB962C8B-B14F-4D97-AF65-F5344CB8AC3E}">
+        <p14:creationId xmlns:p14="http://schemas.microsoft.com/office/powerpoint/2010/main" val="3088040785"/>
+      </p:ext>
+    </p:extLst>
+  </p:cSld>
+  <p:clrMapOvr>
+    <a:masterClrMapping/>
+  </p:clrMapOvr>
 </p:sld>
 </file>
 
@@ -6965,7 +8386,7 @@
         </p:nvSpPr>
         <p:spPr>
           <a:xfrm>
-            <a:off x="1086643" y="2552700"/>
+            <a:off x="1086643" y="236220"/>
             <a:ext cx="10018713" cy="1752599"/>
           </a:xfrm>
         </p:spPr>
@@ -6975,7 +8396,10 @@
           </a:bodyPr>
           <a:lstStyle/>
           <a:p>
-            <a:endParaRPr lang="fr-FR" sz="5400" b="1" dirty="0"/>
+            <a:r>
+              <a:rPr lang="fr-FR" sz="5400" b="1" dirty="0"/>
+              <a:t>Projet</a:t>
+            </a:r>
           </a:p>
         </p:txBody>
       </p:sp>
@@ -7014,7 +8438,7 @@
           <p:cNvPr id="2" name="Titre 1">
             <a:extLst>
               <a:ext uri="{FF2B5EF4-FFF2-40B4-BE49-F238E27FC236}">
-                <a16:creationId xmlns:a16="http://schemas.microsoft.com/office/drawing/2014/main" id="{9AF062FD-23BF-A944-9FD3-8FF06344FFDC}"/>
+                <a16:creationId xmlns:a16="http://schemas.microsoft.com/office/drawing/2014/main" id="{A7DB94A2-748B-43D5-A1EC-294A167A09A5}"/>
               </a:ext>
             </a:extLst>
           </p:cNvPr>
@@ -7025,26 +8449,24 @@
             <p:ph type="title"/>
           </p:nvPr>
         </p:nvSpPr>
-        <p:spPr>
-          <a:xfrm>
-            <a:off x="720435" y="232061"/>
-            <a:ext cx="10018713" cy="1752599"/>
-          </a:xfrm>
-        </p:spPr>
-        <p:txBody>
-          <a:bodyPr/>
-          <a:lstStyle/>
-          <a:p>
-            <a:endParaRPr lang="fr-FR" dirty="0"/>
-          </a:p>
-        </p:txBody>
-      </p:sp>
-      <p:sp>
-        <p:nvSpPr>
-          <p:cNvPr id="4" name="Espace réservé du contenu 3">
+        <p:spPr/>
+        <p:txBody>
+          <a:bodyPr/>
+          <a:lstStyle/>
+          <a:p>
+            <a:r>
+              <a:rPr lang="fr-FR" dirty="0"/>
+              <a:t>Intro/Contexte</a:t>
+            </a:r>
+          </a:p>
+        </p:txBody>
+      </p:sp>
+      <p:sp>
+        <p:nvSpPr>
+          <p:cNvPr id="3" name="Espace réservé du contenu 2">
             <a:extLst>
               <a:ext uri="{FF2B5EF4-FFF2-40B4-BE49-F238E27FC236}">
-                <a16:creationId xmlns:a16="http://schemas.microsoft.com/office/drawing/2014/main" id="{DFAEE756-62A1-46C7-9CE2-5F0FF6F7571D}"/>
+                <a16:creationId xmlns:a16="http://schemas.microsoft.com/office/drawing/2014/main" id="{E6D85D6E-6DAB-4B80-A9AC-9886867FEC23}"/>
               </a:ext>
             </a:extLst>
           </p:cNvPr>
@@ -7060,14 +8482,18 @@
           <a:bodyPr/>
           <a:lstStyle/>
           <a:p>
-            <a:endParaRPr lang="fr-FR"/>
+            <a:r>
+              <a:rPr lang="fr-FR" dirty="0" err="1"/>
+              <a:t>Valou</a:t>
+            </a:r>
+            <a:endParaRPr lang="fr-FR" dirty="0"/>
           </a:p>
         </p:txBody>
       </p:sp>
     </p:spTree>
     <p:extLst>
       <p:ext uri="{BB962C8B-B14F-4D97-AF65-F5344CB8AC3E}">
-        <p14:creationId xmlns:p14="http://schemas.microsoft.com/office/powerpoint/2010/main" val="3949098132"/>
+        <p14:creationId xmlns:p14="http://schemas.microsoft.com/office/powerpoint/2010/main" val="3447197173"/>
       </p:ext>
     </p:extLst>
   </p:cSld>
@@ -7099,6 +8525,184 @@
           <p:cNvPr id="2" name="Titre 1">
             <a:extLst>
               <a:ext uri="{FF2B5EF4-FFF2-40B4-BE49-F238E27FC236}">
+                <a16:creationId xmlns:a16="http://schemas.microsoft.com/office/drawing/2014/main" id="{A7DB94A2-748B-43D5-A1EC-294A167A09A5}"/>
+              </a:ext>
+            </a:extLst>
+          </p:cNvPr>
+          <p:cNvSpPr>
+            <a:spLocks noGrp="1"/>
+          </p:cNvSpPr>
+          <p:nvPr>
+            <p:ph type="title"/>
+          </p:nvPr>
+        </p:nvSpPr>
+        <p:spPr/>
+        <p:txBody>
+          <a:bodyPr/>
+          <a:lstStyle/>
+          <a:p>
+            <a:r>
+              <a:rPr lang="fr-FR" dirty="0"/>
+              <a:t>Besoin/Objectif</a:t>
+            </a:r>
+          </a:p>
+        </p:txBody>
+      </p:sp>
+      <p:sp>
+        <p:nvSpPr>
+          <p:cNvPr id="3" name="Espace réservé du contenu 2">
+            <a:extLst>
+              <a:ext uri="{FF2B5EF4-FFF2-40B4-BE49-F238E27FC236}">
+                <a16:creationId xmlns:a16="http://schemas.microsoft.com/office/drawing/2014/main" id="{E6D85D6E-6DAB-4B80-A9AC-9886867FEC23}"/>
+              </a:ext>
+            </a:extLst>
+          </p:cNvPr>
+          <p:cNvSpPr>
+            <a:spLocks noGrp="1"/>
+          </p:cNvSpPr>
+          <p:nvPr>
+            <p:ph idx="1"/>
+          </p:nvPr>
+        </p:nvSpPr>
+        <p:spPr/>
+        <p:txBody>
+          <a:bodyPr/>
+          <a:lstStyle/>
+          <a:p>
+            <a:r>
+              <a:rPr lang="fr-FR" dirty="0" err="1"/>
+              <a:t>Valou</a:t>
+            </a:r>
+            <a:endParaRPr lang="fr-FR" dirty="0"/>
+          </a:p>
+        </p:txBody>
+      </p:sp>
+    </p:spTree>
+    <p:extLst>
+      <p:ext uri="{BB962C8B-B14F-4D97-AF65-F5344CB8AC3E}">
+        <p14:creationId xmlns:p14="http://schemas.microsoft.com/office/powerpoint/2010/main" val="1800404626"/>
+      </p:ext>
+    </p:extLst>
+  </p:cSld>
+  <p:clrMapOvr>
+    <a:masterClrMapping/>
+  </p:clrMapOvr>
+</p:sld>
+</file>
+
+<file path=ppt/slides/slide6.xml><?xml version="1.0" encoding="utf-8"?>
+<p:sld xmlns:a="http://schemas.openxmlformats.org/drawingml/2006/main" xmlns:r="http://schemas.openxmlformats.org/officeDocument/2006/relationships" xmlns:p="http://schemas.openxmlformats.org/presentationml/2006/main">
+  <p:cSld>
+    <p:spTree>
+      <p:nvGrpSpPr>
+        <p:cNvPr id="1" name=""/>
+        <p:cNvGrpSpPr/>
+        <p:nvPr/>
+      </p:nvGrpSpPr>
+      <p:grpSpPr>
+        <a:xfrm>
+          <a:off x="0" y="0"/>
+          <a:ext cx="0" cy="0"/>
+          <a:chOff x="0" y="0"/>
+          <a:chExt cx="0" cy="0"/>
+        </a:xfrm>
+      </p:grpSpPr>
+      <p:sp>
+        <p:nvSpPr>
+          <p:cNvPr id="2" name="Titre 1">
+            <a:extLst>
+              <a:ext uri="{FF2B5EF4-FFF2-40B4-BE49-F238E27FC236}">
+                <a16:creationId xmlns:a16="http://schemas.microsoft.com/office/drawing/2014/main" id="{9AF062FD-23BF-A944-9FD3-8FF06344FFDC}"/>
+              </a:ext>
+            </a:extLst>
+          </p:cNvPr>
+          <p:cNvSpPr>
+            <a:spLocks noGrp="1"/>
+          </p:cNvSpPr>
+          <p:nvPr>
+            <p:ph type="title"/>
+          </p:nvPr>
+        </p:nvSpPr>
+        <p:spPr>
+          <a:xfrm>
+            <a:off x="720435" y="232061"/>
+            <a:ext cx="10018713" cy="1752599"/>
+          </a:xfrm>
+        </p:spPr>
+        <p:txBody>
+          <a:bodyPr/>
+          <a:lstStyle/>
+          <a:p>
+            <a:r>
+              <a:rPr lang="fr-FR" dirty="0"/>
+              <a:t>Agilité</a:t>
+            </a:r>
+          </a:p>
+        </p:txBody>
+      </p:sp>
+      <p:sp>
+        <p:nvSpPr>
+          <p:cNvPr id="4" name="Espace réservé du contenu 3">
+            <a:extLst>
+              <a:ext uri="{FF2B5EF4-FFF2-40B4-BE49-F238E27FC236}">
+                <a16:creationId xmlns:a16="http://schemas.microsoft.com/office/drawing/2014/main" id="{DFAEE756-62A1-46C7-9CE2-5F0FF6F7571D}"/>
+              </a:ext>
+            </a:extLst>
+          </p:cNvPr>
+          <p:cNvSpPr>
+            <a:spLocks noGrp="1"/>
+          </p:cNvSpPr>
+          <p:nvPr>
+            <p:ph idx="1"/>
+          </p:nvPr>
+        </p:nvSpPr>
+        <p:spPr/>
+        <p:txBody>
+          <a:bodyPr/>
+          <a:lstStyle/>
+          <a:p>
+            <a:r>
+              <a:rPr lang="fr-FR" dirty="0"/>
+              <a:t>Romain</a:t>
+            </a:r>
+          </a:p>
+        </p:txBody>
+      </p:sp>
+    </p:spTree>
+    <p:extLst>
+      <p:ext uri="{BB962C8B-B14F-4D97-AF65-F5344CB8AC3E}">
+        <p14:creationId xmlns:p14="http://schemas.microsoft.com/office/powerpoint/2010/main" val="3949098132"/>
+      </p:ext>
+    </p:extLst>
+  </p:cSld>
+  <p:clrMapOvr>
+    <a:masterClrMapping/>
+  </p:clrMapOvr>
+</p:sld>
+</file>
+
+<file path=ppt/slides/slide7.xml><?xml version="1.0" encoding="utf-8"?>
+<p:sld xmlns:a="http://schemas.openxmlformats.org/drawingml/2006/main" xmlns:r="http://schemas.openxmlformats.org/officeDocument/2006/relationships" xmlns:p="http://schemas.openxmlformats.org/presentationml/2006/main">
+  <p:cSld>
+    <p:spTree>
+      <p:nvGrpSpPr>
+        <p:cNvPr id="1" name=""/>
+        <p:cNvGrpSpPr/>
+        <p:nvPr/>
+      </p:nvGrpSpPr>
+      <p:grpSpPr>
+        <a:xfrm>
+          <a:off x="0" y="0"/>
+          <a:ext cx="0" cy="0"/>
+          <a:chOff x="0" y="0"/>
+          <a:chExt cx="0" cy="0"/>
+        </a:xfrm>
+      </p:grpSpPr>
+      <p:sp>
+        <p:nvSpPr>
+          <p:cNvPr id="2" name="Titre 1">
+            <a:extLst>
+              <a:ext uri="{FF2B5EF4-FFF2-40B4-BE49-F238E27FC236}">
                 <a16:creationId xmlns:a16="http://schemas.microsoft.com/office/drawing/2014/main" id="{308E1324-ACA0-264A-A162-D9617696463C}"/>
               </a:ext>
             </a:extLst>
@@ -7120,7 +8724,10 @@
           <a:bodyPr/>
           <a:lstStyle/>
           <a:p>
-            <a:endParaRPr lang="fr-FR" dirty="0"/>
+            <a:r>
+              <a:rPr lang="fr-FR" dirty="0"/>
+              <a:t>Planning prévisionnel</a:t>
+            </a:r>
           </a:p>
         </p:txBody>
       </p:sp>
@@ -7145,7 +8752,11 @@
           <a:bodyPr/>
           <a:lstStyle/>
           <a:p>
-            <a:endParaRPr lang="fr-FR"/>
+            <a:r>
+              <a:rPr lang="fr-FR" dirty="0" err="1"/>
+              <a:t>Valou</a:t>
+            </a:r>
+            <a:endParaRPr lang="fr-FR" dirty="0"/>
           </a:p>
         </p:txBody>
       </p:sp>
@@ -7153,6 +8764,178 @@
     <p:extLst>
       <p:ext uri="{BB962C8B-B14F-4D97-AF65-F5344CB8AC3E}">
         <p14:creationId xmlns:p14="http://schemas.microsoft.com/office/powerpoint/2010/main" val="2999487520"/>
+      </p:ext>
+    </p:extLst>
+  </p:cSld>
+  <p:clrMapOvr>
+    <a:masterClrMapping/>
+  </p:clrMapOvr>
+</p:sld>
+</file>
+
+<file path=ppt/slides/slide8.xml><?xml version="1.0" encoding="utf-8"?>
+<p:sld xmlns:a="http://schemas.openxmlformats.org/drawingml/2006/main" xmlns:r="http://schemas.openxmlformats.org/officeDocument/2006/relationships" xmlns:p="http://schemas.openxmlformats.org/presentationml/2006/main">
+  <p:cSld>
+    <p:spTree>
+      <p:nvGrpSpPr>
+        <p:cNvPr id="1" name=""/>
+        <p:cNvGrpSpPr/>
+        <p:nvPr/>
+      </p:nvGrpSpPr>
+      <p:grpSpPr>
+        <a:xfrm>
+          <a:off x="0" y="0"/>
+          <a:ext cx="0" cy="0"/>
+          <a:chOff x="0" y="0"/>
+          <a:chExt cx="0" cy="0"/>
+        </a:xfrm>
+      </p:grpSpPr>
+      <p:sp>
+        <p:nvSpPr>
+          <p:cNvPr id="2" name="Titre 1">
+            <a:extLst>
+              <a:ext uri="{FF2B5EF4-FFF2-40B4-BE49-F238E27FC236}">
+                <a16:creationId xmlns:a16="http://schemas.microsoft.com/office/drawing/2014/main" id="{BE7320C6-F6FC-41F5-B3CF-659F5FF5C861}"/>
+              </a:ext>
+            </a:extLst>
+          </p:cNvPr>
+          <p:cNvSpPr>
+            <a:spLocks noGrp="1"/>
+          </p:cNvSpPr>
+          <p:nvPr>
+            <p:ph type="title"/>
+          </p:nvPr>
+        </p:nvSpPr>
+        <p:spPr/>
+        <p:txBody>
+          <a:bodyPr/>
+          <a:lstStyle/>
+          <a:p>
+            <a:r>
+              <a:rPr lang="fr-FR" dirty="0"/>
+              <a:t>SWOT</a:t>
+            </a:r>
+          </a:p>
+        </p:txBody>
+      </p:sp>
+      <p:sp>
+        <p:nvSpPr>
+          <p:cNvPr id="3" name="Espace réservé du contenu 2">
+            <a:extLst>
+              <a:ext uri="{FF2B5EF4-FFF2-40B4-BE49-F238E27FC236}">
+                <a16:creationId xmlns:a16="http://schemas.microsoft.com/office/drawing/2014/main" id="{4E11813F-CD97-4D10-8B21-5F89E9F557C4}"/>
+              </a:ext>
+            </a:extLst>
+          </p:cNvPr>
+          <p:cNvSpPr>
+            <a:spLocks noGrp="1"/>
+          </p:cNvSpPr>
+          <p:nvPr>
+            <p:ph idx="1"/>
+          </p:nvPr>
+        </p:nvSpPr>
+        <p:spPr/>
+        <p:txBody>
+          <a:bodyPr/>
+          <a:lstStyle/>
+          <a:p>
+            <a:r>
+              <a:rPr lang="fr-FR" dirty="0"/>
+              <a:t>Ulrich</a:t>
+            </a:r>
+          </a:p>
+        </p:txBody>
+      </p:sp>
+    </p:spTree>
+    <p:extLst>
+      <p:ext uri="{BB962C8B-B14F-4D97-AF65-F5344CB8AC3E}">
+        <p14:creationId xmlns:p14="http://schemas.microsoft.com/office/powerpoint/2010/main" val="835529957"/>
+      </p:ext>
+    </p:extLst>
+  </p:cSld>
+  <p:clrMapOvr>
+    <a:masterClrMapping/>
+  </p:clrMapOvr>
+</p:sld>
+</file>
+
+<file path=ppt/slides/slide9.xml><?xml version="1.0" encoding="utf-8"?>
+<p:sld xmlns:a="http://schemas.openxmlformats.org/drawingml/2006/main" xmlns:r="http://schemas.openxmlformats.org/officeDocument/2006/relationships" xmlns:p="http://schemas.openxmlformats.org/presentationml/2006/main">
+  <p:cSld>
+    <p:spTree>
+      <p:nvGrpSpPr>
+        <p:cNvPr id="1" name=""/>
+        <p:cNvGrpSpPr/>
+        <p:nvPr/>
+      </p:nvGrpSpPr>
+      <p:grpSpPr>
+        <a:xfrm>
+          <a:off x="0" y="0"/>
+          <a:ext cx="0" cy="0"/>
+          <a:chOff x="0" y="0"/>
+          <a:chExt cx="0" cy="0"/>
+        </a:xfrm>
+      </p:grpSpPr>
+      <p:sp>
+        <p:nvSpPr>
+          <p:cNvPr id="2" name="Titre 1">
+            <a:extLst>
+              <a:ext uri="{FF2B5EF4-FFF2-40B4-BE49-F238E27FC236}">
+                <a16:creationId xmlns:a16="http://schemas.microsoft.com/office/drawing/2014/main" id="{D2821361-FEA0-40EA-BCEF-9334E9473965}"/>
+              </a:ext>
+            </a:extLst>
+          </p:cNvPr>
+          <p:cNvSpPr>
+            <a:spLocks noGrp="1"/>
+          </p:cNvSpPr>
+          <p:nvPr>
+            <p:ph type="title"/>
+          </p:nvPr>
+        </p:nvSpPr>
+        <p:spPr/>
+        <p:txBody>
+          <a:bodyPr/>
+          <a:lstStyle/>
+          <a:p>
+            <a:r>
+              <a:rPr lang="fr-FR" dirty="0"/>
+              <a:t>Sécurité</a:t>
+            </a:r>
+          </a:p>
+        </p:txBody>
+      </p:sp>
+      <p:sp>
+        <p:nvSpPr>
+          <p:cNvPr id="3" name="Espace réservé du contenu 2">
+            <a:extLst>
+              <a:ext uri="{FF2B5EF4-FFF2-40B4-BE49-F238E27FC236}">
+                <a16:creationId xmlns:a16="http://schemas.microsoft.com/office/drawing/2014/main" id="{C8A1F5A1-375F-4ADD-BF73-7F79B2B4AC1C}"/>
+              </a:ext>
+            </a:extLst>
+          </p:cNvPr>
+          <p:cNvSpPr>
+            <a:spLocks noGrp="1"/>
+          </p:cNvSpPr>
+          <p:nvPr>
+            <p:ph idx="1"/>
+          </p:nvPr>
+        </p:nvSpPr>
+        <p:spPr/>
+        <p:txBody>
+          <a:bodyPr/>
+          <a:lstStyle/>
+          <a:p>
+            <a:r>
+              <a:rPr lang="fr-FR" dirty="0"/>
+              <a:t>Ulrich</a:t>
+            </a:r>
+          </a:p>
+        </p:txBody>
+      </p:sp>
+    </p:spTree>
+    <p:extLst>
+      <p:ext uri="{BB962C8B-B14F-4D97-AF65-F5344CB8AC3E}">
+        <p14:creationId xmlns:p14="http://schemas.microsoft.com/office/powerpoint/2010/main" val="953456476"/>
       </p:ext>
     </p:extLst>
   </p:cSld>

</xml_diff>

<commit_message>
Agilité dans les slides
</commit_message>
<xml_diff>
--- a/LIVRABLE-4/Présentation livrable 4.pptx
+++ b/LIVRABLE-4/Présentation livrable 4.pptx
@@ -5,7 +5,7 @@
     <p:sldMasterId id="2147483687" r:id="rId1"/>
   </p:sldMasterIdLst>
   <p:notesMasterIdLst>
-    <p:notesMasterId r:id="rId30"/>
+    <p:notesMasterId r:id="rId33"/>
   </p:notesMasterIdLst>
   <p:sldIdLst>
     <p:sldId id="256" r:id="rId2"/>
@@ -13,29 +13,32 @@
     <p:sldId id="272" r:id="rId4"/>
     <p:sldId id="275" r:id="rId5"/>
     <p:sldId id="277" r:id="rId6"/>
-    <p:sldId id="273" r:id="rId7"/>
-    <p:sldId id="274" r:id="rId8"/>
-    <p:sldId id="276" r:id="rId9"/>
-    <p:sldId id="278" r:id="rId10"/>
-    <p:sldId id="280" r:id="rId11"/>
-    <p:sldId id="279" r:id="rId12"/>
-    <p:sldId id="281" r:id="rId13"/>
-    <p:sldId id="282" r:id="rId14"/>
-    <p:sldId id="283" r:id="rId15"/>
-    <p:sldId id="284" r:id="rId16"/>
-    <p:sldId id="285" r:id="rId17"/>
-    <p:sldId id="296" r:id="rId18"/>
-    <p:sldId id="286" r:id="rId19"/>
-    <p:sldId id="297" r:id="rId20"/>
-    <p:sldId id="287" r:id="rId21"/>
-    <p:sldId id="288" r:id="rId22"/>
-    <p:sldId id="290" r:id="rId23"/>
-    <p:sldId id="291" r:id="rId24"/>
-    <p:sldId id="289" r:id="rId25"/>
-    <p:sldId id="292" r:id="rId26"/>
-    <p:sldId id="293" r:id="rId27"/>
-    <p:sldId id="294" r:id="rId28"/>
-    <p:sldId id="295" r:id="rId29"/>
+    <p:sldId id="298" r:id="rId7"/>
+    <p:sldId id="299" r:id="rId8"/>
+    <p:sldId id="273" r:id="rId9"/>
+    <p:sldId id="300" r:id="rId10"/>
+    <p:sldId id="274" r:id="rId11"/>
+    <p:sldId id="276" r:id="rId12"/>
+    <p:sldId id="278" r:id="rId13"/>
+    <p:sldId id="280" r:id="rId14"/>
+    <p:sldId id="279" r:id="rId15"/>
+    <p:sldId id="281" r:id="rId16"/>
+    <p:sldId id="282" r:id="rId17"/>
+    <p:sldId id="283" r:id="rId18"/>
+    <p:sldId id="284" r:id="rId19"/>
+    <p:sldId id="285" r:id="rId20"/>
+    <p:sldId id="296" r:id="rId21"/>
+    <p:sldId id="286" r:id="rId22"/>
+    <p:sldId id="297" r:id="rId23"/>
+    <p:sldId id="287" r:id="rId24"/>
+    <p:sldId id="288" r:id="rId25"/>
+    <p:sldId id="290" r:id="rId26"/>
+    <p:sldId id="291" r:id="rId27"/>
+    <p:sldId id="289" r:id="rId28"/>
+    <p:sldId id="292" r:id="rId29"/>
+    <p:sldId id="293" r:id="rId30"/>
+    <p:sldId id="294" r:id="rId31"/>
+    <p:sldId id="295" r:id="rId32"/>
   </p:sldIdLst>
   <p:sldSz cx="12192000" cy="6858000"/>
   <p:notesSz cx="6858000" cy="9144000"/>
@@ -640,7 +643,91 @@
           <a:p>
             <a:fld id="{A4398319-E21C-4226-9771-24912F5B4C11}" type="slidenum">
               <a:rPr lang="fr-FR" smtClean="0"/>
-              <a:t>17</a:t>
+              <a:t>6</a:t>
+            </a:fld>
+            <a:endParaRPr lang="fr-FR"/>
+          </a:p>
+        </p:txBody>
+      </p:sp>
+    </p:spTree>
+    <p:extLst>
+      <p:ext uri="{BB962C8B-B14F-4D97-AF65-F5344CB8AC3E}">
+        <p14:creationId xmlns:p14="http://schemas.microsoft.com/office/powerpoint/2010/main" val="3100957534"/>
+      </p:ext>
+    </p:extLst>
+  </p:cSld>
+  <p:clrMapOvr>
+    <a:masterClrMapping/>
+  </p:clrMapOvr>
+</p:notes>
+</file>
+
+<file path=ppt/notesSlides/notesSlide3.xml><?xml version="1.0" encoding="utf-8"?>
+<p:notes xmlns:a="http://schemas.openxmlformats.org/drawingml/2006/main" xmlns:r="http://schemas.openxmlformats.org/officeDocument/2006/relationships" xmlns:p="http://schemas.openxmlformats.org/presentationml/2006/main">
+  <p:cSld>
+    <p:spTree>
+      <p:nvGrpSpPr>
+        <p:cNvPr id="1" name=""/>
+        <p:cNvGrpSpPr/>
+        <p:nvPr/>
+      </p:nvGrpSpPr>
+      <p:grpSpPr>
+        <a:xfrm>
+          <a:off x="0" y="0"/>
+          <a:ext cx="0" cy="0"/>
+          <a:chOff x="0" y="0"/>
+          <a:chExt cx="0" cy="0"/>
+        </a:xfrm>
+      </p:grpSpPr>
+      <p:sp>
+        <p:nvSpPr>
+          <p:cNvPr id="2" name="Espace réservé de l'image des diapositives 1"/>
+          <p:cNvSpPr>
+            <a:spLocks noGrp="1" noRot="1" noChangeAspect="1"/>
+          </p:cNvSpPr>
+          <p:nvPr>
+            <p:ph type="sldImg"/>
+          </p:nvPr>
+        </p:nvSpPr>
+        <p:spPr/>
+      </p:sp>
+      <p:sp>
+        <p:nvSpPr>
+          <p:cNvPr id="3" name="Espace réservé des notes 2"/>
+          <p:cNvSpPr>
+            <a:spLocks noGrp="1"/>
+          </p:cNvSpPr>
+          <p:nvPr>
+            <p:ph type="body" idx="1"/>
+          </p:nvPr>
+        </p:nvSpPr>
+        <p:spPr/>
+        <p:txBody>
+          <a:bodyPr/>
+          <a:lstStyle/>
+          <a:p>
+            <a:endParaRPr lang="fr-FR" dirty="0"/>
+          </a:p>
+        </p:txBody>
+      </p:sp>
+      <p:sp>
+        <p:nvSpPr>
+          <p:cNvPr id="4" name="Espace réservé du numéro de diapositive 3"/>
+          <p:cNvSpPr>
+            <a:spLocks noGrp="1"/>
+          </p:cNvSpPr>
+          <p:nvPr>
+            <p:ph type="sldNum" sz="quarter" idx="5"/>
+          </p:nvPr>
+        </p:nvSpPr>
+        <p:spPr/>
+        <p:txBody>
+          <a:bodyPr/>
+          <a:lstStyle/>
+          <a:p>
+            <a:fld id="{A4398319-E21C-4226-9771-24912F5B4C11}" type="slidenum">
+              <a:rPr lang="fr-FR" smtClean="0"/>
+              <a:t>20</a:t>
             </a:fld>
             <a:endParaRPr lang="fr-FR"/>
           </a:p>
@@ -6966,7 +7053,7 @@
           <p:cNvPr id="2" name="Titre 1">
             <a:extLst>
               <a:ext uri="{FF2B5EF4-FFF2-40B4-BE49-F238E27FC236}">
-                <a16:creationId xmlns:a16="http://schemas.microsoft.com/office/drawing/2014/main" id="{A1DD71D5-2663-B041-9836-791DD68948AB}"/>
+                <a16:creationId xmlns:a16="http://schemas.microsoft.com/office/drawing/2014/main" id="{308E1324-ACA0-264A-A162-D9617696463C}"/>
               </a:ext>
             </a:extLst>
           </p:cNvPr>
@@ -6979,27 +7066,54 @@
         </p:nvSpPr>
         <p:spPr>
           <a:xfrm>
-            <a:off x="1086643" y="236220"/>
+            <a:off x="1086642" y="0"/>
             <a:ext cx="10018713" cy="1752599"/>
           </a:xfrm>
         </p:spPr>
         <p:txBody>
-          <a:bodyPr>
-            <a:normAutofit/>
-          </a:bodyPr>
-          <a:lstStyle/>
-          <a:p>
-            <a:r>
-              <a:rPr lang="fr-FR" sz="5400" b="1" dirty="0"/>
-              <a:t>Technique</a:t>
-            </a:r>
+          <a:bodyPr/>
+          <a:lstStyle/>
+          <a:p>
+            <a:r>
+              <a:rPr lang="fr-FR" dirty="0"/>
+              <a:t>Planning prévisionnel</a:t>
+            </a:r>
+          </a:p>
+        </p:txBody>
+      </p:sp>
+      <p:sp>
+        <p:nvSpPr>
+          <p:cNvPr id="10" name="Espace réservé du contenu 9">
+            <a:extLst>
+              <a:ext uri="{FF2B5EF4-FFF2-40B4-BE49-F238E27FC236}">
+                <a16:creationId xmlns:a16="http://schemas.microsoft.com/office/drawing/2014/main" id="{52AEAC9C-C55C-4C53-9AC0-4DB0416E48C7}"/>
+              </a:ext>
+            </a:extLst>
+          </p:cNvPr>
+          <p:cNvSpPr>
+            <a:spLocks noGrp="1"/>
+          </p:cNvSpPr>
+          <p:nvPr>
+            <p:ph idx="1"/>
+          </p:nvPr>
+        </p:nvSpPr>
+        <p:spPr/>
+        <p:txBody>
+          <a:bodyPr/>
+          <a:lstStyle/>
+          <a:p>
+            <a:r>
+              <a:rPr lang="fr-FR" dirty="0" err="1"/>
+              <a:t>Valou</a:t>
+            </a:r>
+            <a:endParaRPr lang="fr-FR" dirty="0"/>
           </a:p>
         </p:txBody>
       </p:sp>
     </p:spTree>
     <p:extLst>
       <p:ext uri="{BB962C8B-B14F-4D97-AF65-F5344CB8AC3E}">
-        <p14:creationId xmlns:p14="http://schemas.microsoft.com/office/powerpoint/2010/main" val="155951835"/>
+        <p14:creationId xmlns:p14="http://schemas.microsoft.com/office/powerpoint/2010/main" val="2999487520"/>
       </p:ext>
     </p:extLst>
   </p:cSld>
@@ -7031,7 +7145,7 @@
           <p:cNvPr id="2" name="Titre 1">
             <a:extLst>
               <a:ext uri="{FF2B5EF4-FFF2-40B4-BE49-F238E27FC236}">
-                <a16:creationId xmlns:a16="http://schemas.microsoft.com/office/drawing/2014/main" id="{C2F60A29-4E64-4EAA-A409-B78ACC7960C2}"/>
+                <a16:creationId xmlns:a16="http://schemas.microsoft.com/office/drawing/2014/main" id="{BE7320C6-F6FC-41F5-B3CF-659F5FF5C861}"/>
               </a:ext>
             </a:extLst>
           </p:cNvPr>
@@ -7049,7 +7163,7 @@
           <a:p>
             <a:r>
               <a:rPr lang="fr-FR" dirty="0"/>
-              <a:t>Langage</a:t>
+              <a:t>SWOT</a:t>
             </a:r>
           </a:p>
         </p:txBody>
@@ -7059,7 +7173,7 @@
           <p:cNvPr id="3" name="Espace réservé du contenu 2">
             <a:extLst>
               <a:ext uri="{FF2B5EF4-FFF2-40B4-BE49-F238E27FC236}">
-                <a16:creationId xmlns:a16="http://schemas.microsoft.com/office/drawing/2014/main" id="{3A00E401-CAE3-45CA-8D65-438B44E28491}"/>
+                <a16:creationId xmlns:a16="http://schemas.microsoft.com/office/drawing/2014/main" id="{4E11813F-CD97-4D10-8B21-5F89E9F557C4}"/>
               </a:ext>
             </a:extLst>
           </p:cNvPr>
@@ -7077,7 +7191,7 @@
           <a:p>
             <a:r>
               <a:rPr lang="fr-FR" dirty="0"/>
-              <a:t>Allan</a:t>
+              <a:t>Ulrich</a:t>
             </a:r>
           </a:p>
         </p:txBody>
@@ -7085,7 +7199,7 @@
     </p:spTree>
     <p:extLst>
       <p:ext uri="{BB962C8B-B14F-4D97-AF65-F5344CB8AC3E}">
-        <p14:creationId xmlns:p14="http://schemas.microsoft.com/office/powerpoint/2010/main" val="1628331343"/>
+        <p14:creationId xmlns:p14="http://schemas.microsoft.com/office/powerpoint/2010/main" val="835529957"/>
       </p:ext>
     </p:extLst>
   </p:cSld>
@@ -7117,7 +7231,7 @@
           <p:cNvPr id="2" name="Titre 1">
             <a:extLst>
               <a:ext uri="{FF2B5EF4-FFF2-40B4-BE49-F238E27FC236}">
-                <a16:creationId xmlns:a16="http://schemas.microsoft.com/office/drawing/2014/main" id="{C6FF438A-F415-4ACE-B03B-4E3E1C1FB923}"/>
+                <a16:creationId xmlns:a16="http://schemas.microsoft.com/office/drawing/2014/main" id="{D2821361-FEA0-40EA-BCEF-9334E9473965}"/>
               </a:ext>
             </a:extLst>
           </p:cNvPr>
@@ -7135,7 +7249,7 @@
           <a:p>
             <a:r>
               <a:rPr lang="fr-FR" dirty="0"/>
-              <a:t>Outils</a:t>
+              <a:t>Sécurité</a:t>
             </a:r>
           </a:p>
         </p:txBody>
@@ -7145,7 +7259,7 @@
           <p:cNvPr id="3" name="Espace réservé du contenu 2">
             <a:extLst>
               <a:ext uri="{FF2B5EF4-FFF2-40B4-BE49-F238E27FC236}">
-                <a16:creationId xmlns:a16="http://schemas.microsoft.com/office/drawing/2014/main" id="{14B5F129-37B9-477C-BD40-2906CC3E93F7}"/>
+                <a16:creationId xmlns:a16="http://schemas.microsoft.com/office/drawing/2014/main" id="{C8A1F5A1-375F-4ADD-BF73-7F79B2B4AC1C}"/>
               </a:ext>
             </a:extLst>
           </p:cNvPr>
@@ -7163,7 +7277,7 @@
           <a:p>
             <a:r>
               <a:rPr lang="fr-FR" dirty="0"/>
-              <a:t>Allan</a:t>
+              <a:t>Ulrich</a:t>
             </a:r>
           </a:p>
         </p:txBody>
@@ -7171,7 +7285,7 @@
     </p:spTree>
     <p:extLst>
       <p:ext uri="{BB962C8B-B14F-4D97-AF65-F5344CB8AC3E}">
-        <p14:creationId xmlns:p14="http://schemas.microsoft.com/office/powerpoint/2010/main" val="696368023"/>
+        <p14:creationId xmlns:p14="http://schemas.microsoft.com/office/powerpoint/2010/main" val="953456476"/>
       </p:ext>
     </p:extLst>
   </p:cSld>
@@ -7203,7 +7317,7 @@
           <p:cNvPr id="2" name="Titre 1">
             <a:extLst>
               <a:ext uri="{FF2B5EF4-FFF2-40B4-BE49-F238E27FC236}">
-                <a16:creationId xmlns:a16="http://schemas.microsoft.com/office/drawing/2014/main" id="{6C4477FA-CD64-4473-9CCC-2312506BBD7B}"/>
+                <a16:creationId xmlns:a16="http://schemas.microsoft.com/office/drawing/2014/main" id="{A1DD71D5-2663-B041-9836-791DD68948AB}"/>
               </a:ext>
             </a:extLst>
           </p:cNvPr>
@@ -7214,42 +7328,21 @@
             <p:ph type="title"/>
           </p:nvPr>
         </p:nvSpPr>
-        <p:spPr/>
-        <p:txBody>
-          <a:bodyPr/>
-          <a:lstStyle/>
-          <a:p>
-            <a:r>
-              <a:rPr lang="fr-FR" dirty="0"/>
-              <a:t>Architecture</a:t>
-            </a:r>
-          </a:p>
-        </p:txBody>
-      </p:sp>
-      <p:sp>
-        <p:nvSpPr>
-          <p:cNvPr id="3" name="Espace réservé du contenu 2">
-            <a:extLst>
-              <a:ext uri="{FF2B5EF4-FFF2-40B4-BE49-F238E27FC236}">
-                <a16:creationId xmlns:a16="http://schemas.microsoft.com/office/drawing/2014/main" id="{EDED6002-3EB0-4AB7-9077-FB9646AC3294}"/>
-              </a:ext>
-            </a:extLst>
-          </p:cNvPr>
-          <p:cNvSpPr>
-            <a:spLocks noGrp="1"/>
-          </p:cNvSpPr>
-          <p:nvPr>
-            <p:ph idx="1"/>
-          </p:nvPr>
-        </p:nvSpPr>
-        <p:spPr/>
-        <p:txBody>
-          <a:bodyPr/>
-          <a:lstStyle/>
-          <a:p>
-            <a:r>
-              <a:rPr lang="fr-FR" dirty="0"/>
-              <a:t>Allan</a:t>
+        <p:spPr>
+          <a:xfrm>
+            <a:off x="1086643" y="236220"/>
+            <a:ext cx="10018713" cy="1752599"/>
+          </a:xfrm>
+        </p:spPr>
+        <p:txBody>
+          <a:bodyPr>
+            <a:normAutofit/>
+          </a:bodyPr>
+          <a:lstStyle/>
+          <a:p>
+            <a:r>
+              <a:rPr lang="fr-FR" sz="5400" b="1" dirty="0"/>
+              <a:t>Technique</a:t>
             </a:r>
           </a:p>
         </p:txBody>
@@ -7257,7 +7350,7 @@
     </p:spTree>
     <p:extLst>
       <p:ext uri="{BB962C8B-B14F-4D97-AF65-F5344CB8AC3E}">
-        <p14:creationId xmlns:p14="http://schemas.microsoft.com/office/powerpoint/2010/main" val="2509229958"/>
+        <p14:creationId xmlns:p14="http://schemas.microsoft.com/office/powerpoint/2010/main" val="155951835"/>
       </p:ext>
     </p:extLst>
   </p:cSld>
@@ -7289,7 +7382,7 @@
           <p:cNvPr id="2" name="Titre 1">
             <a:extLst>
               <a:ext uri="{FF2B5EF4-FFF2-40B4-BE49-F238E27FC236}">
-                <a16:creationId xmlns:a16="http://schemas.microsoft.com/office/drawing/2014/main" id="{8ABBF1C3-9DE8-4A87-AF53-D60821FD7C5E}"/>
+                <a16:creationId xmlns:a16="http://schemas.microsoft.com/office/drawing/2014/main" id="{C2F60A29-4E64-4EAA-A409-B78ACC7960C2}"/>
               </a:ext>
             </a:extLst>
           </p:cNvPr>
@@ -7307,7 +7400,7 @@
           <a:p>
             <a:r>
               <a:rPr lang="fr-FR" dirty="0"/>
-              <a:t>UML</a:t>
+              <a:t>Langage</a:t>
             </a:r>
           </a:p>
         </p:txBody>
@@ -7317,7 +7410,7 @@
           <p:cNvPr id="3" name="Espace réservé du contenu 2">
             <a:extLst>
               <a:ext uri="{FF2B5EF4-FFF2-40B4-BE49-F238E27FC236}">
-                <a16:creationId xmlns:a16="http://schemas.microsoft.com/office/drawing/2014/main" id="{52DE8C0A-9A29-4899-8C9F-0EF3B6952449}"/>
+                <a16:creationId xmlns:a16="http://schemas.microsoft.com/office/drawing/2014/main" id="{3A00E401-CAE3-45CA-8D65-438B44E28491}"/>
               </a:ext>
             </a:extLst>
           </p:cNvPr>
@@ -7335,7 +7428,7 @@
           <a:p>
             <a:r>
               <a:rPr lang="fr-FR" dirty="0"/>
-              <a:t>Ulrich</a:t>
+              <a:t>Allan</a:t>
             </a:r>
           </a:p>
         </p:txBody>
@@ -7343,7 +7436,7 @@
     </p:spTree>
     <p:extLst>
       <p:ext uri="{BB962C8B-B14F-4D97-AF65-F5344CB8AC3E}">
-        <p14:creationId xmlns:p14="http://schemas.microsoft.com/office/powerpoint/2010/main" val="3539923233"/>
+        <p14:creationId xmlns:p14="http://schemas.microsoft.com/office/powerpoint/2010/main" val="1628331343"/>
       </p:ext>
     </p:extLst>
   </p:cSld>
@@ -7375,7 +7468,7 @@
           <p:cNvPr id="2" name="Titre 1">
             <a:extLst>
               <a:ext uri="{FF2B5EF4-FFF2-40B4-BE49-F238E27FC236}">
-                <a16:creationId xmlns:a16="http://schemas.microsoft.com/office/drawing/2014/main" id="{93070180-E849-4CF5-A162-E86D881201EF}"/>
+                <a16:creationId xmlns:a16="http://schemas.microsoft.com/office/drawing/2014/main" id="{C6FF438A-F415-4ACE-B03B-4E3E1C1FB923}"/>
               </a:ext>
             </a:extLst>
           </p:cNvPr>
@@ -7393,7 +7486,7 @@
           <a:p>
             <a:r>
               <a:rPr lang="fr-FR" dirty="0"/>
-              <a:t>MCD</a:t>
+              <a:t>Outils</a:t>
             </a:r>
           </a:p>
         </p:txBody>
@@ -7403,7 +7496,7 @@
           <p:cNvPr id="3" name="Espace réservé du contenu 2">
             <a:extLst>
               <a:ext uri="{FF2B5EF4-FFF2-40B4-BE49-F238E27FC236}">
-                <a16:creationId xmlns:a16="http://schemas.microsoft.com/office/drawing/2014/main" id="{BBA321E4-D855-4AE1-B334-FBDCFEA00B5F}"/>
+                <a16:creationId xmlns:a16="http://schemas.microsoft.com/office/drawing/2014/main" id="{14B5F129-37B9-477C-BD40-2906CC3E93F7}"/>
               </a:ext>
             </a:extLst>
           </p:cNvPr>
@@ -7421,7 +7514,7 @@
           <a:p>
             <a:r>
               <a:rPr lang="fr-FR" dirty="0"/>
-              <a:t>Romain</a:t>
+              <a:t>Allan</a:t>
             </a:r>
           </a:p>
         </p:txBody>
@@ -7429,7 +7522,7 @@
     </p:spTree>
     <p:extLst>
       <p:ext uri="{BB962C8B-B14F-4D97-AF65-F5344CB8AC3E}">
-        <p14:creationId xmlns:p14="http://schemas.microsoft.com/office/powerpoint/2010/main" val="806132848"/>
+        <p14:creationId xmlns:p14="http://schemas.microsoft.com/office/powerpoint/2010/main" val="696368023"/>
       </p:ext>
     </p:extLst>
   </p:cSld>
@@ -7461,7 +7554,7 @@
           <p:cNvPr id="2" name="Titre 1">
             <a:extLst>
               <a:ext uri="{FF2B5EF4-FFF2-40B4-BE49-F238E27FC236}">
-                <a16:creationId xmlns:a16="http://schemas.microsoft.com/office/drawing/2014/main" id="{14D82790-1415-4BBA-8DB6-5B16D6043AD1}"/>
+                <a16:creationId xmlns:a16="http://schemas.microsoft.com/office/drawing/2014/main" id="{6C4477FA-CD64-4473-9CCC-2312506BBD7B}"/>
               </a:ext>
             </a:extLst>
           </p:cNvPr>
@@ -7479,7 +7572,7 @@
           <a:p>
             <a:r>
               <a:rPr lang="fr-FR" dirty="0"/>
-              <a:t>Déploiement</a:t>
+              <a:t>Architecture</a:t>
             </a:r>
           </a:p>
         </p:txBody>
@@ -7489,7 +7582,7 @@
           <p:cNvPr id="3" name="Espace réservé du contenu 2">
             <a:extLst>
               <a:ext uri="{FF2B5EF4-FFF2-40B4-BE49-F238E27FC236}">
-                <a16:creationId xmlns:a16="http://schemas.microsoft.com/office/drawing/2014/main" id="{D56D2AA2-5E45-4EB7-BA0E-428AAFF10052}"/>
+                <a16:creationId xmlns:a16="http://schemas.microsoft.com/office/drawing/2014/main" id="{EDED6002-3EB0-4AB7-9077-FB9646AC3294}"/>
               </a:ext>
             </a:extLst>
           </p:cNvPr>
@@ -7515,7 +7608,7 @@
     </p:spTree>
     <p:extLst>
       <p:ext uri="{BB962C8B-B14F-4D97-AF65-F5344CB8AC3E}">
-        <p14:creationId xmlns:p14="http://schemas.microsoft.com/office/powerpoint/2010/main" val="2879687095"/>
+        <p14:creationId xmlns:p14="http://schemas.microsoft.com/office/powerpoint/2010/main" val="2509229958"/>
       </p:ext>
     </p:extLst>
   </p:cSld>
@@ -7547,7 +7640,7 @@
           <p:cNvPr id="2" name="Titre 1">
             <a:extLst>
               <a:ext uri="{FF2B5EF4-FFF2-40B4-BE49-F238E27FC236}">
-                <a16:creationId xmlns:a16="http://schemas.microsoft.com/office/drawing/2014/main" id="{A1DD71D5-2663-B041-9836-791DD68948AB}"/>
+                <a16:creationId xmlns:a16="http://schemas.microsoft.com/office/drawing/2014/main" id="{8ABBF1C3-9DE8-4A87-AF53-D60821FD7C5E}"/>
               </a:ext>
             </a:extLst>
           </p:cNvPr>
@@ -7558,30 +7651,50 @@
             <p:ph type="title"/>
           </p:nvPr>
         </p:nvSpPr>
-        <p:spPr>
-          <a:xfrm>
-            <a:off x="1086643" y="236220"/>
-            <a:ext cx="10018713" cy="1752599"/>
-          </a:xfrm>
-        </p:spPr>
-        <p:txBody>
-          <a:bodyPr>
-            <a:normAutofit/>
-          </a:bodyPr>
-          <a:lstStyle/>
-          <a:p>
-            <a:r>
-              <a:rPr lang="fr-FR" sz="5400" b="1" dirty="0" err="1"/>
-              <a:t>Demonstration</a:t>
-            </a:r>
-            <a:endParaRPr lang="fr-FR" sz="5400" b="1" dirty="0"/>
+        <p:spPr/>
+        <p:txBody>
+          <a:bodyPr/>
+          <a:lstStyle/>
+          <a:p>
+            <a:r>
+              <a:rPr lang="fr-FR" dirty="0"/>
+              <a:t>UML</a:t>
+            </a:r>
+          </a:p>
+        </p:txBody>
+      </p:sp>
+      <p:sp>
+        <p:nvSpPr>
+          <p:cNvPr id="3" name="Espace réservé du contenu 2">
+            <a:extLst>
+              <a:ext uri="{FF2B5EF4-FFF2-40B4-BE49-F238E27FC236}">
+                <a16:creationId xmlns:a16="http://schemas.microsoft.com/office/drawing/2014/main" id="{52DE8C0A-9A29-4899-8C9F-0EF3B6952449}"/>
+              </a:ext>
+            </a:extLst>
+          </p:cNvPr>
+          <p:cNvSpPr>
+            <a:spLocks noGrp="1"/>
+          </p:cNvSpPr>
+          <p:nvPr>
+            <p:ph idx="1"/>
+          </p:nvPr>
+        </p:nvSpPr>
+        <p:spPr/>
+        <p:txBody>
+          <a:bodyPr/>
+          <a:lstStyle/>
+          <a:p>
+            <a:r>
+              <a:rPr lang="fr-FR" dirty="0"/>
+              <a:t>Ulrich</a:t>
+            </a:r>
           </a:p>
         </p:txBody>
       </p:sp>
     </p:spTree>
     <p:extLst>
       <p:ext uri="{BB962C8B-B14F-4D97-AF65-F5344CB8AC3E}">
-        <p14:creationId xmlns:p14="http://schemas.microsoft.com/office/powerpoint/2010/main" val="3824966344"/>
+        <p14:creationId xmlns:p14="http://schemas.microsoft.com/office/powerpoint/2010/main" val="3539923233"/>
       </p:ext>
     </p:extLst>
   </p:cSld>
@@ -7613,7 +7726,7 @@
           <p:cNvPr id="2" name="Titre 1">
             <a:extLst>
               <a:ext uri="{FF2B5EF4-FFF2-40B4-BE49-F238E27FC236}">
-                <a16:creationId xmlns:a16="http://schemas.microsoft.com/office/drawing/2014/main" id="{A1DD71D5-2663-B041-9836-791DD68948AB}"/>
+                <a16:creationId xmlns:a16="http://schemas.microsoft.com/office/drawing/2014/main" id="{93070180-E849-4CF5-A162-E86D881201EF}"/>
               </a:ext>
             </a:extLst>
           </p:cNvPr>
@@ -7624,21 +7737,42 @@
             <p:ph type="title"/>
           </p:nvPr>
         </p:nvSpPr>
-        <p:spPr>
-          <a:xfrm>
-            <a:off x="1086643" y="236220"/>
-            <a:ext cx="10018713" cy="1752599"/>
-          </a:xfrm>
-        </p:spPr>
-        <p:txBody>
-          <a:bodyPr>
-            <a:normAutofit/>
-          </a:bodyPr>
-          <a:lstStyle/>
-          <a:p>
-            <a:r>
-              <a:rPr lang="fr-FR" sz="5400" b="1" dirty="0"/>
-              <a:t>Maintenance</a:t>
+        <p:spPr/>
+        <p:txBody>
+          <a:bodyPr/>
+          <a:lstStyle/>
+          <a:p>
+            <a:r>
+              <a:rPr lang="fr-FR" dirty="0"/>
+              <a:t>MCD</a:t>
+            </a:r>
+          </a:p>
+        </p:txBody>
+      </p:sp>
+      <p:sp>
+        <p:nvSpPr>
+          <p:cNvPr id="3" name="Espace réservé du contenu 2">
+            <a:extLst>
+              <a:ext uri="{FF2B5EF4-FFF2-40B4-BE49-F238E27FC236}">
+                <a16:creationId xmlns:a16="http://schemas.microsoft.com/office/drawing/2014/main" id="{BBA321E4-D855-4AE1-B334-FBDCFEA00B5F}"/>
+              </a:ext>
+            </a:extLst>
+          </p:cNvPr>
+          <p:cNvSpPr>
+            <a:spLocks noGrp="1"/>
+          </p:cNvSpPr>
+          <p:nvPr>
+            <p:ph idx="1"/>
+          </p:nvPr>
+        </p:nvSpPr>
+        <p:spPr/>
+        <p:txBody>
+          <a:bodyPr/>
+          <a:lstStyle/>
+          <a:p>
+            <a:r>
+              <a:rPr lang="fr-FR" dirty="0"/>
+              <a:t>Romain</a:t>
             </a:r>
           </a:p>
         </p:txBody>
@@ -7646,7 +7780,7 @@
     </p:spTree>
     <p:extLst>
       <p:ext uri="{BB962C8B-B14F-4D97-AF65-F5344CB8AC3E}">
-        <p14:creationId xmlns:p14="http://schemas.microsoft.com/office/powerpoint/2010/main" val="598889089"/>
+        <p14:creationId xmlns:p14="http://schemas.microsoft.com/office/powerpoint/2010/main" val="806132848"/>
       </p:ext>
     </p:extLst>
   </p:cSld>
@@ -7678,7 +7812,7 @@
           <p:cNvPr id="2" name="Titre 1">
             <a:extLst>
               <a:ext uri="{FF2B5EF4-FFF2-40B4-BE49-F238E27FC236}">
-                <a16:creationId xmlns:a16="http://schemas.microsoft.com/office/drawing/2014/main" id="{0C26DE45-CE50-4464-90E6-A83DAA086339}"/>
+                <a16:creationId xmlns:a16="http://schemas.microsoft.com/office/drawing/2014/main" id="{14D82790-1415-4BBA-8DB6-5B16D6043AD1}"/>
               </a:ext>
             </a:extLst>
           </p:cNvPr>
@@ -7696,7 +7830,7 @@
           <a:p>
             <a:r>
               <a:rPr lang="fr-FR" dirty="0"/>
-              <a:t>PRA/PCA</a:t>
+              <a:t>Déploiement</a:t>
             </a:r>
           </a:p>
         </p:txBody>
@@ -7706,7 +7840,7 @@
           <p:cNvPr id="3" name="Espace réservé du contenu 2">
             <a:extLst>
               <a:ext uri="{FF2B5EF4-FFF2-40B4-BE49-F238E27FC236}">
-                <a16:creationId xmlns:a16="http://schemas.microsoft.com/office/drawing/2014/main" id="{704D4CA5-D3B7-4DE6-8EFC-1225710712F3}"/>
+                <a16:creationId xmlns:a16="http://schemas.microsoft.com/office/drawing/2014/main" id="{D56D2AA2-5E45-4EB7-BA0E-428AAFF10052}"/>
               </a:ext>
             </a:extLst>
           </p:cNvPr>
@@ -7732,7 +7866,7 @@
     </p:spTree>
     <p:extLst>
       <p:ext uri="{BB962C8B-B14F-4D97-AF65-F5344CB8AC3E}">
-        <p14:creationId xmlns:p14="http://schemas.microsoft.com/office/powerpoint/2010/main" val="1778731688"/>
+        <p14:creationId xmlns:p14="http://schemas.microsoft.com/office/powerpoint/2010/main" val="2879687095"/>
       </p:ext>
     </p:extLst>
   </p:cSld>
@@ -7857,7 +7991,7 @@
           <p:cNvPr id="2" name="Titre 1">
             <a:extLst>
               <a:ext uri="{FF2B5EF4-FFF2-40B4-BE49-F238E27FC236}">
-                <a16:creationId xmlns:a16="http://schemas.microsoft.com/office/drawing/2014/main" id="{14D82790-1415-4BBA-8DB6-5B16D6043AD1}"/>
+                <a16:creationId xmlns:a16="http://schemas.microsoft.com/office/drawing/2014/main" id="{A1DD71D5-2663-B041-9836-791DD68948AB}"/>
               </a:ext>
             </a:extLst>
           </p:cNvPr>
@@ -7868,50 +8002,30 @@
             <p:ph type="title"/>
           </p:nvPr>
         </p:nvSpPr>
-        <p:spPr/>
-        <p:txBody>
-          <a:bodyPr/>
-          <a:lstStyle/>
-          <a:p>
-            <a:r>
-              <a:rPr lang="fr-FR" dirty="0"/>
-              <a:t>Support/Demande d'évolution</a:t>
-            </a:r>
-          </a:p>
-        </p:txBody>
-      </p:sp>
-      <p:sp>
-        <p:nvSpPr>
-          <p:cNvPr id="3" name="Espace réservé du contenu 2">
-            <a:extLst>
-              <a:ext uri="{FF2B5EF4-FFF2-40B4-BE49-F238E27FC236}">
-                <a16:creationId xmlns:a16="http://schemas.microsoft.com/office/drawing/2014/main" id="{D56D2AA2-5E45-4EB7-BA0E-428AAFF10052}"/>
-              </a:ext>
-            </a:extLst>
-          </p:cNvPr>
-          <p:cNvSpPr>
-            <a:spLocks noGrp="1"/>
-          </p:cNvSpPr>
-          <p:nvPr>
-            <p:ph idx="1"/>
-          </p:nvPr>
-        </p:nvSpPr>
-        <p:spPr/>
-        <p:txBody>
-          <a:bodyPr/>
-          <a:lstStyle/>
-          <a:p>
-            <a:r>
-              <a:rPr lang="fr-FR" dirty="0"/>
-              <a:t>Romain</a:t>
-            </a:r>
+        <p:spPr>
+          <a:xfrm>
+            <a:off x="1086643" y="236220"/>
+            <a:ext cx="10018713" cy="1752599"/>
+          </a:xfrm>
+        </p:spPr>
+        <p:txBody>
+          <a:bodyPr>
+            <a:normAutofit/>
+          </a:bodyPr>
+          <a:lstStyle/>
+          <a:p>
+            <a:r>
+              <a:rPr lang="fr-FR" sz="5400" b="1" dirty="0" err="1"/>
+              <a:t>Demonstration</a:t>
+            </a:r>
+            <a:endParaRPr lang="fr-FR" sz="5400" b="1" dirty="0"/>
           </a:p>
         </p:txBody>
       </p:sp>
     </p:spTree>
     <p:extLst>
       <p:ext uri="{BB962C8B-B14F-4D97-AF65-F5344CB8AC3E}">
-        <p14:creationId xmlns:p14="http://schemas.microsoft.com/office/powerpoint/2010/main" val="300817343"/>
+        <p14:creationId xmlns:p14="http://schemas.microsoft.com/office/powerpoint/2010/main" val="3824966344"/>
       </p:ext>
     </p:extLst>
   </p:cSld>
@@ -7943,7 +8057,7 @@
           <p:cNvPr id="2" name="Titre 1">
             <a:extLst>
               <a:ext uri="{FF2B5EF4-FFF2-40B4-BE49-F238E27FC236}">
-                <a16:creationId xmlns:a16="http://schemas.microsoft.com/office/drawing/2014/main" id="{D639027B-149E-42D7-8474-5344A48396ED}"/>
+                <a16:creationId xmlns:a16="http://schemas.microsoft.com/office/drawing/2014/main" id="{A1DD71D5-2663-B041-9836-791DD68948AB}"/>
               </a:ext>
             </a:extLst>
           </p:cNvPr>
@@ -7954,42 +8068,21 @@
             <p:ph type="title"/>
           </p:nvPr>
         </p:nvSpPr>
-        <p:spPr/>
-        <p:txBody>
-          <a:bodyPr/>
-          <a:lstStyle/>
-          <a:p>
-            <a:r>
-              <a:rPr lang="fr-FR" dirty="0"/>
-              <a:t>Formation</a:t>
-            </a:r>
-          </a:p>
-        </p:txBody>
-      </p:sp>
-      <p:sp>
-        <p:nvSpPr>
-          <p:cNvPr id="3" name="Espace réservé du contenu 2">
-            <a:extLst>
-              <a:ext uri="{FF2B5EF4-FFF2-40B4-BE49-F238E27FC236}">
-                <a16:creationId xmlns:a16="http://schemas.microsoft.com/office/drawing/2014/main" id="{A19867AC-A518-4A3B-980B-0851F728885D}"/>
-              </a:ext>
-            </a:extLst>
-          </p:cNvPr>
-          <p:cNvSpPr>
-            <a:spLocks noGrp="1"/>
-          </p:cNvSpPr>
-          <p:nvPr>
-            <p:ph idx="1"/>
-          </p:nvPr>
-        </p:nvSpPr>
-        <p:spPr/>
-        <p:txBody>
-          <a:bodyPr/>
-          <a:lstStyle/>
-          <a:p>
-            <a:r>
-              <a:rPr lang="fr-FR" dirty="0"/>
-              <a:t>Ulrich</a:t>
+        <p:spPr>
+          <a:xfrm>
+            <a:off x="1086643" y="236220"/>
+            <a:ext cx="10018713" cy="1752599"/>
+          </a:xfrm>
+        </p:spPr>
+        <p:txBody>
+          <a:bodyPr>
+            <a:normAutofit/>
+          </a:bodyPr>
+          <a:lstStyle/>
+          <a:p>
+            <a:r>
+              <a:rPr lang="fr-FR" sz="5400" b="1" dirty="0"/>
+              <a:t>Maintenance</a:t>
             </a:r>
           </a:p>
         </p:txBody>
@@ -7997,7 +8090,7 @@
     </p:spTree>
     <p:extLst>
       <p:ext uri="{BB962C8B-B14F-4D97-AF65-F5344CB8AC3E}">
-        <p14:creationId xmlns:p14="http://schemas.microsoft.com/office/powerpoint/2010/main" val="2289876067"/>
+        <p14:creationId xmlns:p14="http://schemas.microsoft.com/office/powerpoint/2010/main" val="598889089"/>
       </p:ext>
     </p:extLst>
   </p:cSld>
@@ -8029,7 +8122,7 @@
           <p:cNvPr id="2" name="Titre 1">
             <a:extLst>
               <a:ext uri="{FF2B5EF4-FFF2-40B4-BE49-F238E27FC236}">
-                <a16:creationId xmlns:a16="http://schemas.microsoft.com/office/drawing/2014/main" id="{A1DD71D5-2663-B041-9836-791DD68948AB}"/>
+                <a16:creationId xmlns:a16="http://schemas.microsoft.com/office/drawing/2014/main" id="{0C26DE45-CE50-4464-90E6-A83DAA086339}"/>
               </a:ext>
             </a:extLst>
           </p:cNvPr>
@@ -8040,21 +8133,42 @@
             <p:ph type="title"/>
           </p:nvPr>
         </p:nvSpPr>
-        <p:spPr>
-          <a:xfrm>
-            <a:off x="1086643" y="236220"/>
-            <a:ext cx="10018713" cy="1752599"/>
-          </a:xfrm>
-        </p:spPr>
-        <p:txBody>
-          <a:bodyPr>
-            <a:normAutofit/>
-          </a:bodyPr>
-          <a:lstStyle/>
-          <a:p>
-            <a:r>
-              <a:rPr lang="fr-FR" sz="5400" b="1" dirty="0"/>
-              <a:t>Clôture de projet</a:t>
+        <p:spPr/>
+        <p:txBody>
+          <a:bodyPr/>
+          <a:lstStyle/>
+          <a:p>
+            <a:r>
+              <a:rPr lang="fr-FR" dirty="0"/>
+              <a:t>PRA/PCA</a:t>
+            </a:r>
+          </a:p>
+        </p:txBody>
+      </p:sp>
+      <p:sp>
+        <p:nvSpPr>
+          <p:cNvPr id="3" name="Espace réservé du contenu 2">
+            <a:extLst>
+              <a:ext uri="{FF2B5EF4-FFF2-40B4-BE49-F238E27FC236}">
+                <a16:creationId xmlns:a16="http://schemas.microsoft.com/office/drawing/2014/main" id="{704D4CA5-D3B7-4DE6-8EFC-1225710712F3}"/>
+              </a:ext>
+            </a:extLst>
+          </p:cNvPr>
+          <p:cNvSpPr>
+            <a:spLocks noGrp="1"/>
+          </p:cNvSpPr>
+          <p:nvPr>
+            <p:ph idx="1"/>
+          </p:nvPr>
+        </p:nvSpPr>
+        <p:spPr/>
+        <p:txBody>
+          <a:bodyPr/>
+          <a:lstStyle/>
+          <a:p>
+            <a:r>
+              <a:rPr lang="fr-FR" dirty="0"/>
+              <a:t>Allan</a:t>
             </a:r>
           </a:p>
         </p:txBody>
@@ -8062,7 +8176,7 @@
     </p:spTree>
     <p:extLst>
       <p:ext uri="{BB962C8B-B14F-4D97-AF65-F5344CB8AC3E}">
-        <p14:creationId xmlns:p14="http://schemas.microsoft.com/office/powerpoint/2010/main" val="610667150"/>
+        <p14:creationId xmlns:p14="http://schemas.microsoft.com/office/powerpoint/2010/main" val="1778731688"/>
       </p:ext>
     </p:extLst>
   </p:cSld>
@@ -8094,7 +8208,7 @@
           <p:cNvPr id="2" name="Titre 1">
             <a:extLst>
               <a:ext uri="{FF2B5EF4-FFF2-40B4-BE49-F238E27FC236}">
-                <a16:creationId xmlns:a16="http://schemas.microsoft.com/office/drawing/2014/main" id="{EADADCE4-51D1-4185-916D-A3FF21A77835}"/>
+                <a16:creationId xmlns:a16="http://schemas.microsoft.com/office/drawing/2014/main" id="{14D82790-1415-4BBA-8DB6-5B16D6043AD1}"/>
               </a:ext>
             </a:extLst>
           </p:cNvPr>
@@ -8112,7 +8226,7 @@
           <a:p>
             <a:r>
               <a:rPr lang="fr-FR" dirty="0"/>
-              <a:t>Planning Final</a:t>
+              <a:t>Support/Demande d'évolution</a:t>
             </a:r>
           </a:p>
         </p:txBody>
@@ -8122,7 +8236,7 @@
           <p:cNvPr id="3" name="Espace réservé du contenu 2">
             <a:extLst>
               <a:ext uri="{FF2B5EF4-FFF2-40B4-BE49-F238E27FC236}">
-                <a16:creationId xmlns:a16="http://schemas.microsoft.com/office/drawing/2014/main" id="{A812E78B-25DC-4687-B46F-45D73BCF810D}"/>
+                <a16:creationId xmlns:a16="http://schemas.microsoft.com/office/drawing/2014/main" id="{D56D2AA2-5E45-4EB7-BA0E-428AAFF10052}"/>
               </a:ext>
             </a:extLst>
           </p:cNvPr>
@@ -8148,7 +8262,7 @@
     </p:spTree>
     <p:extLst>
       <p:ext uri="{BB962C8B-B14F-4D97-AF65-F5344CB8AC3E}">
-        <p14:creationId xmlns:p14="http://schemas.microsoft.com/office/powerpoint/2010/main" val="64621286"/>
+        <p14:creationId xmlns:p14="http://schemas.microsoft.com/office/powerpoint/2010/main" val="300817343"/>
       </p:ext>
     </p:extLst>
   </p:cSld>
@@ -8180,7 +8294,7 @@
           <p:cNvPr id="2" name="Titre 1">
             <a:extLst>
               <a:ext uri="{FF2B5EF4-FFF2-40B4-BE49-F238E27FC236}">
-                <a16:creationId xmlns:a16="http://schemas.microsoft.com/office/drawing/2014/main" id="{353942F7-D71A-49F2-8C04-7804B7F82C00}"/>
+                <a16:creationId xmlns:a16="http://schemas.microsoft.com/office/drawing/2014/main" id="{D639027B-149E-42D7-8474-5344A48396ED}"/>
               </a:ext>
             </a:extLst>
           </p:cNvPr>
@@ -8198,7 +8312,7 @@
           <a:p>
             <a:r>
               <a:rPr lang="fr-FR" dirty="0"/>
-              <a:t>Budget</a:t>
+              <a:t>Formation</a:t>
             </a:r>
           </a:p>
         </p:txBody>
@@ -8208,7 +8322,7 @@
           <p:cNvPr id="3" name="Espace réservé du contenu 2">
             <a:extLst>
               <a:ext uri="{FF2B5EF4-FFF2-40B4-BE49-F238E27FC236}">
-                <a16:creationId xmlns:a16="http://schemas.microsoft.com/office/drawing/2014/main" id="{89318577-C2F8-4D99-A387-D5DDEE279A21}"/>
+                <a16:creationId xmlns:a16="http://schemas.microsoft.com/office/drawing/2014/main" id="{A19867AC-A518-4A3B-980B-0851F728885D}"/>
               </a:ext>
             </a:extLst>
           </p:cNvPr>
@@ -8234,7 +8348,7 @@
     </p:spTree>
     <p:extLst>
       <p:ext uri="{BB962C8B-B14F-4D97-AF65-F5344CB8AC3E}">
-        <p14:creationId xmlns:p14="http://schemas.microsoft.com/office/powerpoint/2010/main" val="2138315123"/>
+        <p14:creationId xmlns:p14="http://schemas.microsoft.com/office/powerpoint/2010/main" val="2289876067"/>
       </p:ext>
     </p:extLst>
   </p:cSld>
@@ -8266,7 +8380,7 @@
           <p:cNvPr id="2" name="Titre 1">
             <a:extLst>
               <a:ext uri="{FF2B5EF4-FFF2-40B4-BE49-F238E27FC236}">
-                <a16:creationId xmlns:a16="http://schemas.microsoft.com/office/drawing/2014/main" id="{18015CD5-9FED-4659-96EF-C5F5DA0912CB}"/>
+                <a16:creationId xmlns:a16="http://schemas.microsoft.com/office/drawing/2014/main" id="{A1DD71D5-2663-B041-9836-791DD68948AB}"/>
               </a:ext>
             </a:extLst>
           </p:cNvPr>
@@ -8277,42 +8391,21 @@
             <p:ph type="title"/>
           </p:nvPr>
         </p:nvSpPr>
-        <p:spPr/>
-        <p:txBody>
-          <a:bodyPr/>
-          <a:lstStyle/>
-          <a:p>
-            <a:r>
-              <a:rPr lang="fr-FR" dirty="0"/>
-              <a:t>Indicateurs</a:t>
-            </a:r>
-          </a:p>
-        </p:txBody>
-      </p:sp>
-      <p:sp>
-        <p:nvSpPr>
-          <p:cNvPr id="3" name="Espace réservé du contenu 2">
-            <a:extLst>
-              <a:ext uri="{FF2B5EF4-FFF2-40B4-BE49-F238E27FC236}">
-                <a16:creationId xmlns:a16="http://schemas.microsoft.com/office/drawing/2014/main" id="{38B4C681-5FF3-4E57-B678-1163312F7F18}"/>
-              </a:ext>
-            </a:extLst>
-          </p:cNvPr>
-          <p:cNvSpPr>
-            <a:spLocks noGrp="1"/>
-          </p:cNvSpPr>
-          <p:nvPr>
-            <p:ph idx="1"/>
-          </p:nvPr>
-        </p:nvSpPr>
-        <p:spPr/>
-        <p:txBody>
-          <a:bodyPr/>
-          <a:lstStyle/>
-          <a:p>
-            <a:r>
-              <a:rPr lang="fr-FR" dirty="0"/>
-              <a:t>Romain</a:t>
+        <p:spPr>
+          <a:xfrm>
+            <a:off x="1086643" y="236220"/>
+            <a:ext cx="10018713" cy="1752599"/>
+          </a:xfrm>
+        </p:spPr>
+        <p:txBody>
+          <a:bodyPr>
+            <a:normAutofit/>
+          </a:bodyPr>
+          <a:lstStyle/>
+          <a:p>
+            <a:r>
+              <a:rPr lang="fr-FR" sz="5400" b="1" dirty="0"/>
+              <a:t>Clôture de projet</a:t>
             </a:r>
           </a:p>
         </p:txBody>
@@ -8320,7 +8413,7 @@
     </p:spTree>
     <p:extLst>
       <p:ext uri="{BB962C8B-B14F-4D97-AF65-F5344CB8AC3E}">
-        <p14:creationId xmlns:p14="http://schemas.microsoft.com/office/powerpoint/2010/main" val="3767110654"/>
+        <p14:creationId xmlns:p14="http://schemas.microsoft.com/office/powerpoint/2010/main" val="610667150"/>
       </p:ext>
     </p:extLst>
   </p:cSld>
@@ -8352,7 +8445,7 @@
           <p:cNvPr id="2" name="Titre 1">
             <a:extLst>
               <a:ext uri="{FF2B5EF4-FFF2-40B4-BE49-F238E27FC236}">
-                <a16:creationId xmlns:a16="http://schemas.microsoft.com/office/drawing/2014/main" id="{25FAE84C-A7DC-404A-92F0-376655844FD3}"/>
+                <a16:creationId xmlns:a16="http://schemas.microsoft.com/office/drawing/2014/main" id="{EADADCE4-51D1-4185-916D-A3FF21A77835}"/>
               </a:ext>
             </a:extLst>
           </p:cNvPr>
@@ -8370,7 +8463,7 @@
           <a:p>
             <a:r>
               <a:rPr lang="fr-FR" dirty="0"/>
-              <a:t>COVID-19</a:t>
+              <a:t>Planning Final</a:t>
             </a:r>
           </a:p>
         </p:txBody>
@@ -8380,7 +8473,7 @@
           <p:cNvPr id="3" name="Espace réservé du contenu 2">
             <a:extLst>
               <a:ext uri="{FF2B5EF4-FFF2-40B4-BE49-F238E27FC236}">
-                <a16:creationId xmlns:a16="http://schemas.microsoft.com/office/drawing/2014/main" id="{B6EAF4FE-2019-493A-BC9D-0C03CEDBB67F}"/>
+                <a16:creationId xmlns:a16="http://schemas.microsoft.com/office/drawing/2014/main" id="{A812E78B-25DC-4687-B46F-45D73BCF810D}"/>
               </a:ext>
             </a:extLst>
           </p:cNvPr>
@@ -8397,17 +8490,16 @@
           <a:lstStyle/>
           <a:p>
             <a:r>
-              <a:rPr lang="fr-FR" dirty="0" err="1"/>
-              <a:t>Valou</a:t>
-            </a:r>
-            <a:endParaRPr lang="fr-FR" dirty="0"/>
+              <a:rPr lang="fr-FR" dirty="0"/>
+              <a:t>Romain</a:t>
+            </a:r>
           </a:p>
         </p:txBody>
       </p:sp>
     </p:spTree>
     <p:extLst>
       <p:ext uri="{BB962C8B-B14F-4D97-AF65-F5344CB8AC3E}">
-        <p14:creationId xmlns:p14="http://schemas.microsoft.com/office/powerpoint/2010/main" val="2057923470"/>
+        <p14:creationId xmlns:p14="http://schemas.microsoft.com/office/powerpoint/2010/main" val="64621286"/>
       </p:ext>
     </p:extLst>
   </p:cSld>
@@ -8439,7 +8531,7 @@
           <p:cNvPr id="2" name="Titre 1">
             <a:extLst>
               <a:ext uri="{FF2B5EF4-FFF2-40B4-BE49-F238E27FC236}">
-                <a16:creationId xmlns:a16="http://schemas.microsoft.com/office/drawing/2014/main" id="{AAE16FDE-1420-4490-BF39-FEA497428E68}"/>
+                <a16:creationId xmlns:a16="http://schemas.microsoft.com/office/drawing/2014/main" id="{353942F7-D71A-49F2-8C04-7804B7F82C00}"/>
               </a:ext>
             </a:extLst>
           </p:cNvPr>
@@ -8457,7 +8549,7 @@
           <a:p>
             <a:r>
               <a:rPr lang="fr-FR" dirty="0"/>
-              <a:t>REX MADERA</a:t>
+              <a:t>Budget</a:t>
             </a:r>
           </a:p>
         </p:txBody>
@@ -8467,7 +8559,7 @@
           <p:cNvPr id="3" name="Espace réservé du contenu 2">
             <a:extLst>
               <a:ext uri="{FF2B5EF4-FFF2-40B4-BE49-F238E27FC236}">
-                <a16:creationId xmlns:a16="http://schemas.microsoft.com/office/drawing/2014/main" id="{B969E691-13B5-448F-A683-3388DE5F52FB}"/>
+                <a16:creationId xmlns:a16="http://schemas.microsoft.com/office/drawing/2014/main" id="{89318577-C2F8-4D99-A387-D5DDEE279A21}"/>
               </a:ext>
             </a:extLst>
           </p:cNvPr>
@@ -8485,7 +8577,7 @@
           <a:p>
             <a:r>
               <a:rPr lang="fr-FR" dirty="0"/>
-              <a:t>TOUT LE MONDE (Slide -&gt; NOM)</a:t>
+              <a:t>Ulrich</a:t>
             </a:r>
           </a:p>
         </p:txBody>
@@ -8493,7 +8585,7 @@
     </p:spTree>
     <p:extLst>
       <p:ext uri="{BB962C8B-B14F-4D97-AF65-F5344CB8AC3E}">
-        <p14:creationId xmlns:p14="http://schemas.microsoft.com/office/powerpoint/2010/main" val="1280301743"/>
+        <p14:creationId xmlns:p14="http://schemas.microsoft.com/office/powerpoint/2010/main" val="2138315123"/>
       </p:ext>
     </p:extLst>
   </p:cSld>
@@ -8525,7 +8617,7 @@
           <p:cNvPr id="2" name="Titre 1">
             <a:extLst>
               <a:ext uri="{FF2B5EF4-FFF2-40B4-BE49-F238E27FC236}">
-                <a16:creationId xmlns:a16="http://schemas.microsoft.com/office/drawing/2014/main" id="{C66F5317-EF2D-497F-B4B1-095EEF05E1F3}"/>
+                <a16:creationId xmlns:a16="http://schemas.microsoft.com/office/drawing/2014/main" id="{18015CD5-9FED-4659-96EF-C5F5DA0912CB}"/>
               </a:ext>
             </a:extLst>
           </p:cNvPr>
@@ -8543,7 +8635,7 @@
           <a:p>
             <a:r>
               <a:rPr lang="fr-FR" dirty="0"/>
-              <a:t>REX Etudiant</a:t>
+              <a:t>Indicateurs</a:t>
             </a:r>
           </a:p>
         </p:txBody>
@@ -8553,7 +8645,7 @@
           <p:cNvPr id="3" name="Espace réservé du contenu 2">
             <a:extLst>
               <a:ext uri="{FF2B5EF4-FFF2-40B4-BE49-F238E27FC236}">
-                <a16:creationId xmlns:a16="http://schemas.microsoft.com/office/drawing/2014/main" id="{DAADFC33-325F-42BD-B351-17C2A855DC38}"/>
+                <a16:creationId xmlns:a16="http://schemas.microsoft.com/office/drawing/2014/main" id="{38B4C681-5FF3-4E57-B678-1163312F7F18}"/>
               </a:ext>
             </a:extLst>
           </p:cNvPr>
@@ -8571,7 +8663,7 @@
           <a:p>
             <a:r>
               <a:rPr lang="fr-FR" dirty="0"/>
-              <a:t>TOUT LE MONDE (Slide -&gt; NOM)</a:t>
+              <a:t>Romain</a:t>
             </a:r>
           </a:p>
         </p:txBody>
@@ -8579,7 +8671,94 @@
     </p:spTree>
     <p:extLst>
       <p:ext uri="{BB962C8B-B14F-4D97-AF65-F5344CB8AC3E}">
-        <p14:creationId xmlns:p14="http://schemas.microsoft.com/office/powerpoint/2010/main" val="3088040785"/>
+        <p14:creationId xmlns:p14="http://schemas.microsoft.com/office/powerpoint/2010/main" val="3767110654"/>
+      </p:ext>
+    </p:extLst>
+  </p:cSld>
+  <p:clrMapOvr>
+    <a:masterClrMapping/>
+  </p:clrMapOvr>
+</p:sld>
+</file>
+
+<file path=ppt/slides/slide29.xml><?xml version="1.0" encoding="utf-8"?>
+<p:sld xmlns:a="http://schemas.openxmlformats.org/drawingml/2006/main" xmlns:r="http://schemas.openxmlformats.org/officeDocument/2006/relationships" xmlns:p="http://schemas.openxmlformats.org/presentationml/2006/main">
+  <p:cSld>
+    <p:spTree>
+      <p:nvGrpSpPr>
+        <p:cNvPr id="1" name=""/>
+        <p:cNvGrpSpPr/>
+        <p:nvPr/>
+      </p:nvGrpSpPr>
+      <p:grpSpPr>
+        <a:xfrm>
+          <a:off x="0" y="0"/>
+          <a:ext cx="0" cy="0"/>
+          <a:chOff x="0" y="0"/>
+          <a:chExt cx="0" cy="0"/>
+        </a:xfrm>
+      </p:grpSpPr>
+      <p:sp>
+        <p:nvSpPr>
+          <p:cNvPr id="2" name="Titre 1">
+            <a:extLst>
+              <a:ext uri="{FF2B5EF4-FFF2-40B4-BE49-F238E27FC236}">
+                <a16:creationId xmlns:a16="http://schemas.microsoft.com/office/drawing/2014/main" id="{25FAE84C-A7DC-404A-92F0-376655844FD3}"/>
+              </a:ext>
+            </a:extLst>
+          </p:cNvPr>
+          <p:cNvSpPr>
+            <a:spLocks noGrp="1"/>
+          </p:cNvSpPr>
+          <p:nvPr>
+            <p:ph type="title"/>
+          </p:nvPr>
+        </p:nvSpPr>
+        <p:spPr/>
+        <p:txBody>
+          <a:bodyPr/>
+          <a:lstStyle/>
+          <a:p>
+            <a:r>
+              <a:rPr lang="fr-FR" dirty="0"/>
+              <a:t>COVID-19</a:t>
+            </a:r>
+          </a:p>
+        </p:txBody>
+      </p:sp>
+      <p:sp>
+        <p:nvSpPr>
+          <p:cNvPr id="3" name="Espace réservé du contenu 2">
+            <a:extLst>
+              <a:ext uri="{FF2B5EF4-FFF2-40B4-BE49-F238E27FC236}">
+                <a16:creationId xmlns:a16="http://schemas.microsoft.com/office/drawing/2014/main" id="{B6EAF4FE-2019-493A-BC9D-0C03CEDBB67F}"/>
+              </a:ext>
+            </a:extLst>
+          </p:cNvPr>
+          <p:cNvSpPr>
+            <a:spLocks noGrp="1"/>
+          </p:cNvSpPr>
+          <p:nvPr>
+            <p:ph idx="1"/>
+          </p:nvPr>
+        </p:nvSpPr>
+        <p:spPr/>
+        <p:txBody>
+          <a:bodyPr/>
+          <a:lstStyle/>
+          <a:p>
+            <a:r>
+              <a:rPr lang="fr-FR" dirty="0" err="1"/>
+              <a:t>Valou</a:t>
+            </a:r>
+            <a:endParaRPr lang="fr-FR" dirty="0"/>
+          </a:p>
+        </p:txBody>
+      </p:sp>
+    </p:spTree>
+    <p:extLst>
+      <p:ext uri="{BB962C8B-B14F-4D97-AF65-F5344CB8AC3E}">
+        <p14:creationId xmlns:p14="http://schemas.microsoft.com/office/powerpoint/2010/main" val="2057923470"/>
       </p:ext>
     </p:extLst>
   </p:cSld>
@@ -8645,6 +8824,178 @@
     <p:extLst>
       <p:ext uri="{BB962C8B-B14F-4D97-AF65-F5344CB8AC3E}">
         <p14:creationId xmlns:p14="http://schemas.microsoft.com/office/powerpoint/2010/main" val="2756116359"/>
+      </p:ext>
+    </p:extLst>
+  </p:cSld>
+  <p:clrMapOvr>
+    <a:masterClrMapping/>
+  </p:clrMapOvr>
+</p:sld>
+</file>
+
+<file path=ppt/slides/slide30.xml><?xml version="1.0" encoding="utf-8"?>
+<p:sld xmlns:a="http://schemas.openxmlformats.org/drawingml/2006/main" xmlns:r="http://schemas.openxmlformats.org/officeDocument/2006/relationships" xmlns:p="http://schemas.openxmlformats.org/presentationml/2006/main">
+  <p:cSld>
+    <p:spTree>
+      <p:nvGrpSpPr>
+        <p:cNvPr id="1" name=""/>
+        <p:cNvGrpSpPr/>
+        <p:nvPr/>
+      </p:nvGrpSpPr>
+      <p:grpSpPr>
+        <a:xfrm>
+          <a:off x="0" y="0"/>
+          <a:ext cx="0" cy="0"/>
+          <a:chOff x="0" y="0"/>
+          <a:chExt cx="0" cy="0"/>
+        </a:xfrm>
+      </p:grpSpPr>
+      <p:sp>
+        <p:nvSpPr>
+          <p:cNvPr id="2" name="Titre 1">
+            <a:extLst>
+              <a:ext uri="{FF2B5EF4-FFF2-40B4-BE49-F238E27FC236}">
+                <a16:creationId xmlns:a16="http://schemas.microsoft.com/office/drawing/2014/main" id="{AAE16FDE-1420-4490-BF39-FEA497428E68}"/>
+              </a:ext>
+            </a:extLst>
+          </p:cNvPr>
+          <p:cNvSpPr>
+            <a:spLocks noGrp="1"/>
+          </p:cNvSpPr>
+          <p:nvPr>
+            <p:ph type="title"/>
+          </p:nvPr>
+        </p:nvSpPr>
+        <p:spPr/>
+        <p:txBody>
+          <a:bodyPr/>
+          <a:lstStyle/>
+          <a:p>
+            <a:r>
+              <a:rPr lang="fr-FR" dirty="0"/>
+              <a:t>REX MADERA</a:t>
+            </a:r>
+          </a:p>
+        </p:txBody>
+      </p:sp>
+      <p:sp>
+        <p:nvSpPr>
+          <p:cNvPr id="3" name="Espace réservé du contenu 2">
+            <a:extLst>
+              <a:ext uri="{FF2B5EF4-FFF2-40B4-BE49-F238E27FC236}">
+                <a16:creationId xmlns:a16="http://schemas.microsoft.com/office/drawing/2014/main" id="{B969E691-13B5-448F-A683-3388DE5F52FB}"/>
+              </a:ext>
+            </a:extLst>
+          </p:cNvPr>
+          <p:cNvSpPr>
+            <a:spLocks noGrp="1"/>
+          </p:cNvSpPr>
+          <p:nvPr>
+            <p:ph idx="1"/>
+          </p:nvPr>
+        </p:nvSpPr>
+        <p:spPr/>
+        <p:txBody>
+          <a:bodyPr/>
+          <a:lstStyle/>
+          <a:p>
+            <a:r>
+              <a:rPr lang="fr-FR" dirty="0"/>
+              <a:t>TOUT LE MONDE (Slide -&gt; NOM)</a:t>
+            </a:r>
+          </a:p>
+        </p:txBody>
+      </p:sp>
+    </p:spTree>
+    <p:extLst>
+      <p:ext uri="{BB962C8B-B14F-4D97-AF65-F5344CB8AC3E}">
+        <p14:creationId xmlns:p14="http://schemas.microsoft.com/office/powerpoint/2010/main" val="1280301743"/>
+      </p:ext>
+    </p:extLst>
+  </p:cSld>
+  <p:clrMapOvr>
+    <a:masterClrMapping/>
+  </p:clrMapOvr>
+</p:sld>
+</file>
+
+<file path=ppt/slides/slide31.xml><?xml version="1.0" encoding="utf-8"?>
+<p:sld xmlns:a="http://schemas.openxmlformats.org/drawingml/2006/main" xmlns:r="http://schemas.openxmlformats.org/officeDocument/2006/relationships" xmlns:p="http://schemas.openxmlformats.org/presentationml/2006/main">
+  <p:cSld>
+    <p:spTree>
+      <p:nvGrpSpPr>
+        <p:cNvPr id="1" name=""/>
+        <p:cNvGrpSpPr/>
+        <p:nvPr/>
+      </p:nvGrpSpPr>
+      <p:grpSpPr>
+        <a:xfrm>
+          <a:off x="0" y="0"/>
+          <a:ext cx="0" cy="0"/>
+          <a:chOff x="0" y="0"/>
+          <a:chExt cx="0" cy="0"/>
+        </a:xfrm>
+      </p:grpSpPr>
+      <p:sp>
+        <p:nvSpPr>
+          <p:cNvPr id="2" name="Titre 1">
+            <a:extLst>
+              <a:ext uri="{FF2B5EF4-FFF2-40B4-BE49-F238E27FC236}">
+                <a16:creationId xmlns:a16="http://schemas.microsoft.com/office/drawing/2014/main" id="{C66F5317-EF2D-497F-B4B1-095EEF05E1F3}"/>
+              </a:ext>
+            </a:extLst>
+          </p:cNvPr>
+          <p:cNvSpPr>
+            <a:spLocks noGrp="1"/>
+          </p:cNvSpPr>
+          <p:nvPr>
+            <p:ph type="title"/>
+          </p:nvPr>
+        </p:nvSpPr>
+        <p:spPr/>
+        <p:txBody>
+          <a:bodyPr/>
+          <a:lstStyle/>
+          <a:p>
+            <a:r>
+              <a:rPr lang="fr-FR" dirty="0"/>
+              <a:t>REX Etudiant</a:t>
+            </a:r>
+          </a:p>
+        </p:txBody>
+      </p:sp>
+      <p:sp>
+        <p:nvSpPr>
+          <p:cNvPr id="3" name="Espace réservé du contenu 2">
+            <a:extLst>
+              <a:ext uri="{FF2B5EF4-FFF2-40B4-BE49-F238E27FC236}">
+                <a16:creationId xmlns:a16="http://schemas.microsoft.com/office/drawing/2014/main" id="{DAADFC33-325F-42BD-B351-17C2A855DC38}"/>
+              </a:ext>
+            </a:extLst>
+          </p:cNvPr>
+          <p:cNvSpPr>
+            <a:spLocks noGrp="1"/>
+          </p:cNvSpPr>
+          <p:nvPr>
+            <p:ph idx="1"/>
+          </p:nvPr>
+        </p:nvSpPr>
+        <p:spPr/>
+        <p:txBody>
+          <a:bodyPr/>
+          <a:lstStyle/>
+          <a:p>
+            <a:r>
+              <a:rPr lang="fr-FR" dirty="0"/>
+              <a:t>TOUT LE MONDE (Slide -&gt; NOM)</a:t>
+            </a:r>
+          </a:p>
+        </p:txBody>
+      </p:sp>
+    </p:spTree>
+    <p:extLst>
+      <p:ext uri="{BB962C8B-B14F-4D97-AF65-F5344CB8AC3E}">
+        <p14:creationId xmlns:p14="http://schemas.microsoft.com/office/powerpoint/2010/main" val="3088040785"/>
       </p:ext>
     </p:extLst>
   </p:cSld>
@@ -8831,6 +9182,27 @@
 <file path=ppt/slides/slide6.xml><?xml version="1.0" encoding="utf-8"?>
 <p:sld xmlns:a="http://schemas.openxmlformats.org/drawingml/2006/main" xmlns:r="http://schemas.openxmlformats.org/officeDocument/2006/relationships" xmlns:p="http://schemas.openxmlformats.org/presentationml/2006/main">
   <p:cSld>
+    <p:bg>
+      <p:bgPr>
+        <a:blipFill rotWithShape="1">
+          <a:blip r:embed="rId3">
+            <a:duotone>
+              <a:schemeClr val="bg2">
+                <a:shade val="76000"/>
+                <a:satMod val="180000"/>
+              </a:schemeClr>
+              <a:schemeClr val="bg2">
+                <a:tint val="80000"/>
+                <a:satMod val="120000"/>
+                <a:lumMod val="180000"/>
+              </a:schemeClr>
+            </a:duotone>
+          </a:blip>
+          <a:stretch/>
+        </a:blipFill>
+        <a:effectLst/>
+      </p:bgPr>
+    </p:bg>
     <p:spTree>
       <p:nvGrpSpPr>
         <p:cNvPr id="1" name=""/>
@@ -8845,12 +9217,912 @@
           <a:chExt cx="0" cy="0"/>
         </a:xfrm>
       </p:grpSpPr>
+      <p:grpSp>
+        <p:nvGrpSpPr>
+          <p:cNvPr id="24" name="Group 23">
+            <a:extLst>
+              <a:ext uri="{FF2B5EF4-FFF2-40B4-BE49-F238E27FC236}">
+                <a16:creationId xmlns:a16="http://schemas.microsoft.com/office/drawing/2014/main" id="{08F94D66-27EC-4CB8-8226-D7F41C161863}"/>
+              </a:ext>
+              <a:ext uri="{C183D7F6-B498-43B3-948B-1728B52AA6E4}">
+                <adec:decorative xmlns:adec="http://schemas.microsoft.com/office/drawing/2017/decorative" val="1"/>
+              </a:ext>
+            </a:extLst>
+          </p:cNvPr>
+          <p:cNvGrpSpPr>
+            <a:grpSpLocks noGrp="1" noUngrp="1" noRot="1" noChangeAspect="1" noMove="1" noResize="1"/>
+          </p:cNvGrpSpPr>
+          <p:nvPr>
+            <p:extLst>
+              <p:ext uri="{386F3935-93C4-4BCD-93E2-E3B085C9AB24}">
+                <p16:designElem xmlns:p16="http://schemas.microsoft.com/office/powerpoint/2015/main" val="1"/>
+              </p:ext>
+            </p:extLst>
+          </p:nvPr>
+        </p:nvGrpSpPr>
+        <p:grpSpPr>
+          <a:xfrm>
+            <a:off x="546100" y="-4763"/>
+            <a:ext cx="5014912" cy="6862763"/>
+            <a:chOff x="2928938" y="-4763"/>
+            <a:chExt cx="5014912" cy="6862763"/>
+          </a:xfrm>
+        </p:grpSpPr>
+        <p:sp>
+          <p:nvSpPr>
+            <p:cNvPr id="25" name="Freeform 6">
+              <a:extLst>
+                <a:ext uri="{FF2B5EF4-FFF2-40B4-BE49-F238E27FC236}">
+                  <a16:creationId xmlns:a16="http://schemas.microsoft.com/office/drawing/2014/main" id="{1A53964C-7D93-4C48-A4A6-C4C2C393C59D}"/>
+                </a:ext>
+                <a:ext uri="{C183D7F6-B498-43B3-948B-1728B52AA6E4}">
+                  <adec:decorative xmlns:adec="http://schemas.microsoft.com/office/drawing/2017/decorative" val="1"/>
+                </a:ext>
+              </a:extLst>
+            </p:cNvPr>
+            <p:cNvSpPr/>
+            <p:nvPr>
+              <p:extLst>
+                <p:ext uri="{386F3935-93C4-4BCD-93E2-E3B085C9AB24}">
+                  <p16:designElem xmlns:p16="http://schemas.microsoft.com/office/powerpoint/2015/main" val="1"/>
+                </p:ext>
+              </p:extLst>
+            </p:nvPr>
+          </p:nvSpPr>
+          <p:spPr bwMode="auto">
+            <a:xfrm>
+              <a:off x="3367088" y="-4763"/>
+              <a:ext cx="1063625" cy="2782888"/>
+            </a:xfrm>
+            <a:custGeom>
+              <a:avLst/>
+              <a:gdLst/>
+              <a:ahLst/>
+              <a:cxnLst/>
+              <a:rect l="0" t="0" r="r" b="b"/>
+              <a:pathLst>
+                <a:path w="670" h="1753">
+                  <a:moveTo>
+                    <a:pt x="0" y="1696"/>
+                  </a:moveTo>
+                  <a:lnTo>
+                    <a:pt x="225" y="1753"/>
+                  </a:lnTo>
+                  <a:lnTo>
+                    <a:pt x="670" y="0"/>
+                  </a:lnTo>
+                  <a:lnTo>
+                    <a:pt x="430" y="0"/>
+                  </a:lnTo>
+                  <a:lnTo>
+                    <a:pt x="0" y="1696"/>
+                  </a:lnTo>
+                  <a:close/>
+                </a:path>
+              </a:pathLst>
+            </a:custGeom>
+            <a:solidFill>
+              <a:schemeClr val="accent1"/>
+            </a:solidFill>
+            <a:ln>
+              <a:noFill/>
+            </a:ln>
+          </p:spPr>
+        </p:sp>
+        <p:sp>
+          <p:nvSpPr>
+            <p:cNvPr id="26" name="Freeform 7">
+              <a:extLst>
+                <a:ext uri="{FF2B5EF4-FFF2-40B4-BE49-F238E27FC236}">
+                  <a16:creationId xmlns:a16="http://schemas.microsoft.com/office/drawing/2014/main" id="{9C944EEC-539E-4389-8785-58E65D04E8DC}"/>
+                </a:ext>
+                <a:ext uri="{C183D7F6-B498-43B3-948B-1728B52AA6E4}">
+                  <adec:decorative xmlns:adec="http://schemas.microsoft.com/office/drawing/2017/decorative" val="1"/>
+                </a:ext>
+              </a:extLst>
+            </p:cNvPr>
+            <p:cNvSpPr/>
+            <p:nvPr>
+              <p:extLst>
+                <p:ext uri="{386F3935-93C4-4BCD-93E2-E3B085C9AB24}">
+                  <p16:designElem xmlns:p16="http://schemas.microsoft.com/office/powerpoint/2015/main" val="1"/>
+                </p:ext>
+              </p:extLst>
+            </p:nvPr>
+          </p:nvSpPr>
+          <p:spPr bwMode="auto">
+            <a:xfrm>
+              <a:off x="2928938" y="-4763"/>
+              <a:ext cx="1035050" cy="2673350"/>
+            </a:xfrm>
+            <a:custGeom>
+              <a:avLst/>
+              <a:gdLst/>
+              <a:ahLst/>
+              <a:cxnLst/>
+              <a:rect l="0" t="0" r="r" b="b"/>
+              <a:pathLst>
+                <a:path w="652" h="1684">
+                  <a:moveTo>
+                    <a:pt x="225" y="1684"/>
+                  </a:moveTo>
+                  <a:lnTo>
+                    <a:pt x="652" y="0"/>
+                  </a:lnTo>
+                  <a:lnTo>
+                    <a:pt x="411" y="0"/>
+                  </a:lnTo>
+                  <a:lnTo>
+                    <a:pt x="0" y="1627"/>
+                  </a:lnTo>
+                  <a:lnTo>
+                    <a:pt x="219" y="1681"/>
+                  </a:lnTo>
+                  <a:lnTo>
+                    <a:pt x="225" y="1684"/>
+                  </a:lnTo>
+                  <a:close/>
+                </a:path>
+              </a:pathLst>
+            </a:custGeom>
+            <a:solidFill>
+              <a:schemeClr val="tx1">
+                <a:lumMod val="65000"/>
+                <a:lumOff val="35000"/>
+              </a:schemeClr>
+            </a:solidFill>
+            <a:ln>
+              <a:noFill/>
+            </a:ln>
+          </p:spPr>
+        </p:sp>
+        <p:sp>
+          <p:nvSpPr>
+            <p:cNvPr id="27" name="Freeform 9">
+              <a:extLst>
+                <a:ext uri="{FF2B5EF4-FFF2-40B4-BE49-F238E27FC236}">
+                  <a16:creationId xmlns:a16="http://schemas.microsoft.com/office/drawing/2014/main" id="{7836EB7E-895C-4D68-B92E-312B371CBDBF}"/>
+                </a:ext>
+                <a:ext uri="{C183D7F6-B498-43B3-948B-1728B52AA6E4}">
+                  <adec:decorative xmlns:adec="http://schemas.microsoft.com/office/drawing/2017/decorative" val="1"/>
+                </a:ext>
+              </a:extLst>
+            </p:cNvPr>
+            <p:cNvSpPr/>
+            <p:nvPr>
+              <p:extLst>
+                <p:ext uri="{386F3935-93C4-4BCD-93E2-E3B085C9AB24}">
+                  <p16:designElem xmlns:p16="http://schemas.microsoft.com/office/powerpoint/2015/main" val="1"/>
+                </p:ext>
+              </p:extLst>
+            </p:nvPr>
+          </p:nvSpPr>
+          <p:spPr bwMode="auto">
+            <a:xfrm>
+              <a:off x="2928938" y="2582862"/>
+              <a:ext cx="2693987" cy="4275138"/>
+            </a:xfrm>
+            <a:custGeom>
+              <a:avLst/>
+              <a:gdLst/>
+              <a:ahLst/>
+              <a:cxnLst/>
+              <a:rect l="0" t="0" r="r" b="b"/>
+              <a:pathLst>
+                <a:path w="1697" h="2693">
+                  <a:moveTo>
+                    <a:pt x="0" y="0"/>
+                  </a:moveTo>
+                  <a:lnTo>
+                    <a:pt x="1622" y="2693"/>
+                  </a:lnTo>
+                  <a:lnTo>
+                    <a:pt x="1697" y="2693"/>
+                  </a:lnTo>
+                  <a:lnTo>
+                    <a:pt x="0" y="0"/>
+                  </a:lnTo>
+                  <a:close/>
+                </a:path>
+              </a:pathLst>
+            </a:custGeom>
+            <a:solidFill>
+              <a:schemeClr val="tx1">
+                <a:lumMod val="85000"/>
+                <a:lumOff val="15000"/>
+              </a:schemeClr>
+            </a:solidFill>
+            <a:ln>
+              <a:noFill/>
+            </a:ln>
+          </p:spPr>
+        </p:sp>
+        <p:sp>
+          <p:nvSpPr>
+            <p:cNvPr id="28" name="Freeform 10">
+              <a:extLst>
+                <a:ext uri="{FF2B5EF4-FFF2-40B4-BE49-F238E27FC236}">
+                  <a16:creationId xmlns:a16="http://schemas.microsoft.com/office/drawing/2014/main" id="{0F29242B-8CE7-4636-B326-4BEE42EB6D6F}"/>
+                </a:ext>
+                <a:ext uri="{C183D7F6-B498-43B3-948B-1728B52AA6E4}">
+                  <adec:decorative xmlns:adec="http://schemas.microsoft.com/office/drawing/2017/decorative" val="1"/>
+                </a:ext>
+              </a:extLst>
+            </p:cNvPr>
+            <p:cNvSpPr/>
+            <p:nvPr>
+              <p:extLst>
+                <p:ext uri="{386F3935-93C4-4BCD-93E2-E3B085C9AB24}">
+                  <p16:designElem xmlns:p16="http://schemas.microsoft.com/office/powerpoint/2015/main" val="1"/>
+                </p:ext>
+              </p:extLst>
+            </p:nvPr>
+          </p:nvSpPr>
+          <p:spPr bwMode="auto">
+            <a:xfrm>
+              <a:off x="3371850" y="2692400"/>
+              <a:ext cx="3332162" cy="4165600"/>
+            </a:xfrm>
+            <a:custGeom>
+              <a:avLst/>
+              <a:gdLst/>
+              <a:ahLst/>
+              <a:cxnLst/>
+              <a:rect l="0" t="0" r="r" b="b"/>
+              <a:pathLst>
+                <a:path w="2099" h="2624">
+                  <a:moveTo>
+                    <a:pt x="2099" y="2624"/>
+                  </a:moveTo>
+                  <a:lnTo>
+                    <a:pt x="0" y="0"/>
+                  </a:lnTo>
+                  <a:lnTo>
+                    <a:pt x="2021" y="2624"/>
+                  </a:lnTo>
+                  <a:lnTo>
+                    <a:pt x="2099" y="2624"/>
+                  </a:lnTo>
+                  <a:close/>
+                </a:path>
+              </a:pathLst>
+            </a:custGeom>
+            <a:solidFill>
+              <a:schemeClr val="accent1">
+                <a:lumMod val="50000"/>
+              </a:schemeClr>
+            </a:solidFill>
+            <a:ln>
+              <a:noFill/>
+            </a:ln>
+          </p:spPr>
+        </p:sp>
+        <p:sp>
+          <p:nvSpPr>
+            <p:cNvPr id="29" name="Freeform 11">
+              <a:extLst>
+                <a:ext uri="{FF2B5EF4-FFF2-40B4-BE49-F238E27FC236}">
+                  <a16:creationId xmlns:a16="http://schemas.microsoft.com/office/drawing/2014/main" id="{4D0B8E9A-7727-4AD9-974E-8815F0B20EB4}"/>
+                </a:ext>
+                <a:ext uri="{C183D7F6-B498-43B3-948B-1728B52AA6E4}">
+                  <adec:decorative xmlns:adec="http://schemas.microsoft.com/office/drawing/2017/decorative" val="1"/>
+                </a:ext>
+              </a:extLst>
+            </p:cNvPr>
+            <p:cNvSpPr/>
+            <p:nvPr>
+              <p:extLst>
+                <p:ext uri="{386F3935-93C4-4BCD-93E2-E3B085C9AB24}">
+                  <p16:designElem xmlns:p16="http://schemas.microsoft.com/office/powerpoint/2015/main" val="1"/>
+                </p:ext>
+              </p:extLst>
+            </p:nvPr>
+          </p:nvSpPr>
+          <p:spPr bwMode="auto">
+            <a:xfrm>
+              <a:off x="3367088" y="2687637"/>
+              <a:ext cx="4576762" cy="4170363"/>
+            </a:xfrm>
+            <a:custGeom>
+              <a:avLst/>
+              <a:gdLst/>
+              <a:ahLst/>
+              <a:cxnLst/>
+              <a:rect l="0" t="0" r="r" b="b"/>
+              <a:pathLst>
+                <a:path w="2883" h="2627">
+                  <a:moveTo>
+                    <a:pt x="0" y="0"/>
+                  </a:moveTo>
+                  <a:lnTo>
+                    <a:pt x="3" y="3"/>
+                  </a:lnTo>
+                  <a:lnTo>
+                    <a:pt x="2102" y="2627"/>
+                  </a:lnTo>
+                  <a:lnTo>
+                    <a:pt x="2883" y="2627"/>
+                  </a:lnTo>
+                  <a:lnTo>
+                    <a:pt x="225" y="57"/>
+                  </a:lnTo>
+                  <a:lnTo>
+                    <a:pt x="0" y="0"/>
+                  </a:lnTo>
+                  <a:close/>
+                </a:path>
+              </a:pathLst>
+            </a:custGeom>
+            <a:solidFill>
+              <a:schemeClr val="accent1">
+                <a:lumMod val="75000"/>
+              </a:schemeClr>
+            </a:solidFill>
+            <a:ln>
+              <a:noFill/>
+            </a:ln>
+          </p:spPr>
+        </p:sp>
+        <p:sp>
+          <p:nvSpPr>
+            <p:cNvPr id="30" name="Freeform 12">
+              <a:extLst>
+                <a:ext uri="{FF2B5EF4-FFF2-40B4-BE49-F238E27FC236}">
+                  <a16:creationId xmlns:a16="http://schemas.microsoft.com/office/drawing/2014/main" id="{1CD6C65C-71BE-4549-926A-1C1135FD06DF}"/>
+                </a:ext>
+                <a:ext uri="{C183D7F6-B498-43B3-948B-1728B52AA6E4}">
+                  <adec:decorative xmlns:adec="http://schemas.microsoft.com/office/drawing/2017/decorative" val="1"/>
+                </a:ext>
+              </a:extLst>
+            </p:cNvPr>
+            <p:cNvSpPr/>
+            <p:nvPr>
+              <p:extLst>
+                <p:ext uri="{386F3935-93C4-4BCD-93E2-E3B085C9AB24}">
+                  <p16:designElem xmlns:p16="http://schemas.microsoft.com/office/powerpoint/2015/main" val="1"/>
+                </p:ext>
+              </p:extLst>
+            </p:nvPr>
+          </p:nvSpPr>
+          <p:spPr bwMode="auto">
+            <a:xfrm>
+              <a:off x="2928938" y="2578100"/>
+              <a:ext cx="3584575" cy="4279900"/>
+            </a:xfrm>
+            <a:custGeom>
+              <a:avLst/>
+              <a:gdLst/>
+              <a:ahLst/>
+              <a:cxnLst/>
+              <a:rect l="0" t="0" r="r" b="b"/>
+              <a:pathLst>
+                <a:path w="2258" h="2696">
+                  <a:moveTo>
+                    <a:pt x="2258" y="2696"/>
+                  </a:moveTo>
+                  <a:lnTo>
+                    <a:pt x="264" y="111"/>
+                  </a:lnTo>
+                  <a:lnTo>
+                    <a:pt x="228" y="60"/>
+                  </a:lnTo>
+                  <a:lnTo>
+                    <a:pt x="225" y="57"/>
+                  </a:lnTo>
+                  <a:lnTo>
+                    <a:pt x="0" y="0"/>
+                  </a:lnTo>
+                  <a:lnTo>
+                    <a:pt x="0" y="3"/>
+                  </a:lnTo>
+                  <a:lnTo>
+                    <a:pt x="1697" y="2696"/>
+                  </a:lnTo>
+                  <a:lnTo>
+                    <a:pt x="2258" y="2696"/>
+                  </a:lnTo>
+                  <a:close/>
+                </a:path>
+              </a:pathLst>
+            </a:custGeom>
+            <a:solidFill>
+              <a:schemeClr val="tx1">
+                <a:lumMod val="75000"/>
+                <a:lumOff val="25000"/>
+              </a:schemeClr>
+            </a:solidFill>
+            <a:ln>
+              <a:noFill/>
+            </a:ln>
+          </p:spPr>
+        </p:sp>
+      </p:grpSp>
+      <p:sp useBgFill="1">
+        <p:nvSpPr>
+          <p:cNvPr id="32" name="Rectangle 31">
+            <a:extLst>
+              <a:ext uri="{FF2B5EF4-FFF2-40B4-BE49-F238E27FC236}">
+                <a16:creationId xmlns:a16="http://schemas.microsoft.com/office/drawing/2014/main" id="{E58348C3-6249-4952-AA86-C63DB35EA9F2}"/>
+              </a:ext>
+              <a:ext uri="{C183D7F6-B498-43B3-948B-1728B52AA6E4}">
+                <adec:decorative xmlns:adec="http://schemas.microsoft.com/office/drawing/2017/decorative" val="1"/>
+              </a:ext>
+            </a:extLst>
+          </p:cNvPr>
+          <p:cNvSpPr>
+            <a:spLocks noGrp="1" noRot="1" noChangeAspect="1" noMove="1" noResize="1" noEditPoints="1" noAdjustHandles="1" noChangeArrowheads="1" noChangeShapeType="1" noTextEdit="1"/>
+          </p:cNvSpPr>
+          <p:nvPr>
+            <p:extLst>
+              <p:ext uri="{386F3935-93C4-4BCD-93E2-E3B085C9AB24}">
+                <p16:designElem xmlns:p16="http://schemas.microsoft.com/office/powerpoint/2015/main" val="1"/>
+              </p:ext>
+            </p:extLst>
+          </p:nvPr>
+        </p:nvSpPr>
+        <p:spPr>
+          <a:xfrm>
+            <a:off x="0" y="0"/>
+            <a:ext cx="12192000" cy="6858000"/>
+          </a:xfrm>
+          <a:prstGeom prst="rect">
+            <a:avLst/>
+          </a:prstGeom>
+          <a:ln>
+            <a:noFill/>
+          </a:ln>
+        </p:spPr>
+        <p:style>
+          <a:lnRef idx="2">
+            <a:schemeClr val="accent1">
+              <a:shade val="50000"/>
+            </a:schemeClr>
+          </a:lnRef>
+          <a:fillRef idx="1">
+            <a:schemeClr val="accent1"/>
+          </a:fillRef>
+          <a:effectRef idx="0">
+            <a:schemeClr val="accent1"/>
+          </a:effectRef>
+          <a:fontRef idx="minor">
+            <a:schemeClr val="lt1"/>
+          </a:fontRef>
+        </p:style>
+        <p:txBody>
+          <a:bodyPr rtlCol="0" anchor="ctr"/>
+          <a:lstStyle/>
+          <a:p>
+            <a:pPr algn="ctr"/>
+            <a:endParaRPr lang="en-US"/>
+          </a:p>
+        </p:txBody>
+      </p:sp>
+      <p:grpSp>
+        <p:nvGrpSpPr>
+          <p:cNvPr id="34" name="Group 33">
+            <a:extLst>
+              <a:ext uri="{FF2B5EF4-FFF2-40B4-BE49-F238E27FC236}">
+                <a16:creationId xmlns:a16="http://schemas.microsoft.com/office/drawing/2014/main" id="{DE6174AD-DBB0-43E6-98C2-738DB3A15244}"/>
+              </a:ext>
+              <a:ext uri="{C183D7F6-B498-43B3-948B-1728B52AA6E4}">
+                <adec:decorative xmlns:adec="http://schemas.microsoft.com/office/drawing/2017/decorative" val="1"/>
+              </a:ext>
+            </a:extLst>
+          </p:cNvPr>
+          <p:cNvGrpSpPr>
+            <a:grpSpLocks noGrp="1" noUngrp="1" noRot="1" noChangeAspect="1" noMove="1" noResize="1"/>
+          </p:cNvGrpSpPr>
+          <p:nvPr>
+            <p:extLst>
+              <p:ext uri="{386F3935-93C4-4BCD-93E2-E3B085C9AB24}">
+                <p16:designElem xmlns:p16="http://schemas.microsoft.com/office/powerpoint/2015/main" val="1"/>
+              </p:ext>
+            </p:extLst>
+          </p:nvPr>
+        </p:nvGrpSpPr>
+        <p:grpSpPr>
+          <a:xfrm>
+            <a:off x="2959100" y="-4763"/>
+            <a:ext cx="5014912" cy="6862763"/>
+            <a:chOff x="2928938" y="-4763"/>
+            <a:chExt cx="5014912" cy="6862763"/>
+          </a:xfrm>
+        </p:grpSpPr>
+        <p:sp>
+          <p:nvSpPr>
+            <p:cNvPr id="35" name="Freeform 6">
+              <a:extLst>
+                <a:ext uri="{FF2B5EF4-FFF2-40B4-BE49-F238E27FC236}">
+                  <a16:creationId xmlns:a16="http://schemas.microsoft.com/office/drawing/2014/main" id="{50A59800-3661-4778-9D8A-F816C85C41D1}"/>
+                </a:ext>
+                <a:ext uri="{C183D7F6-B498-43B3-948B-1728B52AA6E4}">
+                  <adec:decorative xmlns:adec="http://schemas.microsoft.com/office/drawing/2017/decorative" val="1"/>
+                </a:ext>
+              </a:extLst>
+            </p:cNvPr>
+            <p:cNvSpPr/>
+            <p:nvPr>
+              <p:extLst>
+                <p:ext uri="{386F3935-93C4-4BCD-93E2-E3B085C9AB24}">
+                  <p16:designElem xmlns:p16="http://schemas.microsoft.com/office/powerpoint/2015/main" val="1"/>
+                </p:ext>
+              </p:extLst>
+            </p:nvPr>
+          </p:nvSpPr>
+          <p:spPr bwMode="auto">
+            <a:xfrm>
+              <a:off x="3367088" y="-4763"/>
+              <a:ext cx="1063625" cy="2782888"/>
+            </a:xfrm>
+            <a:custGeom>
+              <a:avLst/>
+              <a:gdLst/>
+              <a:ahLst/>
+              <a:cxnLst/>
+              <a:rect l="0" t="0" r="r" b="b"/>
+              <a:pathLst>
+                <a:path w="670" h="1753">
+                  <a:moveTo>
+                    <a:pt x="0" y="1696"/>
+                  </a:moveTo>
+                  <a:lnTo>
+                    <a:pt x="225" y="1753"/>
+                  </a:lnTo>
+                  <a:lnTo>
+                    <a:pt x="670" y="0"/>
+                  </a:lnTo>
+                  <a:lnTo>
+                    <a:pt x="430" y="0"/>
+                  </a:lnTo>
+                  <a:lnTo>
+                    <a:pt x="0" y="1696"/>
+                  </a:lnTo>
+                  <a:close/>
+                </a:path>
+              </a:pathLst>
+            </a:custGeom>
+            <a:solidFill>
+              <a:schemeClr val="accent1"/>
+            </a:solidFill>
+            <a:ln>
+              <a:noFill/>
+            </a:ln>
+          </p:spPr>
+        </p:sp>
+        <p:sp>
+          <p:nvSpPr>
+            <p:cNvPr id="36" name="Freeform 7">
+              <a:extLst>
+                <a:ext uri="{FF2B5EF4-FFF2-40B4-BE49-F238E27FC236}">
+                  <a16:creationId xmlns:a16="http://schemas.microsoft.com/office/drawing/2014/main" id="{7A810977-C816-4698-B7E7-0E6BDED794A1}"/>
+                </a:ext>
+                <a:ext uri="{C183D7F6-B498-43B3-948B-1728B52AA6E4}">
+                  <adec:decorative xmlns:adec="http://schemas.microsoft.com/office/drawing/2017/decorative" val="1"/>
+                </a:ext>
+              </a:extLst>
+            </p:cNvPr>
+            <p:cNvSpPr/>
+            <p:nvPr>
+              <p:extLst>
+                <p:ext uri="{386F3935-93C4-4BCD-93E2-E3B085C9AB24}">
+                  <p16:designElem xmlns:p16="http://schemas.microsoft.com/office/powerpoint/2015/main" val="1"/>
+                </p:ext>
+              </p:extLst>
+            </p:nvPr>
+          </p:nvSpPr>
+          <p:spPr bwMode="auto">
+            <a:xfrm>
+              <a:off x="2928938" y="-4763"/>
+              <a:ext cx="1035050" cy="2673350"/>
+            </a:xfrm>
+            <a:custGeom>
+              <a:avLst/>
+              <a:gdLst/>
+              <a:ahLst/>
+              <a:cxnLst/>
+              <a:rect l="0" t="0" r="r" b="b"/>
+              <a:pathLst>
+                <a:path w="652" h="1684">
+                  <a:moveTo>
+                    <a:pt x="225" y="1684"/>
+                  </a:moveTo>
+                  <a:lnTo>
+                    <a:pt x="652" y="0"/>
+                  </a:lnTo>
+                  <a:lnTo>
+                    <a:pt x="411" y="0"/>
+                  </a:lnTo>
+                  <a:lnTo>
+                    <a:pt x="0" y="1627"/>
+                  </a:lnTo>
+                  <a:lnTo>
+                    <a:pt x="219" y="1681"/>
+                  </a:lnTo>
+                  <a:lnTo>
+                    <a:pt x="225" y="1684"/>
+                  </a:lnTo>
+                  <a:close/>
+                </a:path>
+              </a:pathLst>
+            </a:custGeom>
+            <a:solidFill>
+              <a:schemeClr val="tx1">
+                <a:lumMod val="65000"/>
+                <a:lumOff val="35000"/>
+              </a:schemeClr>
+            </a:solidFill>
+            <a:ln>
+              <a:noFill/>
+            </a:ln>
+          </p:spPr>
+        </p:sp>
+        <p:sp>
+          <p:nvSpPr>
+            <p:cNvPr id="37" name="Freeform 9">
+              <a:extLst>
+                <a:ext uri="{FF2B5EF4-FFF2-40B4-BE49-F238E27FC236}">
+                  <a16:creationId xmlns:a16="http://schemas.microsoft.com/office/drawing/2014/main" id="{181E4B1B-2437-4A14-8927-817FC7AED67F}"/>
+                </a:ext>
+                <a:ext uri="{C183D7F6-B498-43B3-948B-1728B52AA6E4}">
+                  <adec:decorative xmlns:adec="http://schemas.microsoft.com/office/drawing/2017/decorative" val="1"/>
+                </a:ext>
+              </a:extLst>
+            </p:cNvPr>
+            <p:cNvSpPr/>
+            <p:nvPr>
+              <p:extLst>
+                <p:ext uri="{386F3935-93C4-4BCD-93E2-E3B085C9AB24}">
+                  <p16:designElem xmlns:p16="http://schemas.microsoft.com/office/powerpoint/2015/main" val="1"/>
+                </p:ext>
+              </p:extLst>
+            </p:nvPr>
+          </p:nvSpPr>
+          <p:spPr bwMode="auto">
+            <a:xfrm>
+              <a:off x="2928938" y="2582862"/>
+              <a:ext cx="2693987" cy="4275138"/>
+            </a:xfrm>
+            <a:custGeom>
+              <a:avLst/>
+              <a:gdLst/>
+              <a:ahLst/>
+              <a:cxnLst/>
+              <a:rect l="0" t="0" r="r" b="b"/>
+              <a:pathLst>
+                <a:path w="1697" h="2693">
+                  <a:moveTo>
+                    <a:pt x="0" y="0"/>
+                  </a:moveTo>
+                  <a:lnTo>
+                    <a:pt x="1622" y="2693"/>
+                  </a:lnTo>
+                  <a:lnTo>
+                    <a:pt x="1697" y="2693"/>
+                  </a:lnTo>
+                  <a:lnTo>
+                    <a:pt x="0" y="0"/>
+                  </a:lnTo>
+                  <a:close/>
+                </a:path>
+              </a:pathLst>
+            </a:custGeom>
+            <a:solidFill>
+              <a:schemeClr val="tx1">
+                <a:lumMod val="85000"/>
+                <a:lumOff val="15000"/>
+              </a:schemeClr>
+            </a:solidFill>
+            <a:ln>
+              <a:noFill/>
+            </a:ln>
+          </p:spPr>
+        </p:sp>
+        <p:sp>
+          <p:nvSpPr>
+            <p:cNvPr id="38" name="Freeform 10">
+              <a:extLst>
+                <a:ext uri="{FF2B5EF4-FFF2-40B4-BE49-F238E27FC236}">
+                  <a16:creationId xmlns:a16="http://schemas.microsoft.com/office/drawing/2014/main" id="{3F98AD26-9FF7-44EA-B876-9C857F8ED970}"/>
+                </a:ext>
+                <a:ext uri="{C183D7F6-B498-43B3-948B-1728B52AA6E4}">
+                  <adec:decorative xmlns:adec="http://schemas.microsoft.com/office/drawing/2017/decorative" val="1"/>
+                </a:ext>
+              </a:extLst>
+            </p:cNvPr>
+            <p:cNvSpPr/>
+            <p:nvPr>
+              <p:extLst>
+                <p:ext uri="{386F3935-93C4-4BCD-93E2-E3B085C9AB24}">
+                  <p16:designElem xmlns:p16="http://schemas.microsoft.com/office/powerpoint/2015/main" val="1"/>
+                </p:ext>
+              </p:extLst>
+            </p:nvPr>
+          </p:nvSpPr>
+          <p:spPr bwMode="auto">
+            <a:xfrm>
+              <a:off x="3371850" y="2692400"/>
+              <a:ext cx="3332162" cy="4165600"/>
+            </a:xfrm>
+            <a:custGeom>
+              <a:avLst/>
+              <a:gdLst/>
+              <a:ahLst/>
+              <a:cxnLst/>
+              <a:rect l="0" t="0" r="r" b="b"/>
+              <a:pathLst>
+                <a:path w="2099" h="2624">
+                  <a:moveTo>
+                    <a:pt x="2099" y="2624"/>
+                  </a:moveTo>
+                  <a:lnTo>
+                    <a:pt x="0" y="0"/>
+                  </a:lnTo>
+                  <a:lnTo>
+                    <a:pt x="2021" y="2624"/>
+                  </a:lnTo>
+                  <a:lnTo>
+                    <a:pt x="2099" y="2624"/>
+                  </a:lnTo>
+                  <a:close/>
+                </a:path>
+              </a:pathLst>
+            </a:custGeom>
+            <a:solidFill>
+              <a:schemeClr val="accent1">
+                <a:lumMod val="50000"/>
+              </a:schemeClr>
+            </a:solidFill>
+            <a:ln>
+              <a:noFill/>
+            </a:ln>
+          </p:spPr>
+        </p:sp>
+        <p:sp>
+          <p:nvSpPr>
+            <p:cNvPr id="39" name="Freeform 11">
+              <a:extLst>
+                <a:ext uri="{FF2B5EF4-FFF2-40B4-BE49-F238E27FC236}">
+                  <a16:creationId xmlns:a16="http://schemas.microsoft.com/office/drawing/2014/main" id="{32EBB12A-A9CE-446F-9462-15DAC0D0FA52}"/>
+                </a:ext>
+                <a:ext uri="{C183D7F6-B498-43B3-948B-1728B52AA6E4}">
+                  <adec:decorative xmlns:adec="http://schemas.microsoft.com/office/drawing/2017/decorative" val="1"/>
+                </a:ext>
+              </a:extLst>
+            </p:cNvPr>
+            <p:cNvSpPr/>
+            <p:nvPr>
+              <p:extLst>
+                <p:ext uri="{386F3935-93C4-4BCD-93E2-E3B085C9AB24}">
+                  <p16:designElem xmlns:p16="http://schemas.microsoft.com/office/powerpoint/2015/main" val="1"/>
+                </p:ext>
+              </p:extLst>
+            </p:nvPr>
+          </p:nvSpPr>
+          <p:spPr bwMode="auto">
+            <a:xfrm>
+              <a:off x="3367088" y="2687637"/>
+              <a:ext cx="4576762" cy="4170363"/>
+            </a:xfrm>
+            <a:custGeom>
+              <a:avLst/>
+              <a:gdLst/>
+              <a:ahLst/>
+              <a:cxnLst/>
+              <a:rect l="0" t="0" r="r" b="b"/>
+              <a:pathLst>
+                <a:path w="2883" h="2627">
+                  <a:moveTo>
+                    <a:pt x="0" y="0"/>
+                  </a:moveTo>
+                  <a:lnTo>
+                    <a:pt x="3" y="3"/>
+                  </a:lnTo>
+                  <a:lnTo>
+                    <a:pt x="2102" y="2627"/>
+                  </a:lnTo>
+                  <a:lnTo>
+                    <a:pt x="2883" y="2627"/>
+                  </a:lnTo>
+                  <a:lnTo>
+                    <a:pt x="225" y="57"/>
+                  </a:lnTo>
+                  <a:lnTo>
+                    <a:pt x="0" y="0"/>
+                  </a:lnTo>
+                  <a:close/>
+                </a:path>
+              </a:pathLst>
+            </a:custGeom>
+            <a:solidFill>
+              <a:schemeClr val="accent1">
+                <a:lumMod val="75000"/>
+              </a:schemeClr>
+            </a:solidFill>
+            <a:ln>
+              <a:noFill/>
+            </a:ln>
+          </p:spPr>
+        </p:sp>
+        <p:sp>
+          <p:nvSpPr>
+            <p:cNvPr id="40" name="Freeform 12">
+              <a:extLst>
+                <a:ext uri="{FF2B5EF4-FFF2-40B4-BE49-F238E27FC236}">
+                  <a16:creationId xmlns:a16="http://schemas.microsoft.com/office/drawing/2014/main" id="{85925599-F99B-48E5-A384-76136C0818B7}"/>
+                </a:ext>
+                <a:ext uri="{C183D7F6-B498-43B3-948B-1728B52AA6E4}">
+                  <adec:decorative xmlns:adec="http://schemas.microsoft.com/office/drawing/2017/decorative" val="1"/>
+                </a:ext>
+              </a:extLst>
+            </p:cNvPr>
+            <p:cNvSpPr/>
+            <p:nvPr>
+              <p:extLst>
+                <p:ext uri="{386F3935-93C4-4BCD-93E2-E3B085C9AB24}">
+                  <p16:designElem xmlns:p16="http://schemas.microsoft.com/office/powerpoint/2015/main" val="1"/>
+                </p:ext>
+              </p:extLst>
+            </p:nvPr>
+          </p:nvSpPr>
+          <p:spPr bwMode="auto">
+            <a:xfrm>
+              <a:off x="2928938" y="2578100"/>
+              <a:ext cx="3584575" cy="4279900"/>
+            </a:xfrm>
+            <a:custGeom>
+              <a:avLst/>
+              <a:gdLst/>
+              <a:ahLst/>
+              <a:cxnLst/>
+              <a:rect l="0" t="0" r="r" b="b"/>
+              <a:pathLst>
+                <a:path w="2258" h="2696">
+                  <a:moveTo>
+                    <a:pt x="2258" y="2696"/>
+                  </a:moveTo>
+                  <a:lnTo>
+                    <a:pt x="264" y="111"/>
+                  </a:lnTo>
+                  <a:lnTo>
+                    <a:pt x="228" y="60"/>
+                  </a:lnTo>
+                  <a:lnTo>
+                    <a:pt x="225" y="57"/>
+                  </a:lnTo>
+                  <a:lnTo>
+                    <a:pt x="0" y="0"/>
+                  </a:lnTo>
+                  <a:lnTo>
+                    <a:pt x="0" y="3"/>
+                  </a:lnTo>
+                  <a:lnTo>
+                    <a:pt x="1697" y="2696"/>
+                  </a:lnTo>
+                  <a:lnTo>
+                    <a:pt x="2258" y="2696"/>
+                  </a:lnTo>
+                  <a:close/>
+                </a:path>
+              </a:pathLst>
+            </a:custGeom>
+            <a:solidFill>
+              <a:schemeClr val="tx1">
+                <a:lumMod val="75000"/>
+                <a:lumOff val="25000"/>
+              </a:schemeClr>
+            </a:solidFill>
+            <a:ln>
+              <a:noFill/>
+            </a:ln>
+          </p:spPr>
+        </p:sp>
+      </p:grpSp>
       <p:sp>
         <p:nvSpPr>
           <p:cNvPr id="2" name="Titre 1">
             <a:extLst>
               <a:ext uri="{FF2B5EF4-FFF2-40B4-BE49-F238E27FC236}">
-                <a16:creationId xmlns:a16="http://schemas.microsoft.com/office/drawing/2014/main" id="{9AF062FD-23BF-A944-9FD3-8FF06344FFDC}"/>
+                <a16:creationId xmlns:a16="http://schemas.microsoft.com/office/drawing/2014/main" id="{F6FCF8D6-CFAB-4977-8EEF-B9E52073FBDC}"/>
               </a:ext>
             </a:extLst>
           </p:cNvPr>
@@ -8863,53 +10135,104 @@
         </p:nvSpPr>
         <p:spPr>
           <a:xfrm>
-            <a:off x="720435" y="232061"/>
-            <a:ext cx="10018713" cy="1752599"/>
+            <a:off x="5448299" y="1380068"/>
+            <a:ext cx="6054723" cy="2616199"/>
           </a:xfrm>
         </p:spPr>
         <p:txBody>
-          <a:bodyPr/>
-          <a:lstStyle/>
-          <a:p>
-            <a:r>
-              <a:rPr lang="fr-FR" dirty="0"/>
-              <a:t>Agilité</a:t>
-            </a:r>
-          </a:p>
-        </p:txBody>
-      </p:sp>
-      <p:sp>
-        <p:nvSpPr>
-          <p:cNvPr id="4" name="Espace réservé du contenu 3">
+          <a:bodyPr vert="horz" lIns="91440" tIns="45720" rIns="91440" bIns="45720" rtlCol="0" anchor="b">
+            <a:normAutofit/>
+          </a:bodyPr>
+          <a:lstStyle/>
+          <a:p>
+            <a:pPr algn="r"/>
+            <a:r>
+              <a:rPr lang="en-US" sz="6000"/>
+              <a:t>Méthode Agile</a:t>
+            </a:r>
+          </a:p>
+        </p:txBody>
+      </p:sp>
+      <p:pic>
+        <p:nvPicPr>
+          <p:cNvPr id="19" name="Picture 2" descr="Formation Méthode AGILE et SCRUM (certifiante) - Parcours complet ...">
             <a:extLst>
               <a:ext uri="{FF2B5EF4-FFF2-40B4-BE49-F238E27FC236}">
-                <a16:creationId xmlns:a16="http://schemas.microsoft.com/office/drawing/2014/main" id="{DFAEE756-62A1-46C7-9CE2-5F0FF6F7571D}"/>
+                <a16:creationId xmlns:a16="http://schemas.microsoft.com/office/drawing/2014/main" id="{C9B23514-B4A4-436A-B83D-89B49F1ECB7A}"/>
               </a:ext>
             </a:extLst>
           </p:cNvPr>
-          <p:cNvSpPr>
-            <a:spLocks noGrp="1"/>
-          </p:cNvSpPr>
-          <p:nvPr>
-            <p:ph idx="1"/>
-          </p:nvPr>
-        </p:nvSpPr>
-        <p:spPr/>
-        <p:txBody>
-          <a:bodyPr/>
-          <a:lstStyle/>
-          <a:p>
-            <a:r>
-              <a:rPr lang="fr-FR" dirty="0"/>
-              <a:t>Romain</a:t>
-            </a:r>
-          </a:p>
-        </p:txBody>
-      </p:sp>
+          <p:cNvPicPr>
+            <a:picLocks noChangeAspect="1" noChangeArrowheads="1"/>
+          </p:cNvPicPr>
+          <p:nvPr/>
+        </p:nvPicPr>
+        <p:blipFill rotWithShape="1">
+          <a:blip r:embed="rId4">
+            <a:extLst>
+              <a:ext uri="{28A0092B-C50C-407E-A947-70E740481C1C}">
+                <a14:useLocalDpi xmlns:a14="http://schemas.microsoft.com/office/drawing/2010/main" val="0"/>
+              </a:ext>
+            </a:extLst>
+          </a:blip>
+          <a:srcRect l="20479" r="76"/>
+          <a:stretch/>
+        </p:blipFill>
+        <p:spPr bwMode="auto">
+          <a:xfrm>
+            <a:off x="20" y="10"/>
+            <a:ext cx="5448280" cy="6857990"/>
+          </a:xfrm>
+          <a:custGeom>
+            <a:avLst/>
+            <a:gdLst/>
+            <a:ahLst/>
+            <a:cxnLst/>
+            <a:rect l="l" t="t" r="r" b="b"/>
+            <a:pathLst>
+              <a:path w="5448300" h="6858000">
+                <a:moveTo>
+                  <a:pt x="0" y="0"/>
+                </a:moveTo>
+                <a:lnTo>
+                  <a:pt x="3513666" y="0"/>
+                </a:lnTo>
+                <a:lnTo>
+                  <a:pt x="2861733" y="2548466"/>
+                </a:lnTo>
+                <a:lnTo>
+                  <a:pt x="5448300" y="6853767"/>
+                </a:lnTo>
+                <a:lnTo>
+                  <a:pt x="0" y="6858000"/>
+                </a:lnTo>
+                <a:lnTo>
+                  <a:pt x="0" y="0"/>
+                </a:lnTo>
+                <a:close/>
+              </a:path>
+            </a:pathLst>
+          </a:custGeom>
+          <a:noFill/>
+          <a:ln w="38100">
+            <a:noFill/>
+          </a:ln>
+          <a:effectLst/>
+          <a:extLst>
+            <a:ext uri="{909E8E84-426E-40DD-AFC4-6F175D3DCCD1}">
+              <a14:hiddenFill xmlns:a14="http://schemas.microsoft.com/office/drawing/2010/main">
+                <a:solidFill>
+                  <a:srgbClr val="FFFFFF"/>
+                </a:solidFill>
+              </a14:hiddenFill>
+            </a:ext>
+          </a:extLst>
+        </p:spPr>
+      </p:pic>
     </p:spTree>
     <p:extLst>
       <p:ext uri="{BB962C8B-B14F-4D97-AF65-F5344CB8AC3E}">
-        <p14:creationId xmlns:p14="http://schemas.microsoft.com/office/powerpoint/2010/main" val="3949098132"/>
+        <p14:creationId xmlns:p14="http://schemas.microsoft.com/office/powerpoint/2010/main" val="3684896144"/>
       </p:ext>
     </p:extLst>
   </p:cSld>
@@ -8941,7 +10264,7 @@
           <p:cNvPr id="2" name="Titre 1">
             <a:extLst>
               <a:ext uri="{FF2B5EF4-FFF2-40B4-BE49-F238E27FC236}">
-                <a16:creationId xmlns:a16="http://schemas.microsoft.com/office/drawing/2014/main" id="{308E1324-ACA0-264A-A162-D9617696463C}"/>
+                <a16:creationId xmlns:a16="http://schemas.microsoft.com/office/drawing/2014/main" id="{50A08348-FE10-4CC5-AB62-DB28F7E51380}"/>
               </a:ext>
             </a:extLst>
           </p:cNvPr>
@@ -8952,29 +10275,24 @@
             <p:ph type="title"/>
           </p:nvPr>
         </p:nvSpPr>
-        <p:spPr>
-          <a:xfrm>
-            <a:off x="1086642" y="0"/>
-            <a:ext cx="10018713" cy="1752599"/>
-          </a:xfrm>
-        </p:spPr>
+        <p:spPr/>
         <p:txBody>
           <a:bodyPr/>
           <a:lstStyle/>
           <a:p>
             <a:r>
               <a:rPr lang="fr-FR" dirty="0"/>
-              <a:t>Planning prévisionnel</a:t>
-            </a:r>
-          </a:p>
-        </p:txBody>
-      </p:sp>
-      <p:sp>
-        <p:nvSpPr>
-          <p:cNvPr id="10" name="Espace réservé du contenu 9">
+              <a:t>Pourquoi l'agilité ?</a:t>
+            </a:r>
+          </a:p>
+        </p:txBody>
+      </p:sp>
+      <p:sp>
+        <p:nvSpPr>
+          <p:cNvPr id="3" name="Espace réservé du contenu 2">
             <a:extLst>
               <a:ext uri="{FF2B5EF4-FFF2-40B4-BE49-F238E27FC236}">
-                <a16:creationId xmlns:a16="http://schemas.microsoft.com/office/drawing/2014/main" id="{52AEAC9C-C55C-4C53-9AC0-4DB0416E48C7}"/>
+                <a16:creationId xmlns:a16="http://schemas.microsoft.com/office/drawing/2014/main" id="{00305290-5DE2-4A54-92FE-75957498674F}"/>
               </a:ext>
             </a:extLst>
           </p:cNvPr>
@@ -8985,23 +10303,1075 @@
             <p:ph idx="1"/>
           </p:nvPr>
         </p:nvSpPr>
-        <p:spPr/>
+        <p:spPr>
+          <a:xfrm>
+            <a:off x="1484310" y="2666999"/>
+            <a:ext cx="10018713" cy="513081"/>
+          </a:xfrm>
+        </p:spPr>
         <p:txBody>
           <a:bodyPr/>
           <a:lstStyle/>
           <a:p>
             <a:r>
-              <a:rPr lang="fr-FR" dirty="0" err="1"/>
-              <a:t>Valou</a:t>
-            </a:r>
-            <a:endParaRPr lang="fr-FR" dirty="0"/>
+              <a:rPr lang="fr-FR" dirty="0"/>
+              <a:t>Accroître la visibilité des projets avec le client</a:t>
+            </a:r>
+          </a:p>
+        </p:txBody>
+      </p:sp>
+      <p:sp>
+        <p:nvSpPr>
+          <p:cNvPr id="4" name="Espace réservé du contenu 2">
+            <a:extLst>
+              <a:ext uri="{FF2B5EF4-FFF2-40B4-BE49-F238E27FC236}">
+                <a16:creationId xmlns:a16="http://schemas.microsoft.com/office/drawing/2014/main" id="{4C0B5EE6-9F15-473E-A4EA-77EEEA4CE1F3}"/>
+              </a:ext>
+            </a:extLst>
+          </p:cNvPr>
+          <p:cNvSpPr txBox="1">
+            <a:spLocks/>
+          </p:cNvSpPr>
+          <p:nvPr/>
+        </p:nvSpPr>
+        <p:spPr>
+          <a:xfrm>
+            <a:off x="1484310" y="3172459"/>
+            <a:ext cx="10018713" cy="513081"/>
+          </a:xfrm>
+          <a:prstGeom prst="rect">
+            <a:avLst/>
+          </a:prstGeom>
+        </p:spPr>
+        <p:txBody>
+          <a:bodyPr vert="horz" lIns="91440" tIns="45720" rIns="91440" bIns="45720" rtlCol="0" anchor="ctr">
+            <a:normAutofit/>
+          </a:bodyPr>
+          <a:lstStyle>
+            <a:lvl1pPr marL="285750" indent="-285750" algn="l" defTabSz="457200" rtl="0" eaLnBrk="1" latinLnBrk="0" hangingPunct="1">
+              <a:spcBef>
+                <a:spcPct val="20000"/>
+              </a:spcBef>
+              <a:spcAft>
+                <a:spcPts val="600"/>
+              </a:spcAft>
+              <a:buClr>
+                <a:schemeClr val="accent1">
+                  <a:lumMod val="75000"/>
+                </a:schemeClr>
+              </a:buClr>
+              <a:buSzPct val="145000"/>
+              <a:buFont typeface="Arial"/>
+              <a:buChar char="•"/>
+              <a:defRPr sz="2400" kern="1200" cap="none">
+                <a:solidFill>
+                  <a:schemeClr val="tx1"/>
+                </a:solidFill>
+                <a:effectLst/>
+                <a:latin typeface="+mn-lt"/>
+                <a:ea typeface="+mn-ea"/>
+                <a:cs typeface="+mn-cs"/>
+              </a:defRPr>
+            </a:lvl1pPr>
+            <a:lvl2pPr marL="742950" indent="-285750" algn="l" defTabSz="457200" rtl="0" eaLnBrk="1" latinLnBrk="0" hangingPunct="1">
+              <a:spcBef>
+                <a:spcPct val="20000"/>
+              </a:spcBef>
+              <a:spcAft>
+                <a:spcPts val="600"/>
+              </a:spcAft>
+              <a:buClr>
+                <a:schemeClr val="accent1">
+                  <a:lumMod val="75000"/>
+                </a:schemeClr>
+              </a:buClr>
+              <a:buSzPct val="145000"/>
+              <a:buFont typeface="Arial"/>
+              <a:buChar char="•"/>
+              <a:defRPr sz="2000" kern="1200" cap="none">
+                <a:solidFill>
+                  <a:schemeClr val="tx1"/>
+                </a:solidFill>
+                <a:effectLst/>
+                <a:latin typeface="+mn-lt"/>
+                <a:ea typeface="+mn-ea"/>
+                <a:cs typeface="+mn-cs"/>
+              </a:defRPr>
+            </a:lvl2pPr>
+            <a:lvl3pPr marL="1200150" indent="-285750" algn="l" defTabSz="457200" rtl="0" eaLnBrk="1" latinLnBrk="0" hangingPunct="1">
+              <a:spcBef>
+                <a:spcPct val="20000"/>
+              </a:spcBef>
+              <a:spcAft>
+                <a:spcPts val="600"/>
+              </a:spcAft>
+              <a:buClr>
+                <a:schemeClr val="accent1">
+                  <a:lumMod val="75000"/>
+                </a:schemeClr>
+              </a:buClr>
+              <a:buSzPct val="145000"/>
+              <a:buFont typeface="Arial"/>
+              <a:buChar char="•"/>
+              <a:defRPr sz="1800" kern="1200" cap="none">
+                <a:solidFill>
+                  <a:schemeClr val="tx1"/>
+                </a:solidFill>
+                <a:effectLst/>
+                <a:latin typeface="+mn-lt"/>
+                <a:ea typeface="+mn-ea"/>
+                <a:cs typeface="+mn-cs"/>
+              </a:defRPr>
+            </a:lvl3pPr>
+            <a:lvl4pPr marL="1543050" indent="-171450" algn="l" defTabSz="457200" rtl="0" eaLnBrk="1" latinLnBrk="0" hangingPunct="1">
+              <a:spcBef>
+                <a:spcPct val="20000"/>
+              </a:spcBef>
+              <a:spcAft>
+                <a:spcPts val="600"/>
+              </a:spcAft>
+              <a:buClr>
+                <a:schemeClr val="accent1">
+                  <a:lumMod val="75000"/>
+                </a:schemeClr>
+              </a:buClr>
+              <a:buSzPct val="145000"/>
+              <a:buFont typeface="Arial"/>
+              <a:buChar char="•"/>
+              <a:defRPr sz="1600" kern="1200" cap="none">
+                <a:solidFill>
+                  <a:schemeClr val="tx1"/>
+                </a:solidFill>
+                <a:effectLst/>
+                <a:latin typeface="+mn-lt"/>
+                <a:ea typeface="+mn-ea"/>
+                <a:cs typeface="+mn-cs"/>
+              </a:defRPr>
+            </a:lvl4pPr>
+            <a:lvl5pPr marL="2000250" indent="-171450" algn="l" defTabSz="457200" rtl="0" eaLnBrk="1" latinLnBrk="0" hangingPunct="1">
+              <a:spcBef>
+                <a:spcPct val="20000"/>
+              </a:spcBef>
+              <a:spcAft>
+                <a:spcPts val="600"/>
+              </a:spcAft>
+              <a:buClr>
+                <a:schemeClr val="accent1">
+                  <a:lumMod val="75000"/>
+                </a:schemeClr>
+              </a:buClr>
+              <a:buSzPct val="145000"/>
+              <a:buFont typeface="Arial"/>
+              <a:buChar char="•"/>
+              <a:defRPr sz="1400" kern="1200" cap="none">
+                <a:solidFill>
+                  <a:schemeClr val="tx1"/>
+                </a:solidFill>
+                <a:effectLst/>
+                <a:latin typeface="+mn-lt"/>
+                <a:ea typeface="+mn-ea"/>
+                <a:cs typeface="+mn-cs"/>
+              </a:defRPr>
+            </a:lvl5pPr>
+            <a:lvl6pPr marL="2514600" indent="-228600" algn="l" defTabSz="457200" rtl="0" eaLnBrk="1" latinLnBrk="0" hangingPunct="1">
+              <a:spcBef>
+                <a:spcPct val="20000"/>
+              </a:spcBef>
+              <a:spcAft>
+                <a:spcPts val="600"/>
+              </a:spcAft>
+              <a:buClr>
+                <a:schemeClr val="accent1">
+                  <a:lumMod val="75000"/>
+                </a:schemeClr>
+              </a:buClr>
+              <a:buSzPct val="145000"/>
+              <a:buFont typeface="Arial"/>
+              <a:buChar char="•"/>
+              <a:defRPr sz="1400" kern="1200" cap="none">
+                <a:solidFill>
+                  <a:schemeClr val="tx1"/>
+                </a:solidFill>
+                <a:effectLst/>
+                <a:latin typeface="+mn-lt"/>
+                <a:ea typeface="+mn-ea"/>
+                <a:cs typeface="+mn-cs"/>
+              </a:defRPr>
+            </a:lvl6pPr>
+            <a:lvl7pPr marL="2971800" indent="-228600" algn="l" defTabSz="457200" rtl="0" eaLnBrk="1" latinLnBrk="0" hangingPunct="1">
+              <a:spcBef>
+                <a:spcPct val="20000"/>
+              </a:spcBef>
+              <a:spcAft>
+                <a:spcPts val="600"/>
+              </a:spcAft>
+              <a:buClr>
+                <a:schemeClr val="accent1">
+                  <a:lumMod val="75000"/>
+                </a:schemeClr>
+              </a:buClr>
+              <a:buSzPct val="145000"/>
+              <a:buFont typeface="Arial"/>
+              <a:buChar char="•"/>
+              <a:defRPr sz="1400" kern="1200" cap="none">
+                <a:solidFill>
+                  <a:schemeClr val="tx1"/>
+                </a:solidFill>
+                <a:effectLst/>
+                <a:latin typeface="+mn-lt"/>
+                <a:ea typeface="+mn-ea"/>
+                <a:cs typeface="+mn-cs"/>
+              </a:defRPr>
+            </a:lvl7pPr>
+            <a:lvl8pPr marL="3429000" indent="-228600" algn="l" defTabSz="457200" rtl="0" eaLnBrk="1" latinLnBrk="0" hangingPunct="1">
+              <a:spcBef>
+                <a:spcPct val="20000"/>
+              </a:spcBef>
+              <a:spcAft>
+                <a:spcPts val="600"/>
+              </a:spcAft>
+              <a:buClr>
+                <a:schemeClr val="accent1">
+                  <a:lumMod val="75000"/>
+                </a:schemeClr>
+              </a:buClr>
+              <a:buSzPct val="145000"/>
+              <a:buFont typeface="Arial"/>
+              <a:buChar char="•"/>
+              <a:defRPr sz="1400" kern="1200" cap="none">
+                <a:solidFill>
+                  <a:schemeClr val="tx1"/>
+                </a:solidFill>
+                <a:effectLst/>
+                <a:latin typeface="+mn-lt"/>
+                <a:ea typeface="+mn-ea"/>
+                <a:cs typeface="+mn-cs"/>
+              </a:defRPr>
+            </a:lvl8pPr>
+            <a:lvl9pPr marL="3886200" indent="-228600" algn="l" defTabSz="457200" rtl="0" eaLnBrk="1" latinLnBrk="0" hangingPunct="1">
+              <a:spcBef>
+                <a:spcPct val="20000"/>
+              </a:spcBef>
+              <a:spcAft>
+                <a:spcPts val="600"/>
+              </a:spcAft>
+              <a:buClr>
+                <a:schemeClr val="accent1">
+                  <a:lumMod val="75000"/>
+                </a:schemeClr>
+              </a:buClr>
+              <a:buSzPct val="145000"/>
+              <a:buFont typeface="Arial"/>
+              <a:buChar char="•"/>
+              <a:defRPr sz="1400" kern="1200" cap="none">
+                <a:solidFill>
+                  <a:schemeClr val="tx1"/>
+                </a:solidFill>
+                <a:effectLst/>
+                <a:latin typeface="+mn-lt"/>
+                <a:ea typeface="+mn-ea"/>
+                <a:cs typeface="+mn-cs"/>
+              </a:defRPr>
+            </a:lvl9pPr>
+          </a:lstStyle>
+          <a:p>
+            <a:r>
+              <a:rPr lang="fr-FR" dirty="0"/>
+              <a:t>Faire face à la conduite du changement</a:t>
+            </a:r>
+          </a:p>
+        </p:txBody>
+      </p:sp>
+      <p:sp>
+        <p:nvSpPr>
+          <p:cNvPr id="6" name="Espace réservé du contenu 2">
+            <a:extLst>
+              <a:ext uri="{FF2B5EF4-FFF2-40B4-BE49-F238E27FC236}">
+                <a16:creationId xmlns:a16="http://schemas.microsoft.com/office/drawing/2014/main" id="{BCBAFD2E-3BD9-4E39-874C-66B275D0F0DC}"/>
+              </a:ext>
+            </a:extLst>
+          </p:cNvPr>
+          <p:cNvSpPr txBox="1">
+            <a:spLocks/>
+          </p:cNvSpPr>
+          <p:nvPr/>
+        </p:nvSpPr>
+        <p:spPr>
+          <a:xfrm>
+            <a:off x="1484310" y="3677919"/>
+            <a:ext cx="10018713" cy="513081"/>
+          </a:xfrm>
+          <a:prstGeom prst="rect">
+            <a:avLst/>
+          </a:prstGeom>
+        </p:spPr>
+        <p:txBody>
+          <a:bodyPr vert="horz" lIns="91440" tIns="45720" rIns="91440" bIns="45720" rtlCol="0" anchor="ctr">
+            <a:normAutofit/>
+          </a:bodyPr>
+          <a:lstStyle>
+            <a:lvl1pPr marL="285750" indent="-285750" algn="l" defTabSz="457200" rtl="0" eaLnBrk="1" latinLnBrk="0" hangingPunct="1">
+              <a:spcBef>
+                <a:spcPct val="20000"/>
+              </a:spcBef>
+              <a:spcAft>
+                <a:spcPts val="600"/>
+              </a:spcAft>
+              <a:buClr>
+                <a:schemeClr val="accent1">
+                  <a:lumMod val="75000"/>
+                </a:schemeClr>
+              </a:buClr>
+              <a:buSzPct val="145000"/>
+              <a:buFont typeface="Arial"/>
+              <a:buChar char="•"/>
+              <a:defRPr sz="2400" kern="1200" cap="none">
+                <a:solidFill>
+                  <a:schemeClr val="tx1"/>
+                </a:solidFill>
+                <a:effectLst/>
+                <a:latin typeface="+mn-lt"/>
+                <a:ea typeface="+mn-ea"/>
+                <a:cs typeface="+mn-cs"/>
+              </a:defRPr>
+            </a:lvl1pPr>
+            <a:lvl2pPr marL="742950" indent="-285750" algn="l" defTabSz="457200" rtl="0" eaLnBrk="1" latinLnBrk="0" hangingPunct="1">
+              <a:spcBef>
+                <a:spcPct val="20000"/>
+              </a:spcBef>
+              <a:spcAft>
+                <a:spcPts val="600"/>
+              </a:spcAft>
+              <a:buClr>
+                <a:schemeClr val="accent1">
+                  <a:lumMod val="75000"/>
+                </a:schemeClr>
+              </a:buClr>
+              <a:buSzPct val="145000"/>
+              <a:buFont typeface="Arial"/>
+              <a:buChar char="•"/>
+              <a:defRPr sz="2000" kern="1200" cap="none">
+                <a:solidFill>
+                  <a:schemeClr val="tx1"/>
+                </a:solidFill>
+                <a:effectLst/>
+                <a:latin typeface="+mn-lt"/>
+                <a:ea typeface="+mn-ea"/>
+                <a:cs typeface="+mn-cs"/>
+              </a:defRPr>
+            </a:lvl2pPr>
+            <a:lvl3pPr marL="1200150" indent="-285750" algn="l" defTabSz="457200" rtl="0" eaLnBrk="1" latinLnBrk="0" hangingPunct="1">
+              <a:spcBef>
+                <a:spcPct val="20000"/>
+              </a:spcBef>
+              <a:spcAft>
+                <a:spcPts val="600"/>
+              </a:spcAft>
+              <a:buClr>
+                <a:schemeClr val="accent1">
+                  <a:lumMod val="75000"/>
+                </a:schemeClr>
+              </a:buClr>
+              <a:buSzPct val="145000"/>
+              <a:buFont typeface="Arial"/>
+              <a:buChar char="•"/>
+              <a:defRPr sz="1800" kern="1200" cap="none">
+                <a:solidFill>
+                  <a:schemeClr val="tx1"/>
+                </a:solidFill>
+                <a:effectLst/>
+                <a:latin typeface="+mn-lt"/>
+                <a:ea typeface="+mn-ea"/>
+                <a:cs typeface="+mn-cs"/>
+              </a:defRPr>
+            </a:lvl3pPr>
+            <a:lvl4pPr marL="1543050" indent="-171450" algn="l" defTabSz="457200" rtl="0" eaLnBrk="1" latinLnBrk="0" hangingPunct="1">
+              <a:spcBef>
+                <a:spcPct val="20000"/>
+              </a:spcBef>
+              <a:spcAft>
+                <a:spcPts val="600"/>
+              </a:spcAft>
+              <a:buClr>
+                <a:schemeClr val="accent1">
+                  <a:lumMod val="75000"/>
+                </a:schemeClr>
+              </a:buClr>
+              <a:buSzPct val="145000"/>
+              <a:buFont typeface="Arial"/>
+              <a:buChar char="•"/>
+              <a:defRPr sz="1600" kern="1200" cap="none">
+                <a:solidFill>
+                  <a:schemeClr val="tx1"/>
+                </a:solidFill>
+                <a:effectLst/>
+                <a:latin typeface="+mn-lt"/>
+                <a:ea typeface="+mn-ea"/>
+                <a:cs typeface="+mn-cs"/>
+              </a:defRPr>
+            </a:lvl4pPr>
+            <a:lvl5pPr marL="2000250" indent="-171450" algn="l" defTabSz="457200" rtl="0" eaLnBrk="1" latinLnBrk="0" hangingPunct="1">
+              <a:spcBef>
+                <a:spcPct val="20000"/>
+              </a:spcBef>
+              <a:spcAft>
+                <a:spcPts val="600"/>
+              </a:spcAft>
+              <a:buClr>
+                <a:schemeClr val="accent1">
+                  <a:lumMod val="75000"/>
+                </a:schemeClr>
+              </a:buClr>
+              <a:buSzPct val="145000"/>
+              <a:buFont typeface="Arial"/>
+              <a:buChar char="•"/>
+              <a:defRPr sz="1400" kern="1200" cap="none">
+                <a:solidFill>
+                  <a:schemeClr val="tx1"/>
+                </a:solidFill>
+                <a:effectLst/>
+                <a:latin typeface="+mn-lt"/>
+                <a:ea typeface="+mn-ea"/>
+                <a:cs typeface="+mn-cs"/>
+              </a:defRPr>
+            </a:lvl5pPr>
+            <a:lvl6pPr marL="2514600" indent="-228600" algn="l" defTabSz="457200" rtl="0" eaLnBrk="1" latinLnBrk="0" hangingPunct="1">
+              <a:spcBef>
+                <a:spcPct val="20000"/>
+              </a:spcBef>
+              <a:spcAft>
+                <a:spcPts val="600"/>
+              </a:spcAft>
+              <a:buClr>
+                <a:schemeClr val="accent1">
+                  <a:lumMod val="75000"/>
+                </a:schemeClr>
+              </a:buClr>
+              <a:buSzPct val="145000"/>
+              <a:buFont typeface="Arial"/>
+              <a:buChar char="•"/>
+              <a:defRPr sz="1400" kern="1200" cap="none">
+                <a:solidFill>
+                  <a:schemeClr val="tx1"/>
+                </a:solidFill>
+                <a:effectLst/>
+                <a:latin typeface="+mn-lt"/>
+                <a:ea typeface="+mn-ea"/>
+                <a:cs typeface="+mn-cs"/>
+              </a:defRPr>
+            </a:lvl6pPr>
+            <a:lvl7pPr marL="2971800" indent="-228600" algn="l" defTabSz="457200" rtl="0" eaLnBrk="1" latinLnBrk="0" hangingPunct="1">
+              <a:spcBef>
+                <a:spcPct val="20000"/>
+              </a:spcBef>
+              <a:spcAft>
+                <a:spcPts val="600"/>
+              </a:spcAft>
+              <a:buClr>
+                <a:schemeClr val="accent1">
+                  <a:lumMod val="75000"/>
+                </a:schemeClr>
+              </a:buClr>
+              <a:buSzPct val="145000"/>
+              <a:buFont typeface="Arial"/>
+              <a:buChar char="•"/>
+              <a:defRPr sz="1400" kern="1200" cap="none">
+                <a:solidFill>
+                  <a:schemeClr val="tx1"/>
+                </a:solidFill>
+                <a:effectLst/>
+                <a:latin typeface="+mn-lt"/>
+                <a:ea typeface="+mn-ea"/>
+                <a:cs typeface="+mn-cs"/>
+              </a:defRPr>
+            </a:lvl7pPr>
+            <a:lvl8pPr marL="3429000" indent="-228600" algn="l" defTabSz="457200" rtl="0" eaLnBrk="1" latinLnBrk="0" hangingPunct="1">
+              <a:spcBef>
+                <a:spcPct val="20000"/>
+              </a:spcBef>
+              <a:spcAft>
+                <a:spcPts val="600"/>
+              </a:spcAft>
+              <a:buClr>
+                <a:schemeClr val="accent1">
+                  <a:lumMod val="75000"/>
+                </a:schemeClr>
+              </a:buClr>
+              <a:buSzPct val="145000"/>
+              <a:buFont typeface="Arial"/>
+              <a:buChar char="•"/>
+              <a:defRPr sz="1400" kern="1200" cap="none">
+                <a:solidFill>
+                  <a:schemeClr val="tx1"/>
+                </a:solidFill>
+                <a:effectLst/>
+                <a:latin typeface="+mn-lt"/>
+                <a:ea typeface="+mn-ea"/>
+                <a:cs typeface="+mn-cs"/>
+              </a:defRPr>
+            </a:lvl8pPr>
+            <a:lvl9pPr marL="3886200" indent="-228600" algn="l" defTabSz="457200" rtl="0" eaLnBrk="1" latinLnBrk="0" hangingPunct="1">
+              <a:spcBef>
+                <a:spcPct val="20000"/>
+              </a:spcBef>
+              <a:spcAft>
+                <a:spcPts val="600"/>
+              </a:spcAft>
+              <a:buClr>
+                <a:schemeClr val="accent1">
+                  <a:lumMod val="75000"/>
+                </a:schemeClr>
+              </a:buClr>
+              <a:buSzPct val="145000"/>
+              <a:buFont typeface="Arial"/>
+              <a:buChar char="•"/>
+              <a:defRPr sz="1400" kern="1200" cap="none">
+                <a:solidFill>
+                  <a:schemeClr val="tx1"/>
+                </a:solidFill>
+                <a:effectLst/>
+                <a:latin typeface="+mn-lt"/>
+                <a:ea typeface="+mn-ea"/>
+                <a:cs typeface="+mn-cs"/>
+              </a:defRPr>
+            </a:lvl9pPr>
+          </a:lstStyle>
+          <a:p>
+            <a:r>
+              <a:rPr lang="fr-FR" dirty="0"/>
+              <a:t>Livraisons de meilleure qualité</a:t>
+            </a:r>
+          </a:p>
+        </p:txBody>
+      </p:sp>
+      <p:sp>
+        <p:nvSpPr>
+          <p:cNvPr id="7" name="Espace réservé du contenu 2">
+            <a:extLst>
+              <a:ext uri="{FF2B5EF4-FFF2-40B4-BE49-F238E27FC236}">
+                <a16:creationId xmlns:a16="http://schemas.microsoft.com/office/drawing/2014/main" id="{EFA4C839-E11C-48B6-9685-5AAC9827FCDF}"/>
+              </a:ext>
+            </a:extLst>
+          </p:cNvPr>
+          <p:cNvSpPr txBox="1">
+            <a:spLocks/>
+          </p:cNvSpPr>
+          <p:nvPr/>
+        </p:nvSpPr>
+        <p:spPr>
+          <a:xfrm>
+            <a:off x="1484310" y="4191000"/>
+            <a:ext cx="10018713" cy="513081"/>
+          </a:xfrm>
+          <a:prstGeom prst="rect">
+            <a:avLst/>
+          </a:prstGeom>
+        </p:spPr>
+        <p:txBody>
+          <a:bodyPr vert="horz" lIns="91440" tIns="45720" rIns="91440" bIns="45720" rtlCol="0" anchor="ctr">
+            <a:normAutofit/>
+          </a:bodyPr>
+          <a:lstStyle>
+            <a:lvl1pPr marL="285750" indent="-285750" algn="l" defTabSz="457200" rtl="0" eaLnBrk="1" latinLnBrk="0" hangingPunct="1">
+              <a:spcBef>
+                <a:spcPct val="20000"/>
+              </a:spcBef>
+              <a:spcAft>
+                <a:spcPts val="600"/>
+              </a:spcAft>
+              <a:buClr>
+                <a:schemeClr val="accent1">
+                  <a:lumMod val="75000"/>
+                </a:schemeClr>
+              </a:buClr>
+              <a:buSzPct val="145000"/>
+              <a:buFont typeface="Arial"/>
+              <a:buChar char="•"/>
+              <a:defRPr sz="2400" kern="1200" cap="none">
+                <a:solidFill>
+                  <a:schemeClr val="tx1"/>
+                </a:solidFill>
+                <a:effectLst/>
+                <a:latin typeface="+mn-lt"/>
+                <a:ea typeface="+mn-ea"/>
+                <a:cs typeface="+mn-cs"/>
+              </a:defRPr>
+            </a:lvl1pPr>
+            <a:lvl2pPr marL="742950" indent="-285750" algn="l" defTabSz="457200" rtl="0" eaLnBrk="1" latinLnBrk="0" hangingPunct="1">
+              <a:spcBef>
+                <a:spcPct val="20000"/>
+              </a:spcBef>
+              <a:spcAft>
+                <a:spcPts val="600"/>
+              </a:spcAft>
+              <a:buClr>
+                <a:schemeClr val="accent1">
+                  <a:lumMod val="75000"/>
+                </a:schemeClr>
+              </a:buClr>
+              <a:buSzPct val="145000"/>
+              <a:buFont typeface="Arial"/>
+              <a:buChar char="•"/>
+              <a:defRPr sz="2000" kern="1200" cap="none">
+                <a:solidFill>
+                  <a:schemeClr val="tx1"/>
+                </a:solidFill>
+                <a:effectLst/>
+                <a:latin typeface="+mn-lt"/>
+                <a:ea typeface="+mn-ea"/>
+                <a:cs typeface="+mn-cs"/>
+              </a:defRPr>
+            </a:lvl2pPr>
+            <a:lvl3pPr marL="1200150" indent="-285750" algn="l" defTabSz="457200" rtl="0" eaLnBrk="1" latinLnBrk="0" hangingPunct="1">
+              <a:spcBef>
+                <a:spcPct val="20000"/>
+              </a:spcBef>
+              <a:spcAft>
+                <a:spcPts val="600"/>
+              </a:spcAft>
+              <a:buClr>
+                <a:schemeClr val="accent1">
+                  <a:lumMod val="75000"/>
+                </a:schemeClr>
+              </a:buClr>
+              <a:buSzPct val="145000"/>
+              <a:buFont typeface="Arial"/>
+              <a:buChar char="•"/>
+              <a:defRPr sz="1800" kern="1200" cap="none">
+                <a:solidFill>
+                  <a:schemeClr val="tx1"/>
+                </a:solidFill>
+                <a:effectLst/>
+                <a:latin typeface="+mn-lt"/>
+                <a:ea typeface="+mn-ea"/>
+                <a:cs typeface="+mn-cs"/>
+              </a:defRPr>
+            </a:lvl3pPr>
+            <a:lvl4pPr marL="1543050" indent="-171450" algn="l" defTabSz="457200" rtl="0" eaLnBrk="1" latinLnBrk="0" hangingPunct="1">
+              <a:spcBef>
+                <a:spcPct val="20000"/>
+              </a:spcBef>
+              <a:spcAft>
+                <a:spcPts val="600"/>
+              </a:spcAft>
+              <a:buClr>
+                <a:schemeClr val="accent1">
+                  <a:lumMod val="75000"/>
+                </a:schemeClr>
+              </a:buClr>
+              <a:buSzPct val="145000"/>
+              <a:buFont typeface="Arial"/>
+              <a:buChar char="•"/>
+              <a:defRPr sz="1600" kern="1200" cap="none">
+                <a:solidFill>
+                  <a:schemeClr val="tx1"/>
+                </a:solidFill>
+                <a:effectLst/>
+                <a:latin typeface="+mn-lt"/>
+                <a:ea typeface="+mn-ea"/>
+                <a:cs typeface="+mn-cs"/>
+              </a:defRPr>
+            </a:lvl4pPr>
+            <a:lvl5pPr marL="2000250" indent="-171450" algn="l" defTabSz="457200" rtl="0" eaLnBrk="1" latinLnBrk="0" hangingPunct="1">
+              <a:spcBef>
+                <a:spcPct val="20000"/>
+              </a:spcBef>
+              <a:spcAft>
+                <a:spcPts val="600"/>
+              </a:spcAft>
+              <a:buClr>
+                <a:schemeClr val="accent1">
+                  <a:lumMod val="75000"/>
+                </a:schemeClr>
+              </a:buClr>
+              <a:buSzPct val="145000"/>
+              <a:buFont typeface="Arial"/>
+              <a:buChar char="•"/>
+              <a:defRPr sz="1400" kern="1200" cap="none">
+                <a:solidFill>
+                  <a:schemeClr val="tx1"/>
+                </a:solidFill>
+                <a:effectLst/>
+                <a:latin typeface="+mn-lt"/>
+                <a:ea typeface="+mn-ea"/>
+                <a:cs typeface="+mn-cs"/>
+              </a:defRPr>
+            </a:lvl5pPr>
+            <a:lvl6pPr marL="2514600" indent="-228600" algn="l" defTabSz="457200" rtl="0" eaLnBrk="1" latinLnBrk="0" hangingPunct="1">
+              <a:spcBef>
+                <a:spcPct val="20000"/>
+              </a:spcBef>
+              <a:spcAft>
+                <a:spcPts val="600"/>
+              </a:spcAft>
+              <a:buClr>
+                <a:schemeClr val="accent1">
+                  <a:lumMod val="75000"/>
+                </a:schemeClr>
+              </a:buClr>
+              <a:buSzPct val="145000"/>
+              <a:buFont typeface="Arial"/>
+              <a:buChar char="•"/>
+              <a:defRPr sz="1400" kern="1200" cap="none">
+                <a:solidFill>
+                  <a:schemeClr val="tx1"/>
+                </a:solidFill>
+                <a:effectLst/>
+                <a:latin typeface="+mn-lt"/>
+                <a:ea typeface="+mn-ea"/>
+                <a:cs typeface="+mn-cs"/>
+              </a:defRPr>
+            </a:lvl6pPr>
+            <a:lvl7pPr marL="2971800" indent="-228600" algn="l" defTabSz="457200" rtl="0" eaLnBrk="1" latinLnBrk="0" hangingPunct="1">
+              <a:spcBef>
+                <a:spcPct val="20000"/>
+              </a:spcBef>
+              <a:spcAft>
+                <a:spcPts val="600"/>
+              </a:spcAft>
+              <a:buClr>
+                <a:schemeClr val="accent1">
+                  <a:lumMod val="75000"/>
+                </a:schemeClr>
+              </a:buClr>
+              <a:buSzPct val="145000"/>
+              <a:buFont typeface="Arial"/>
+              <a:buChar char="•"/>
+              <a:defRPr sz="1400" kern="1200" cap="none">
+                <a:solidFill>
+                  <a:schemeClr val="tx1"/>
+                </a:solidFill>
+                <a:effectLst/>
+                <a:latin typeface="+mn-lt"/>
+                <a:ea typeface="+mn-ea"/>
+                <a:cs typeface="+mn-cs"/>
+              </a:defRPr>
+            </a:lvl7pPr>
+            <a:lvl8pPr marL="3429000" indent="-228600" algn="l" defTabSz="457200" rtl="0" eaLnBrk="1" latinLnBrk="0" hangingPunct="1">
+              <a:spcBef>
+                <a:spcPct val="20000"/>
+              </a:spcBef>
+              <a:spcAft>
+                <a:spcPts val="600"/>
+              </a:spcAft>
+              <a:buClr>
+                <a:schemeClr val="accent1">
+                  <a:lumMod val="75000"/>
+                </a:schemeClr>
+              </a:buClr>
+              <a:buSzPct val="145000"/>
+              <a:buFont typeface="Arial"/>
+              <a:buChar char="•"/>
+              <a:defRPr sz="1400" kern="1200" cap="none">
+                <a:solidFill>
+                  <a:schemeClr val="tx1"/>
+                </a:solidFill>
+                <a:effectLst/>
+                <a:latin typeface="+mn-lt"/>
+                <a:ea typeface="+mn-ea"/>
+                <a:cs typeface="+mn-cs"/>
+              </a:defRPr>
+            </a:lvl8pPr>
+            <a:lvl9pPr marL="3886200" indent="-228600" algn="l" defTabSz="457200" rtl="0" eaLnBrk="1" latinLnBrk="0" hangingPunct="1">
+              <a:spcBef>
+                <a:spcPct val="20000"/>
+              </a:spcBef>
+              <a:spcAft>
+                <a:spcPts val="600"/>
+              </a:spcAft>
+              <a:buClr>
+                <a:schemeClr val="accent1">
+                  <a:lumMod val="75000"/>
+                </a:schemeClr>
+              </a:buClr>
+              <a:buSzPct val="145000"/>
+              <a:buFont typeface="Arial"/>
+              <a:buChar char="•"/>
+              <a:defRPr sz="1400" kern="1200" cap="none">
+                <a:solidFill>
+                  <a:schemeClr val="tx1"/>
+                </a:solidFill>
+                <a:effectLst/>
+                <a:latin typeface="+mn-lt"/>
+                <a:ea typeface="+mn-ea"/>
+                <a:cs typeface="+mn-cs"/>
+              </a:defRPr>
+            </a:lvl9pPr>
+          </a:lstStyle>
+          <a:p>
+            <a:r>
+              <a:rPr lang="fr-FR" dirty="0"/>
+              <a:t>Une cohésion d'équipe renforcée</a:t>
+            </a:r>
+          </a:p>
+        </p:txBody>
+      </p:sp>
+      <p:sp>
+        <p:nvSpPr>
+          <p:cNvPr id="8" name="Espace réservé du contenu 2">
+            <a:extLst>
+              <a:ext uri="{FF2B5EF4-FFF2-40B4-BE49-F238E27FC236}">
+                <a16:creationId xmlns:a16="http://schemas.microsoft.com/office/drawing/2014/main" id="{5F968574-E080-40D6-AD56-976FC7ED50D5}"/>
+              </a:ext>
+            </a:extLst>
+          </p:cNvPr>
+          <p:cNvSpPr txBox="1">
+            <a:spLocks/>
+          </p:cNvSpPr>
+          <p:nvPr/>
+        </p:nvSpPr>
+        <p:spPr>
+          <a:xfrm>
+            <a:off x="1484310" y="4688839"/>
+            <a:ext cx="10018713" cy="513081"/>
+          </a:xfrm>
+          <a:prstGeom prst="rect">
+            <a:avLst/>
+          </a:prstGeom>
+        </p:spPr>
+        <p:txBody>
+          <a:bodyPr vert="horz" lIns="91440" tIns="45720" rIns="91440" bIns="45720" rtlCol="0" anchor="ctr">
+            <a:normAutofit/>
+          </a:bodyPr>
+          <a:lstStyle>
+            <a:lvl1pPr marL="285750" indent="-285750" algn="l" defTabSz="457200" rtl="0" eaLnBrk="1" latinLnBrk="0" hangingPunct="1">
+              <a:spcBef>
+                <a:spcPct val="20000"/>
+              </a:spcBef>
+              <a:spcAft>
+                <a:spcPts val="600"/>
+              </a:spcAft>
+              <a:buClr>
+                <a:schemeClr val="accent1">
+                  <a:lumMod val="75000"/>
+                </a:schemeClr>
+              </a:buClr>
+              <a:buSzPct val="145000"/>
+              <a:buFont typeface="Arial"/>
+              <a:buChar char="•"/>
+              <a:defRPr sz="2400" kern="1200" cap="none">
+                <a:solidFill>
+                  <a:schemeClr val="tx1"/>
+                </a:solidFill>
+                <a:effectLst/>
+                <a:latin typeface="+mn-lt"/>
+                <a:ea typeface="+mn-ea"/>
+                <a:cs typeface="+mn-cs"/>
+              </a:defRPr>
+            </a:lvl1pPr>
+            <a:lvl2pPr marL="742950" indent="-285750" algn="l" defTabSz="457200" rtl="0" eaLnBrk="1" latinLnBrk="0" hangingPunct="1">
+              <a:spcBef>
+                <a:spcPct val="20000"/>
+              </a:spcBef>
+              <a:spcAft>
+                <a:spcPts val="600"/>
+              </a:spcAft>
+              <a:buClr>
+                <a:schemeClr val="accent1">
+                  <a:lumMod val="75000"/>
+                </a:schemeClr>
+              </a:buClr>
+              <a:buSzPct val="145000"/>
+              <a:buFont typeface="Arial"/>
+              <a:buChar char="•"/>
+              <a:defRPr sz="2000" kern="1200" cap="none">
+                <a:solidFill>
+                  <a:schemeClr val="tx1"/>
+                </a:solidFill>
+                <a:effectLst/>
+                <a:latin typeface="+mn-lt"/>
+                <a:ea typeface="+mn-ea"/>
+                <a:cs typeface="+mn-cs"/>
+              </a:defRPr>
+            </a:lvl2pPr>
+            <a:lvl3pPr marL="1200150" indent="-285750" algn="l" defTabSz="457200" rtl="0" eaLnBrk="1" latinLnBrk="0" hangingPunct="1">
+              <a:spcBef>
+                <a:spcPct val="20000"/>
+              </a:spcBef>
+              <a:spcAft>
+                <a:spcPts val="600"/>
+              </a:spcAft>
+              <a:buClr>
+                <a:schemeClr val="accent1">
+                  <a:lumMod val="75000"/>
+                </a:schemeClr>
+              </a:buClr>
+              <a:buSzPct val="145000"/>
+              <a:buFont typeface="Arial"/>
+              <a:buChar char="•"/>
+              <a:defRPr sz="1800" kern="1200" cap="none">
+                <a:solidFill>
+                  <a:schemeClr val="tx1"/>
+                </a:solidFill>
+                <a:effectLst/>
+                <a:latin typeface="+mn-lt"/>
+                <a:ea typeface="+mn-ea"/>
+                <a:cs typeface="+mn-cs"/>
+              </a:defRPr>
+            </a:lvl3pPr>
+            <a:lvl4pPr marL="1543050" indent="-171450" algn="l" defTabSz="457200" rtl="0" eaLnBrk="1" latinLnBrk="0" hangingPunct="1">
+              <a:spcBef>
+                <a:spcPct val="20000"/>
+              </a:spcBef>
+              <a:spcAft>
+                <a:spcPts val="600"/>
+              </a:spcAft>
+              <a:buClr>
+                <a:schemeClr val="accent1">
+                  <a:lumMod val="75000"/>
+                </a:schemeClr>
+              </a:buClr>
+              <a:buSzPct val="145000"/>
+              <a:buFont typeface="Arial"/>
+              <a:buChar char="•"/>
+              <a:defRPr sz="1600" kern="1200" cap="none">
+                <a:solidFill>
+                  <a:schemeClr val="tx1"/>
+                </a:solidFill>
+                <a:effectLst/>
+                <a:latin typeface="+mn-lt"/>
+                <a:ea typeface="+mn-ea"/>
+                <a:cs typeface="+mn-cs"/>
+              </a:defRPr>
+            </a:lvl4pPr>
+            <a:lvl5pPr marL="2000250" indent="-171450" algn="l" defTabSz="457200" rtl="0" eaLnBrk="1" latinLnBrk="0" hangingPunct="1">
+              <a:spcBef>
+                <a:spcPct val="20000"/>
+              </a:spcBef>
+              <a:spcAft>
+                <a:spcPts val="600"/>
+              </a:spcAft>
+              <a:buClr>
+                <a:schemeClr val="accent1">
+                  <a:lumMod val="75000"/>
+                </a:schemeClr>
+              </a:buClr>
+              <a:buSzPct val="145000"/>
+              <a:buFont typeface="Arial"/>
+              <a:buChar char="•"/>
+              <a:defRPr sz="1400" kern="1200" cap="none">
+                <a:solidFill>
+                  <a:schemeClr val="tx1"/>
+                </a:solidFill>
+                <a:effectLst/>
+                <a:latin typeface="+mn-lt"/>
+                <a:ea typeface="+mn-ea"/>
+                <a:cs typeface="+mn-cs"/>
+              </a:defRPr>
+            </a:lvl5pPr>
+            <a:lvl6pPr marL="2514600" indent="-228600" algn="l" defTabSz="457200" rtl="0" eaLnBrk="1" latinLnBrk="0" hangingPunct="1">
+              <a:spcBef>
+                <a:spcPct val="20000"/>
+              </a:spcBef>
+              <a:spcAft>
+                <a:spcPts val="600"/>
+              </a:spcAft>
+              <a:buClr>
+                <a:schemeClr val="accent1">
+                  <a:lumMod val="75000"/>
+                </a:schemeClr>
+              </a:buClr>
+              <a:buSzPct val="145000"/>
+              <a:buFont typeface="Arial"/>
+              <a:buChar char="•"/>
+              <a:defRPr sz="1400" kern="1200" cap="none">
+                <a:solidFill>
+                  <a:schemeClr val="tx1"/>
+                </a:solidFill>
+                <a:effectLst/>
+                <a:latin typeface="+mn-lt"/>
+                <a:ea typeface="+mn-ea"/>
+                <a:cs typeface="+mn-cs"/>
+              </a:defRPr>
+            </a:lvl6pPr>
+            <a:lvl7pPr marL="2971800" indent="-228600" algn="l" defTabSz="457200" rtl="0" eaLnBrk="1" latinLnBrk="0" hangingPunct="1">
+              <a:spcBef>
+                <a:spcPct val="20000"/>
+              </a:spcBef>
+              <a:spcAft>
+                <a:spcPts val="600"/>
+              </a:spcAft>
+              <a:buClr>
+                <a:schemeClr val="accent1">
+                  <a:lumMod val="75000"/>
+                </a:schemeClr>
+              </a:buClr>
+              <a:buSzPct val="145000"/>
+              <a:buFont typeface="Arial"/>
+              <a:buChar char="•"/>
+              <a:defRPr sz="1400" kern="1200" cap="none">
+                <a:solidFill>
+                  <a:schemeClr val="tx1"/>
+                </a:solidFill>
+                <a:effectLst/>
+                <a:latin typeface="+mn-lt"/>
+                <a:ea typeface="+mn-ea"/>
+                <a:cs typeface="+mn-cs"/>
+              </a:defRPr>
+            </a:lvl7pPr>
+            <a:lvl8pPr marL="3429000" indent="-228600" algn="l" defTabSz="457200" rtl="0" eaLnBrk="1" latinLnBrk="0" hangingPunct="1">
+              <a:spcBef>
+                <a:spcPct val="20000"/>
+              </a:spcBef>
+              <a:spcAft>
+                <a:spcPts val="600"/>
+              </a:spcAft>
+              <a:buClr>
+                <a:schemeClr val="accent1">
+                  <a:lumMod val="75000"/>
+                </a:schemeClr>
+              </a:buClr>
+              <a:buSzPct val="145000"/>
+              <a:buFont typeface="Arial"/>
+              <a:buChar char="•"/>
+              <a:defRPr sz="1400" kern="1200" cap="none">
+                <a:solidFill>
+                  <a:schemeClr val="tx1"/>
+                </a:solidFill>
+                <a:effectLst/>
+                <a:latin typeface="+mn-lt"/>
+                <a:ea typeface="+mn-ea"/>
+                <a:cs typeface="+mn-cs"/>
+              </a:defRPr>
+            </a:lvl8pPr>
+            <a:lvl9pPr marL="3886200" indent="-228600" algn="l" defTabSz="457200" rtl="0" eaLnBrk="1" latinLnBrk="0" hangingPunct="1">
+              <a:spcBef>
+                <a:spcPct val="20000"/>
+              </a:spcBef>
+              <a:spcAft>
+                <a:spcPts val="600"/>
+              </a:spcAft>
+              <a:buClr>
+                <a:schemeClr val="accent1">
+                  <a:lumMod val="75000"/>
+                </a:schemeClr>
+              </a:buClr>
+              <a:buSzPct val="145000"/>
+              <a:buFont typeface="Arial"/>
+              <a:buChar char="•"/>
+              <a:defRPr sz="1400" kern="1200" cap="none">
+                <a:solidFill>
+                  <a:schemeClr val="tx1"/>
+                </a:solidFill>
+                <a:effectLst/>
+                <a:latin typeface="+mn-lt"/>
+                <a:ea typeface="+mn-ea"/>
+                <a:cs typeface="+mn-cs"/>
+              </a:defRPr>
+            </a:lvl9pPr>
+          </a:lstStyle>
+          <a:p>
+            <a:r>
+              <a:rPr lang="fr-FR" dirty="0"/>
+              <a:t>Une gestion des délais différente</a:t>
+            </a:r>
           </a:p>
         </p:txBody>
       </p:sp>
     </p:spTree>
     <p:extLst>
       <p:ext uri="{BB962C8B-B14F-4D97-AF65-F5344CB8AC3E}">
-        <p14:creationId xmlns:p14="http://schemas.microsoft.com/office/powerpoint/2010/main" val="2999487520"/>
+        <p14:creationId xmlns:p14="http://schemas.microsoft.com/office/powerpoint/2010/main" val="2776957562"/>
       </p:ext>
     </p:extLst>
   </p:cSld>
@@ -9033,7 +11403,7 @@
           <p:cNvPr id="2" name="Titre 1">
             <a:extLst>
               <a:ext uri="{FF2B5EF4-FFF2-40B4-BE49-F238E27FC236}">
-                <a16:creationId xmlns:a16="http://schemas.microsoft.com/office/drawing/2014/main" id="{BE7320C6-F6FC-41F5-B3CF-659F5FF5C861}"/>
+                <a16:creationId xmlns:a16="http://schemas.microsoft.com/office/drawing/2014/main" id="{9AF062FD-23BF-A944-9FD3-8FF06344FFDC}"/>
               </a:ext>
             </a:extLst>
           </p:cNvPr>
@@ -9044,50 +11414,83 @@
             <p:ph type="title"/>
           </p:nvPr>
         </p:nvSpPr>
-        <p:spPr/>
+        <p:spPr>
+          <a:xfrm>
+            <a:off x="1086643" y="175190"/>
+            <a:ext cx="10018713" cy="1752599"/>
+          </a:xfrm>
+        </p:spPr>
         <p:txBody>
           <a:bodyPr/>
           <a:lstStyle/>
           <a:p>
             <a:r>
               <a:rPr lang="fr-FR" dirty="0"/>
-              <a:t>SWOT</a:t>
-            </a:r>
-          </a:p>
-        </p:txBody>
-      </p:sp>
-      <p:sp>
-        <p:nvSpPr>
-          <p:cNvPr id="3" name="Espace réservé du contenu 2">
+              <a:t>Scénario agile</a:t>
+            </a:r>
+          </a:p>
+        </p:txBody>
+      </p:sp>
+      <p:pic>
+        <p:nvPicPr>
+          <p:cNvPr id="1026" name="Picture 2" descr="Wavenet">
             <a:extLst>
               <a:ext uri="{FF2B5EF4-FFF2-40B4-BE49-F238E27FC236}">
-                <a16:creationId xmlns:a16="http://schemas.microsoft.com/office/drawing/2014/main" id="{4E11813F-CD97-4D10-8B21-5F89E9F557C4}"/>
+                <a16:creationId xmlns:a16="http://schemas.microsoft.com/office/drawing/2014/main" id="{A1B08586-6E0F-4B8B-BDCF-5A5D86D27D9E}"/>
               </a:ext>
             </a:extLst>
           </p:cNvPr>
-          <p:cNvSpPr>
-            <a:spLocks noGrp="1"/>
-          </p:cNvSpPr>
-          <p:nvPr>
-            <p:ph idx="1"/>
-          </p:nvPr>
-        </p:nvSpPr>
-        <p:spPr/>
-        <p:txBody>
-          <a:bodyPr/>
-          <a:lstStyle/>
-          <a:p>
-            <a:r>
-              <a:rPr lang="fr-FR" dirty="0"/>
-              <a:t>Ulrich</a:t>
-            </a:r>
-          </a:p>
-        </p:txBody>
-      </p:sp>
+          <p:cNvPicPr>
+            <a:picLocks noChangeAspect="1" noChangeArrowheads="1"/>
+          </p:cNvPicPr>
+          <p:nvPr/>
+        </p:nvPicPr>
+        <p:blipFill>
+          <a:blip r:embed="rId2">
+            <a:extLst>
+              <a:ext uri="{28A0092B-C50C-407E-A947-70E740481C1C}">
+                <a14:useLocalDpi xmlns:a14="http://schemas.microsoft.com/office/drawing/2010/main" val="0"/>
+              </a:ext>
+            </a:extLst>
+          </a:blip>
+          <a:srcRect/>
+          <a:stretch>
+            <a:fillRect/>
+          </a:stretch>
+        </p:blipFill>
+        <p:spPr bwMode="auto">
+          <a:xfrm>
+            <a:off x="1701800" y="1765229"/>
+            <a:ext cx="10018713" cy="3826968"/>
+          </a:xfrm>
+          <a:prstGeom prst="rect">
+            <a:avLst/>
+          </a:prstGeom>
+          <a:ln>
+            <a:noFill/>
+          </a:ln>
+          <a:effectLst>
+            <a:outerShdw blurRad="190500" algn="tl" rotWithShape="0">
+              <a:srgbClr val="000000">
+                <a:alpha val="70000"/>
+              </a:srgbClr>
+            </a:outerShdw>
+          </a:effectLst>
+          <a:extLst>
+            <a:ext uri="{909E8E84-426E-40DD-AFC4-6F175D3DCCD1}">
+              <a14:hiddenFill xmlns:a14="http://schemas.microsoft.com/office/drawing/2010/main">
+                <a:solidFill>
+                  <a:srgbClr val="FFFFFF"/>
+                </a:solidFill>
+              </a14:hiddenFill>
+            </a:ext>
+          </a:extLst>
+        </p:spPr>
+      </p:pic>
     </p:spTree>
     <p:extLst>
       <p:ext uri="{BB962C8B-B14F-4D97-AF65-F5344CB8AC3E}">
-        <p14:creationId xmlns:p14="http://schemas.microsoft.com/office/powerpoint/2010/main" val="835529957"/>
+        <p14:creationId xmlns:p14="http://schemas.microsoft.com/office/powerpoint/2010/main" val="3949098132"/>
       </p:ext>
     </p:extLst>
   </p:cSld>
@@ -9119,7 +11522,7 @@
           <p:cNvPr id="2" name="Titre 1">
             <a:extLst>
               <a:ext uri="{FF2B5EF4-FFF2-40B4-BE49-F238E27FC236}">
-                <a16:creationId xmlns:a16="http://schemas.microsoft.com/office/drawing/2014/main" id="{D2821361-FEA0-40EA-BCEF-9334E9473965}"/>
+                <a16:creationId xmlns:a16="http://schemas.microsoft.com/office/drawing/2014/main" id="{B9B91EB4-D77B-4231-ABE2-8A0188D1736A}"/>
               </a:ext>
             </a:extLst>
           </p:cNvPr>
@@ -9137,7 +11540,7 @@
           <a:p>
             <a:r>
               <a:rPr lang="fr-FR" dirty="0"/>
-              <a:t>Sécurité</a:t>
+              <a:t>Equipe projet</a:t>
             </a:r>
           </a:p>
         </p:txBody>
@@ -9147,7 +11550,7 @@
           <p:cNvPr id="3" name="Espace réservé du contenu 2">
             <a:extLst>
               <a:ext uri="{FF2B5EF4-FFF2-40B4-BE49-F238E27FC236}">
-                <a16:creationId xmlns:a16="http://schemas.microsoft.com/office/drawing/2014/main" id="{C8A1F5A1-375F-4ADD-BF73-7F79B2B4AC1C}"/>
+                <a16:creationId xmlns:a16="http://schemas.microsoft.com/office/drawing/2014/main" id="{D2676942-73B8-4CBD-99AB-95A2361D318A}"/>
               </a:ext>
             </a:extLst>
           </p:cNvPr>
@@ -9164,8 +11567,32 @@
           <a:lstStyle/>
           <a:p>
             <a:r>
+              <a:rPr lang="fr-FR" b="1" dirty="0"/>
+              <a:t>Product Owner </a:t>
+            </a:r>
+            <a:r>
               <a:rPr lang="fr-FR" dirty="0"/>
-              <a:t>Ulrich</a:t>
+              <a:t>: Romain CHRETIEN</a:t>
+            </a:r>
+          </a:p>
+          <a:p>
+            <a:r>
+              <a:rPr lang="fr-FR" b="1" dirty="0"/>
+              <a:t>Scrum Master </a:t>
+            </a:r>
+            <a:r>
+              <a:rPr lang="fr-FR" dirty="0"/>
+              <a:t>: Ulrich HASSED</a:t>
+            </a:r>
+          </a:p>
+          <a:p>
+            <a:r>
+              <a:rPr lang="fr-FR" b="1" dirty="0"/>
+              <a:t>Team développement </a:t>
+            </a:r>
+            <a:r>
+              <a:rPr lang="fr-FR" dirty="0"/>
+              <a:t>: Valentin HALLAY, Allan BROCHARD</a:t>
             </a:r>
           </a:p>
         </p:txBody>
@@ -9173,7 +11600,7 @@
     </p:spTree>
     <p:extLst>
       <p:ext uri="{BB962C8B-B14F-4D97-AF65-F5344CB8AC3E}">
-        <p14:creationId xmlns:p14="http://schemas.microsoft.com/office/powerpoint/2010/main" val="953456476"/>
+        <p14:creationId xmlns:p14="http://schemas.microsoft.com/office/powerpoint/2010/main" val="1435627532"/>
       </p:ext>
     </p:extLst>
   </p:cSld>

</xml_diff>

<commit_message>
partie indicateur, mcd, planning final
</commit_message>
<xml_diff>
--- a/LIVRABLE-4/Présentation livrable 4.pptx
+++ b/LIVRABLE-4/Présentation livrable 4.pptx
@@ -14,8 +14,8 @@
     <p:sldId id="275" r:id="rId5"/>
     <p:sldId id="277" r:id="rId6"/>
     <p:sldId id="298" r:id="rId7"/>
-    <p:sldId id="299" r:id="rId8"/>
-    <p:sldId id="273" r:id="rId9"/>
+    <p:sldId id="273" r:id="rId8"/>
+    <p:sldId id="301" r:id="rId9"/>
     <p:sldId id="300" r:id="rId10"/>
     <p:sldId id="274" r:id="rId11"/>
     <p:sldId id="276" r:id="rId12"/>
@@ -7737,7 +7737,12 @@
             <p:ph type="title"/>
           </p:nvPr>
         </p:nvSpPr>
-        <p:spPr/>
+        <p:spPr>
+          <a:xfrm>
+            <a:off x="1275069" y="0"/>
+            <a:ext cx="10018713" cy="1752599"/>
+          </a:xfrm>
+        </p:spPr>
         <p:txBody>
           <a:bodyPr/>
           <a:lstStyle/>
@@ -7749,34 +7754,36 @@
           </a:p>
         </p:txBody>
       </p:sp>
-      <p:sp>
-        <p:nvSpPr>
-          <p:cNvPr id="3" name="Espace réservé du contenu 2">
+      <p:pic>
+        <p:nvPicPr>
+          <p:cNvPr id="6" name="Image 5">
             <a:extLst>
               <a:ext uri="{FF2B5EF4-FFF2-40B4-BE49-F238E27FC236}">
-                <a16:creationId xmlns:a16="http://schemas.microsoft.com/office/drawing/2014/main" id="{BBA321E4-D855-4AE1-B334-FBDCFEA00B5F}"/>
+                <a16:creationId xmlns:a16="http://schemas.microsoft.com/office/drawing/2014/main" id="{406804FD-5833-44AB-BBE9-E7C756F0D76F}"/>
               </a:ext>
             </a:extLst>
           </p:cNvPr>
-          <p:cNvSpPr>
-            <a:spLocks noGrp="1"/>
-          </p:cNvSpPr>
-          <p:nvPr>
-            <p:ph idx="1"/>
-          </p:nvPr>
-        </p:nvSpPr>
-        <p:spPr/>
-        <p:txBody>
-          <a:bodyPr/>
-          <a:lstStyle/>
-          <a:p>
-            <a:r>
-              <a:rPr lang="fr-FR" dirty="0"/>
-              <a:t>Romain</a:t>
-            </a:r>
-          </a:p>
-        </p:txBody>
-      </p:sp>
+          <p:cNvPicPr>
+            <a:picLocks noChangeAspect="1"/>
+          </p:cNvPicPr>
+          <p:nvPr/>
+        </p:nvPicPr>
+        <p:blipFill>
+          <a:blip r:embed="rId2"/>
+          <a:stretch>
+            <a:fillRect/>
+          </a:stretch>
+        </p:blipFill>
+        <p:spPr>
+          <a:xfrm>
+            <a:off x="1197133" y="1273475"/>
+            <a:ext cx="9796276" cy="5289885"/>
+          </a:xfrm>
+          <a:prstGeom prst="rect">
+            <a:avLst/>
+          </a:prstGeom>
+        </p:spPr>
+      </p:pic>
     </p:spTree>
     <p:extLst>
       <p:ext uri="{BB962C8B-B14F-4D97-AF65-F5344CB8AC3E}">
@@ -8140,7 +8147,7 @@
           <a:p>
             <a:r>
               <a:rPr lang="fr-FR" dirty="0"/>
-              <a:t>PRA/PCA</a:t>
+              <a:t>PRA</a:t>
             </a:r>
           </a:p>
         </p:txBody>
@@ -8219,7 +8226,12 @@
             <p:ph type="title"/>
           </p:nvPr>
         </p:nvSpPr>
-        <p:spPr/>
+        <p:spPr>
+          <a:xfrm>
+            <a:off x="1086643" y="0"/>
+            <a:ext cx="10018713" cy="1752599"/>
+          </a:xfrm>
+        </p:spPr>
         <p:txBody>
           <a:bodyPr/>
           <a:lstStyle/>
@@ -8231,34 +8243,100 @@
           </a:p>
         </p:txBody>
       </p:sp>
-      <p:sp>
-        <p:nvSpPr>
-          <p:cNvPr id="3" name="Espace réservé du contenu 2">
+      <p:pic>
+        <p:nvPicPr>
+          <p:cNvPr id="3078" name="Picture 6" descr="EasyVista Service Manager Reviews 2020: Details, Pricing ...">
             <a:extLst>
               <a:ext uri="{FF2B5EF4-FFF2-40B4-BE49-F238E27FC236}">
-                <a16:creationId xmlns:a16="http://schemas.microsoft.com/office/drawing/2014/main" id="{D56D2AA2-5E45-4EB7-BA0E-428AAFF10052}"/>
+                <a16:creationId xmlns:a16="http://schemas.microsoft.com/office/drawing/2014/main" id="{4D9D2019-CD03-4EF8-B96B-8FA8E56957B9}"/>
               </a:ext>
             </a:extLst>
           </p:cNvPr>
-          <p:cNvSpPr>
-            <a:spLocks noGrp="1"/>
-          </p:cNvSpPr>
-          <p:nvPr>
-            <p:ph idx="1"/>
-          </p:nvPr>
-        </p:nvSpPr>
-        <p:spPr/>
-        <p:txBody>
-          <a:bodyPr/>
-          <a:lstStyle/>
-          <a:p>
-            <a:r>
-              <a:rPr lang="fr-FR" dirty="0"/>
-              <a:t>Romain</a:t>
-            </a:r>
-          </a:p>
-        </p:txBody>
-      </p:sp>
+          <p:cNvPicPr>
+            <a:picLocks noChangeAspect="1" noChangeArrowheads="1"/>
+          </p:cNvPicPr>
+          <p:nvPr/>
+        </p:nvPicPr>
+        <p:blipFill>
+          <a:blip r:embed="rId2">
+            <a:extLst>
+              <a:ext uri="{28A0092B-C50C-407E-A947-70E740481C1C}">
+                <a14:useLocalDpi xmlns:a14="http://schemas.microsoft.com/office/drawing/2010/main" val="0"/>
+              </a:ext>
+            </a:extLst>
+          </a:blip>
+          <a:srcRect/>
+          <a:stretch>
+            <a:fillRect/>
+          </a:stretch>
+        </p:blipFill>
+        <p:spPr bwMode="auto">
+          <a:xfrm>
+            <a:off x="9762990" y="-115386"/>
+            <a:ext cx="2236505" cy="1174165"/>
+          </a:xfrm>
+          <a:prstGeom prst="rect">
+            <a:avLst/>
+          </a:prstGeom>
+          <a:noFill/>
+          <a:extLst>
+            <a:ext uri="{909E8E84-426E-40DD-AFC4-6F175D3DCCD1}">
+              <a14:hiddenFill xmlns:a14="http://schemas.microsoft.com/office/drawing/2010/main">
+                <a:solidFill>
+                  <a:srgbClr val="FFFFFF"/>
+                </a:solidFill>
+              </a14:hiddenFill>
+            </a:ext>
+          </a:extLst>
+        </p:spPr>
+      </p:pic>
+      <p:pic>
+        <p:nvPicPr>
+          <p:cNvPr id="3080" name="Picture 8" descr="EasyVista Service Manager Reviews 2020: Details, Pricing ...">
+            <a:extLst>
+              <a:ext uri="{FF2B5EF4-FFF2-40B4-BE49-F238E27FC236}">
+                <a16:creationId xmlns:a16="http://schemas.microsoft.com/office/drawing/2014/main" id="{2ECD0667-7891-41C7-BD7C-2355E7110B89}"/>
+              </a:ext>
+            </a:extLst>
+          </p:cNvPr>
+          <p:cNvPicPr>
+            <a:picLocks noChangeAspect="1" noChangeArrowheads="1"/>
+          </p:cNvPicPr>
+          <p:nvPr/>
+        </p:nvPicPr>
+        <p:blipFill>
+          <a:blip r:embed="rId3">
+            <a:extLst>
+              <a:ext uri="{28A0092B-C50C-407E-A947-70E740481C1C}">
+                <a14:useLocalDpi xmlns:a14="http://schemas.microsoft.com/office/drawing/2010/main" val="0"/>
+              </a:ext>
+            </a:extLst>
+          </a:blip>
+          <a:srcRect/>
+          <a:stretch>
+            <a:fillRect/>
+          </a:stretch>
+        </p:blipFill>
+        <p:spPr bwMode="auto">
+          <a:xfrm>
+            <a:off x="1609933" y="1174165"/>
+            <a:ext cx="8972132" cy="5665782"/>
+          </a:xfrm>
+          <a:prstGeom prst="rect">
+            <a:avLst/>
+          </a:prstGeom>
+          <a:noFill/>
+          <a:extLst>
+            <a:ext uri="{909E8E84-426E-40DD-AFC4-6F175D3DCCD1}">
+              <a14:hiddenFill xmlns:a14="http://schemas.microsoft.com/office/drawing/2010/main">
+                <a:solidFill>
+                  <a:srgbClr val="FFFFFF"/>
+                </a:solidFill>
+              </a14:hiddenFill>
+            </a:ext>
+          </a:extLst>
+        </p:spPr>
+      </p:pic>
     </p:spTree>
     <p:extLst>
       <p:ext uri="{BB962C8B-B14F-4D97-AF65-F5344CB8AC3E}">
@@ -8456,7 +8534,12 @@
             <p:ph type="title"/>
           </p:nvPr>
         </p:nvSpPr>
-        <p:spPr/>
+        <p:spPr>
+          <a:xfrm>
+            <a:off x="1086643" y="0"/>
+            <a:ext cx="10018713" cy="1752599"/>
+          </a:xfrm>
+        </p:spPr>
         <p:txBody>
           <a:bodyPr/>
           <a:lstStyle/>
@@ -8468,34 +8551,40 @@
           </a:p>
         </p:txBody>
       </p:sp>
-      <p:sp>
-        <p:nvSpPr>
-          <p:cNvPr id="3" name="Espace réservé du contenu 2">
+      <p:pic>
+        <p:nvPicPr>
+          <p:cNvPr id="6" name="Image 5">
             <a:extLst>
               <a:ext uri="{FF2B5EF4-FFF2-40B4-BE49-F238E27FC236}">
-                <a16:creationId xmlns:a16="http://schemas.microsoft.com/office/drawing/2014/main" id="{A812E78B-25DC-4687-B46F-45D73BCF810D}"/>
+                <a16:creationId xmlns:a16="http://schemas.microsoft.com/office/drawing/2014/main" id="{6E465399-58B5-4654-B516-791315A1F5A3}"/>
               </a:ext>
             </a:extLst>
           </p:cNvPr>
-          <p:cNvSpPr>
-            <a:spLocks noGrp="1"/>
-          </p:cNvSpPr>
-          <p:nvPr>
-            <p:ph idx="1"/>
-          </p:nvPr>
-        </p:nvSpPr>
-        <p:spPr/>
-        <p:txBody>
-          <a:bodyPr/>
-          <a:lstStyle/>
-          <a:p>
-            <a:r>
-              <a:rPr lang="fr-FR" dirty="0"/>
-              <a:t>Romain</a:t>
-            </a:r>
-          </a:p>
-        </p:txBody>
-      </p:sp>
+          <p:cNvPicPr/>
+          <p:nvPr/>
+        </p:nvPicPr>
+        <p:blipFill>
+          <a:blip r:embed="rId2" cstate="print">
+            <a:extLst>
+              <a:ext uri="{28A0092B-C50C-407E-A947-70E740481C1C}">
+                <a14:useLocalDpi xmlns:a14="http://schemas.microsoft.com/office/drawing/2010/main" val="0"/>
+              </a:ext>
+            </a:extLst>
+          </a:blip>
+          <a:stretch>
+            <a:fillRect/>
+          </a:stretch>
+        </p:blipFill>
+        <p:spPr>
+          <a:xfrm>
+            <a:off x="0" y="2438399"/>
+            <a:ext cx="12192000" cy="2662990"/>
+          </a:xfrm>
+          <a:prstGeom prst="rect">
+            <a:avLst/>
+          </a:prstGeom>
+        </p:spPr>
+      </p:pic>
     </p:spTree>
     <p:extLst>
       <p:ext uri="{BB962C8B-B14F-4D97-AF65-F5344CB8AC3E}">
@@ -10264,1145 +10353,6 @@
           <p:cNvPr id="2" name="Titre 1">
             <a:extLst>
               <a:ext uri="{FF2B5EF4-FFF2-40B4-BE49-F238E27FC236}">
-                <a16:creationId xmlns:a16="http://schemas.microsoft.com/office/drawing/2014/main" id="{50A08348-FE10-4CC5-AB62-DB28F7E51380}"/>
-              </a:ext>
-            </a:extLst>
-          </p:cNvPr>
-          <p:cNvSpPr>
-            <a:spLocks noGrp="1"/>
-          </p:cNvSpPr>
-          <p:nvPr>
-            <p:ph type="title"/>
-          </p:nvPr>
-        </p:nvSpPr>
-        <p:spPr/>
-        <p:txBody>
-          <a:bodyPr/>
-          <a:lstStyle/>
-          <a:p>
-            <a:r>
-              <a:rPr lang="fr-FR" dirty="0"/>
-              <a:t>Pourquoi l'agilité ?</a:t>
-            </a:r>
-          </a:p>
-        </p:txBody>
-      </p:sp>
-      <p:sp>
-        <p:nvSpPr>
-          <p:cNvPr id="3" name="Espace réservé du contenu 2">
-            <a:extLst>
-              <a:ext uri="{FF2B5EF4-FFF2-40B4-BE49-F238E27FC236}">
-                <a16:creationId xmlns:a16="http://schemas.microsoft.com/office/drawing/2014/main" id="{00305290-5DE2-4A54-92FE-75957498674F}"/>
-              </a:ext>
-            </a:extLst>
-          </p:cNvPr>
-          <p:cNvSpPr>
-            <a:spLocks noGrp="1"/>
-          </p:cNvSpPr>
-          <p:nvPr>
-            <p:ph idx="1"/>
-          </p:nvPr>
-        </p:nvSpPr>
-        <p:spPr>
-          <a:xfrm>
-            <a:off x="1484310" y="2666999"/>
-            <a:ext cx="10018713" cy="513081"/>
-          </a:xfrm>
-        </p:spPr>
-        <p:txBody>
-          <a:bodyPr/>
-          <a:lstStyle/>
-          <a:p>
-            <a:r>
-              <a:rPr lang="fr-FR" dirty="0"/>
-              <a:t>Accroître la visibilité des projets avec le client</a:t>
-            </a:r>
-          </a:p>
-        </p:txBody>
-      </p:sp>
-      <p:sp>
-        <p:nvSpPr>
-          <p:cNvPr id="4" name="Espace réservé du contenu 2">
-            <a:extLst>
-              <a:ext uri="{FF2B5EF4-FFF2-40B4-BE49-F238E27FC236}">
-                <a16:creationId xmlns:a16="http://schemas.microsoft.com/office/drawing/2014/main" id="{4C0B5EE6-9F15-473E-A4EA-77EEEA4CE1F3}"/>
-              </a:ext>
-            </a:extLst>
-          </p:cNvPr>
-          <p:cNvSpPr txBox="1">
-            <a:spLocks/>
-          </p:cNvSpPr>
-          <p:nvPr/>
-        </p:nvSpPr>
-        <p:spPr>
-          <a:xfrm>
-            <a:off x="1484310" y="3172459"/>
-            <a:ext cx="10018713" cy="513081"/>
-          </a:xfrm>
-          <a:prstGeom prst="rect">
-            <a:avLst/>
-          </a:prstGeom>
-        </p:spPr>
-        <p:txBody>
-          <a:bodyPr vert="horz" lIns="91440" tIns="45720" rIns="91440" bIns="45720" rtlCol="0" anchor="ctr">
-            <a:normAutofit/>
-          </a:bodyPr>
-          <a:lstStyle>
-            <a:lvl1pPr marL="285750" indent="-285750" algn="l" defTabSz="457200" rtl="0" eaLnBrk="1" latinLnBrk="0" hangingPunct="1">
-              <a:spcBef>
-                <a:spcPct val="20000"/>
-              </a:spcBef>
-              <a:spcAft>
-                <a:spcPts val="600"/>
-              </a:spcAft>
-              <a:buClr>
-                <a:schemeClr val="accent1">
-                  <a:lumMod val="75000"/>
-                </a:schemeClr>
-              </a:buClr>
-              <a:buSzPct val="145000"/>
-              <a:buFont typeface="Arial"/>
-              <a:buChar char="•"/>
-              <a:defRPr sz="2400" kern="1200" cap="none">
-                <a:solidFill>
-                  <a:schemeClr val="tx1"/>
-                </a:solidFill>
-                <a:effectLst/>
-                <a:latin typeface="+mn-lt"/>
-                <a:ea typeface="+mn-ea"/>
-                <a:cs typeface="+mn-cs"/>
-              </a:defRPr>
-            </a:lvl1pPr>
-            <a:lvl2pPr marL="742950" indent="-285750" algn="l" defTabSz="457200" rtl="0" eaLnBrk="1" latinLnBrk="0" hangingPunct="1">
-              <a:spcBef>
-                <a:spcPct val="20000"/>
-              </a:spcBef>
-              <a:spcAft>
-                <a:spcPts val="600"/>
-              </a:spcAft>
-              <a:buClr>
-                <a:schemeClr val="accent1">
-                  <a:lumMod val="75000"/>
-                </a:schemeClr>
-              </a:buClr>
-              <a:buSzPct val="145000"/>
-              <a:buFont typeface="Arial"/>
-              <a:buChar char="•"/>
-              <a:defRPr sz="2000" kern="1200" cap="none">
-                <a:solidFill>
-                  <a:schemeClr val="tx1"/>
-                </a:solidFill>
-                <a:effectLst/>
-                <a:latin typeface="+mn-lt"/>
-                <a:ea typeface="+mn-ea"/>
-                <a:cs typeface="+mn-cs"/>
-              </a:defRPr>
-            </a:lvl2pPr>
-            <a:lvl3pPr marL="1200150" indent="-285750" algn="l" defTabSz="457200" rtl="0" eaLnBrk="1" latinLnBrk="0" hangingPunct="1">
-              <a:spcBef>
-                <a:spcPct val="20000"/>
-              </a:spcBef>
-              <a:spcAft>
-                <a:spcPts val="600"/>
-              </a:spcAft>
-              <a:buClr>
-                <a:schemeClr val="accent1">
-                  <a:lumMod val="75000"/>
-                </a:schemeClr>
-              </a:buClr>
-              <a:buSzPct val="145000"/>
-              <a:buFont typeface="Arial"/>
-              <a:buChar char="•"/>
-              <a:defRPr sz="1800" kern="1200" cap="none">
-                <a:solidFill>
-                  <a:schemeClr val="tx1"/>
-                </a:solidFill>
-                <a:effectLst/>
-                <a:latin typeface="+mn-lt"/>
-                <a:ea typeface="+mn-ea"/>
-                <a:cs typeface="+mn-cs"/>
-              </a:defRPr>
-            </a:lvl3pPr>
-            <a:lvl4pPr marL="1543050" indent="-171450" algn="l" defTabSz="457200" rtl="0" eaLnBrk="1" latinLnBrk="0" hangingPunct="1">
-              <a:spcBef>
-                <a:spcPct val="20000"/>
-              </a:spcBef>
-              <a:spcAft>
-                <a:spcPts val="600"/>
-              </a:spcAft>
-              <a:buClr>
-                <a:schemeClr val="accent1">
-                  <a:lumMod val="75000"/>
-                </a:schemeClr>
-              </a:buClr>
-              <a:buSzPct val="145000"/>
-              <a:buFont typeface="Arial"/>
-              <a:buChar char="•"/>
-              <a:defRPr sz="1600" kern="1200" cap="none">
-                <a:solidFill>
-                  <a:schemeClr val="tx1"/>
-                </a:solidFill>
-                <a:effectLst/>
-                <a:latin typeface="+mn-lt"/>
-                <a:ea typeface="+mn-ea"/>
-                <a:cs typeface="+mn-cs"/>
-              </a:defRPr>
-            </a:lvl4pPr>
-            <a:lvl5pPr marL="2000250" indent="-171450" algn="l" defTabSz="457200" rtl="0" eaLnBrk="1" latinLnBrk="0" hangingPunct="1">
-              <a:spcBef>
-                <a:spcPct val="20000"/>
-              </a:spcBef>
-              <a:spcAft>
-                <a:spcPts val="600"/>
-              </a:spcAft>
-              <a:buClr>
-                <a:schemeClr val="accent1">
-                  <a:lumMod val="75000"/>
-                </a:schemeClr>
-              </a:buClr>
-              <a:buSzPct val="145000"/>
-              <a:buFont typeface="Arial"/>
-              <a:buChar char="•"/>
-              <a:defRPr sz="1400" kern="1200" cap="none">
-                <a:solidFill>
-                  <a:schemeClr val="tx1"/>
-                </a:solidFill>
-                <a:effectLst/>
-                <a:latin typeface="+mn-lt"/>
-                <a:ea typeface="+mn-ea"/>
-                <a:cs typeface="+mn-cs"/>
-              </a:defRPr>
-            </a:lvl5pPr>
-            <a:lvl6pPr marL="2514600" indent="-228600" algn="l" defTabSz="457200" rtl="0" eaLnBrk="1" latinLnBrk="0" hangingPunct="1">
-              <a:spcBef>
-                <a:spcPct val="20000"/>
-              </a:spcBef>
-              <a:spcAft>
-                <a:spcPts val="600"/>
-              </a:spcAft>
-              <a:buClr>
-                <a:schemeClr val="accent1">
-                  <a:lumMod val="75000"/>
-                </a:schemeClr>
-              </a:buClr>
-              <a:buSzPct val="145000"/>
-              <a:buFont typeface="Arial"/>
-              <a:buChar char="•"/>
-              <a:defRPr sz="1400" kern="1200" cap="none">
-                <a:solidFill>
-                  <a:schemeClr val="tx1"/>
-                </a:solidFill>
-                <a:effectLst/>
-                <a:latin typeface="+mn-lt"/>
-                <a:ea typeface="+mn-ea"/>
-                <a:cs typeface="+mn-cs"/>
-              </a:defRPr>
-            </a:lvl6pPr>
-            <a:lvl7pPr marL="2971800" indent="-228600" algn="l" defTabSz="457200" rtl="0" eaLnBrk="1" latinLnBrk="0" hangingPunct="1">
-              <a:spcBef>
-                <a:spcPct val="20000"/>
-              </a:spcBef>
-              <a:spcAft>
-                <a:spcPts val="600"/>
-              </a:spcAft>
-              <a:buClr>
-                <a:schemeClr val="accent1">
-                  <a:lumMod val="75000"/>
-                </a:schemeClr>
-              </a:buClr>
-              <a:buSzPct val="145000"/>
-              <a:buFont typeface="Arial"/>
-              <a:buChar char="•"/>
-              <a:defRPr sz="1400" kern="1200" cap="none">
-                <a:solidFill>
-                  <a:schemeClr val="tx1"/>
-                </a:solidFill>
-                <a:effectLst/>
-                <a:latin typeface="+mn-lt"/>
-                <a:ea typeface="+mn-ea"/>
-                <a:cs typeface="+mn-cs"/>
-              </a:defRPr>
-            </a:lvl7pPr>
-            <a:lvl8pPr marL="3429000" indent="-228600" algn="l" defTabSz="457200" rtl="0" eaLnBrk="1" latinLnBrk="0" hangingPunct="1">
-              <a:spcBef>
-                <a:spcPct val="20000"/>
-              </a:spcBef>
-              <a:spcAft>
-                <a:spcPts val="600"/>
-              </a:spcAft>
-              <a:buClr>
-                <a:schemeClr val="accent1">
-                  <a:lumMod val="75000"/>
-                </a:schemeClr>
-              </a:buClr>
-              <a:buSzPct val="145000"/>
-              <a:buFont typeface="Arial"/>
-              <a:buChar char="•"/>
-              <a:defRPr sz="1400" kern="1200" cap="none">
-                <a:solidFill>
-                  <a:schemeClr val="tx1"/>
-                </a:solidFill>
-                <a:effectLst/>
-                <a:latin typeface="+mn-lt"/>
-                <a:ea typeface="+mn-ea"/>
-                <a:cs typeface="+mn-cs"/>
-              </a:defRPr>
-            </a:lvl8pPr>
-            <a:lvl9pPr marL="3886200" indent="-228600" algn="l" defTabSz="457200" rtl="0" eaLnBrk="1" latinLnBrk="0" hangingPunct="1">
-              <a:spcBef>
-                <a:spcPct val="20000"/>
-              </a:spcBef>
-              <a:spcAft>
-                <a:spcPts val="600"/>
-              </a:spcAft>
-              <a:buClr>
-                <a:schemeClr val="accent1">
-                  <a:lumMod val="75000"/>
-                </a:schemeClr>
-              </a:buClr>
-              <a:buSzPct val="145000"/>
-              <a:buFont typeface="Arial"/>
-              <a:buChar char="•"/>
-              <a:defRPr sz="1400" kern="1200" cap="none">
-                <a:solidFill>
-                  <a:schemeClr val="tx1"/>
-                </a:solidFill>
-                <a:effectLst/>
-                <a:latin typeface="+mn-lt"/>
-                <a:ea typeface="+mn-ea"/>
-                <a:cs typeface="+mn-cs"/>
-              </a:defRPr>
-            </a:lvl9pPr>
-          </a:lstStyle>
-          <a:p>
-            <a:r>
-              <a:rPr lang="fr-FR" dirty="0"/>
-              <a:t>Faire face à la conduite du changement</a:t>
-            </a:r>
-          </a:p>
-        </p:txBody>
-      </p:sp>
-      <p:sp>
-        <p:nvSpPr>
-          <p:cNvPr id="6" name="Espace réservé du contenu 2">
-            <a:extLst>
-              <a:ext uri="{FF2B5EF4-FFF2-40B4-BE49-F238E27FC236}">
-                <a16:creationId xmlns:a16="http://schemas.microsoft.com/office/drawing/2014/main" id="{BCBAFD2E-3BD9-4E39-874C-66B275D0F0DC}"/>
-              </a:ext>
-            </a:extLst>
-          </p:cNvPr>
-          <p:cNvSpPr txBox="1">
-            <a:spLocks/>
-          </p:cNvSpPr>
-          <p:nvPr/>
-        </p:nvSpPr>
-        <p:spPr>
-          <a:xfrm>
-            <a:off x="1484310" y="3677919"/>
-            <a:ext cx="10018713" cy="513081"/>
-          </a:xfrm>
-          <a:prstGeom prst="rect">
-            <a:avLst/>
-          </a:prstGeom>
-        </p:spPr>
-        <p:txBody>
-          <a:bodyPr vert="horz" lIns="91440" tIns="45720" rIns="91440" bIns="45720" rtlCol="0" anchor="ctr">
-            <a:normAutofit/>
-          </a:bodyPr>
-          <a:lstStyle>
-            <a:lvl1pPr marL="285750" indent="-285750" algn="l" defTabSz="457200" rtl="0" eaLnBrk="1" latinLnBrk="0" hangingPunct="1">
-              <a:spcBef>
-                <a:spcPct val="20000"/>
-              </a:spcBef>
-              <a:spcAft>
-                <a:spcPts val="600"/>
-              </a:spcAft>
-              <a:buClr>
-                <a:schemeClr val="accent1">
-                  <a:lumMod val="75000"/>
-                </a:schemeClr>
-              </a:buClr>
-              <a:buSzPct val="145000"/>
-              <a:buFont typeface="Arial"/>
-              <a:buChar char="•"/>
-              <a:defRPr sz="2400" kern="1200" cap="none">
-                <a:solidFill>
-                  <a:schemeClr val="tx1"/>
-                </a:solidFill>
-                <a:effectLst/>
-                <a:latin typeface="+mn-lt"/>
-                <a:ea typeface="+mn-ea"/>
-                <a:cs typeface="+mn-cs"/>
-              </a:defRPr>
-            </a:lvl1pPr>
-            <a:lvl2pPr marL="742950" indent="-285750" algn="l" defTabSz="457200" rtl="0" eaLnBrk="1" latinLnBrk="0" hangingPunct="1">
-              <a:spcBef>
-                <a:spcPct val="20000"/>
-              </a:spcBef>
-              <a:spcAft>
-                <a:spcPts val="600"/>
-              </a:spcAft>
-              <a:buClr>
-                <a:schemeClr val="accent1">
-                  <a:lumMod val="75000"/>
-                </a:schemeClr>
-              </a:buClr>
-              <a:buSzPct val="145000"/>
-              <a:buFont typeface="Arial"/>
-              <a:buChar char="•"/>
-              <a:defRPr sz="2000" kern="1200" cap="none">
-                <a:solidFill>
-                  <a:schemeClr val="tx1"/>
-                </a:solidFill>
-                <a:effectLst/>
-                <a:latin typeface="+mn-lt"/>
-                <a:ea typeface="+mn-ea"/>
-                <a:cs typeface="+mn-cs"/>
-              </a:defRPr>
-            </a:lvl2pPr>
-            <a:lvl3pPr marL="1200150" indent="-285750" algn="l" defTabSz="457200" rtl="0" eaLnBrk="1" latinLnBrk="0" hangingPunct="1">
-              <a:spcBef>
-                <a:spcPct val="20000"/>
-              </a:spcBef>
-              <a:spcAft>
-                <a:spcPts val="600"/>
-              </a:spcAft>
-              <a:buClr>
-                <a:schemeClr val="accent1">
-                  <a:lumMod val="75000"/>
-                </a:schemeClr>
-              </a:buClr>
-              <a:buSzPct val="145000"/>
-              <a:buFont typeface="Arial"/>
-              <a:buChar char="•"/>
-              <a:defRPr sz="1800" kern="1200" cap="none">
-                <a:solidFill>
-                  <a:schemeClr val="tx1"/>
-                </a:solidFill>
-                <a:effectLst/>
-                <a:latin typeface="+mn-lt"/>
-                <a:ea typeface="+mn-ea"/>
-                <a:cs typeface="+mn-cs"/>
-              </a:defRPr>
-            </a:lvl3pPr>
-            <a:lvl4pPr marL="1543050" indent="-171450" algn="l" defTabSz="457200" rtl="0" eaLnBrk="1" latinLnBrk="0" hangingPunct="1">
-              <a:spcBef>
-                <a:spcPct val="20000"/>
-              </a:spcBef>
-              <a:spcAft>
-                <a:spcPts val="600"/>
-              </a:spcAft>
-              <a:buClr>
-                <a:schemeClr val="accent1">
-                  <a:lumMod val="75000"/>
-                </a:schemeClr>
-              </a:buClr>
-              <a:buSzPct val="145000"/>
-              <a:buFont typeface="Arial"/>
-              <a:buChar char="•"/>
-              <a:defRPr sz="1600" kern="1200" cap="none">
-                <a:solidFill>
-                  <a:schemeClr val="tx1"/>
-                </a:solidFill>
-                <a:effectLst/>
-                <a:latin typeface="+mn-lt"/>
-                <a:ea typeface="+mn-ea"/>
-                <a:cs typeface="+mn-cs"/>
-              </a:defRPr>
-            </a:lvl4pPr>
-            <a:lvl5pPr marL="2000250" indent="-171450" algn="l" defTabSz="457200" rtl="0" eaLnBrk="1" latinLnBrk="0" hangingPunct="1">
-              <a:spcBef>
-                <a:spcPct val="20000"/>
-              </a:spcBef>
-              <a:spcAft>
-                <a:spcPts val="600"/>
-              </a:spcAft>
-              <a:buClr>
-                <a:schemeClr val="accent1">
-                  <a:lumMod val="75000"/>
-                </a:schemeClr>
-              </a:buClr>
-              <a:buSzPct val="145000"/>
-              <a:buFont typeface="Arial"/>
-              <a:buChar char="•"/>
-              <a:defRPr sz="1400" kern="1200" cap="none">
-                <a:solidFill>
-                  <a:schemeClr val="tx1"/>
-                </a:solidFill>
-                <a:effectLst/>
-                <a:latin typeface="+mn-lt"/>
-                <a:ea typeface="+mn-ea"/>
-                <a:cs typeface="+mn-cs"/>
-              </a:defRPr>
-            </a:lvl5pPr>
-            <a:lvl6pPr marL="2514600" indent="-228600" algn="l" defTabSz="457200" rtl="0" eaLnBrk="1" latinLnBrk="0" hangingPunct="1">
-              <a:spcBef>
-                <a:spcPct val="20000"/>
-              </a:spcBef>
-              <a:spcAft>
-                <a:spcPts val="600"/>
-              </a:spcAft>
-              <a:buClr>
-                <a:schemeClr val="accent1">
-                  <a:lumMod val="75000"/>
-                </a:schemeClr>
-              </a:buClr>
-              <a:buSzPct val="145000"/>
-              <a:buFont typeface="Arial"/>
-              <a:buChar char="•"/>
-              <a:defRPr sz="1400" kern="1200" cap="none">
-                <a:solidFill>
-                  <a:schemeClr val="tx1"/>
-                </a:solidFill>
-                <a:effectLst/>
-                <a:latin typeface="+mn-lt"/>
-                <a:ea typeface="+mn-ea"/>
-                <a:cs typeface="+mn-cs"/>
-              </a:defRPr>
-            </a:lvl6pPr>
-            <a:lvl7pPr marL="2971800" indent="-228600" algn="l" defTabSz="457200" rtl="0" eaLnBrk="1" latinLnBrk="0" hangingPunct="1">
-              <a:spcBef>
-                <a:spcPct val="20000"/>
-              </a:spcBef>
-              <a:spcAft>
-                <a:spcPts val="600"/>
-              </a:spcAft>
-              <a:buClr>
-                <a:schemeClr val="accent1">
-                  <a:lumMod val="75000"/>
-                </a:schemeClr>
-              </a:buClr>
-              <a:buSzPct val="145000"/>
-              <a:buFont typeface="Arial"/>
-              <a:buChar char="•"/>
-              <a:defRPr sz="1400" kern="1200" cap="none">
-                <a:solidFill>
-                  <a:schemeClr val="tx1"/>
-                </a:solidFill>
-                <a:effectLst/>
-                <a:latin typeface="+mn-lt"/>
-                <a:ea typeface="+mn-ea"/>
-                <a:cs typeface="+mn-cs"/>
-              </a:defRPr>
-            </a:lvl7pPr>
-            <a:lvl8pPr marL="3429000" indent="-228600" algn="l" defTabSz="457200" rtl="0" eaLnBrk="1" latinLnBrk="0" hangingPunct="1">
-              <a:spcBef>
-                <a:spcPct val="20000"/>
-              </a:spcBef>
-              <a:spcAft>
-                <a:spcPts val="600"/>
-              </a:spcAft>
-              <a:buClr>
-                <a:schemeClr val="accent1">
-                  <a:lumMod val="75000"/>
-                </a:schemeClr>
-              </a:buClr>
-              <a:buSzPct val="145000"/>
-              <a:buFont typeface="Arial"/>
-              <a:buChar char="•"/>
-              <a:defRPr sz="1400" kern="1200" cap="none">
-                <a:solidFill>
-                  <a:schemeClr val="tx1"/>
-                </a:solidFill>
-                <a:effectLst/>
-                <a:latin typeface="+mn-lt"/>
-                <a:ea typeface="+mn-ea"/>
-                <a:cs typeface="+mn-cs"/>
-              </a:defRPr>
-            </a:lvl8pPr>
-            <a:lvl9pPr marL="3886200" indent="-228600" algn="l" defTabSz="457200" rtl="0" eaLnBrk="1" latinLnBrk="0" hangingPunct="1">
-              <a:spcBef>
-                <a:spcPct val="20000"/>
-              </a:spcBef>
-              <a:spcAft>
-                <a:spcPts val="600"/>
-              </a:spcAft>
-              <a:buClr>
-                <a:schemeClr val="accent1">
-                  <a:lumMod val="75000"/>
-                </a:schemeClr>
-              </a:buClr>
-              <a:buSzPct val="145000"/>
-              <a:buFont typeface="Arial"/>
-              <a:buChar char="•"/>
-              <a:defRPr sz="1400" kern="1200" cap="none">
-                <a:solidFill>
-                  <a:schemeClr val="tx1"/>
-                </a:solidFill>
-                <a:effectLst/>
-                <a:latin typeface="+mn-lt"/>
-                <a:ea typeface="+mn-ea"/>
-                <a:cs typeface="+mn-cs"/>
-              </a:defRPr>
-            </a:lvl9pPr>
-          </a:lstStyle>
-          <a:p>
-            <a:r>
-              <a:rPr lang="fr-FR" dirty="0"/>
-              <a:t>Livraisons de meilleure qualité</a:t>
-            </a:r>
-          </a:p>
-        </p:txBody>
-      </p:sp>
-      <p:sp>
-        <p:nvSpPr>
-          <p:cNvPr id="7" name="Espace réservé du contenu 2">
-            <a:extLst>
-              <a:ext uri="{FF2B5EF4-FFF2-40B4-BE49-F238E27FC236}">
-                <a16:creationId xmlns:a16="http://schemas.microsoft.com/office/drawing/2014/main" id="{EFA4C839-E11C-48B6-9685-5AAC9827FCDF}"/>
-              </a:ext>
-            </a:extLst>
-          </p:cNvPr>
-          <p:cNvSpPr txBox="1">
-            <a:spLocks/>
-          </p:cNvSpPr>
-          <p:nvPr/>
-        </p:nvSpPr>
-        <p:spPr>
-          <a:xfrm>
-            <a:off x="1484310" y="4191000"/>
-            <a:ext cx="10018713" cy="513081"/>
-          </a:xfrm>
-          <a:prstGeom prst="rect">
-            <a:avLst/>
-          </a:prstGeom>
-        </p:spPr>
-        <p:txBody>
-          <a:bodyPr vert="horz" lIns="91440" tIns="45720" rIns="91440" bIns="45720" rtlCol="0" anchor="ctr">
-            <a:normAutofit/>
-          </a:bodyPr>
-          <a:lstStyle>
-            <a:lvl1pPr marL="285750" indent="-285750" algn="l" defTabSz="457200" rtl="0" eaLnBrk="1" latinLnBrk="0" hangingPunct="1">
-              <a:spcBef>
-                <a:spcPct val="20000"/>
-              </a:spcBef>
-              <a:spcAft>
-                <a:spcPts val="600"/>
-              </a:spcAft>
-              <a:buClr>
-                <a:schemeClr val="accent1">
-                  <a:lumMod val="75000"/>
-                </a:schemeClr>
-              </a:buClr>
-              <a:buSzPct val="145000"/>
-              <a:buFont typeface="Arial"/>
-              <a:buChar char="•"/>
-              <a:defRPr sz="2400" kern="1200" cap="none">
-                <a:solidFill>
-                  <a:schemeClr val="tx1"/>
-                </a:solidFill>
-                <a:effectLst/>
-                <a:latin typeface="+mn-lt"/>
-                <a:ea typeface="+mn-ea"/>
-                <a:cs typeface="+mn-cs"/>
-              </a:defRPr>
-            </a:lvl1pPr>
-            <a:lvl2pPr marL="742950" indent="-285750" algn="l" defTabSz="457200" rtl="0" eaLnBrk="1" latinLnBrk="0" hangingPunct="1">
-              <a:spcBef>
-                <a:spcPct val="20000"/>
-              </a:spcBef>
-              <a:spcAft>
-                <a:spcPts val="600"/>
-              </a:spcAft>
-              <a:buClr>
-                <a:schemeClr val="accent1">
-                  <a:lumMod val="75000"/>
-                </a:schemeClr>
-              </a:buClr>
-              <a:buSzPct val="145000"/>
-              <a:buFont typeface="Arial"/>
-              <a:buChar char="•"/>
-              <a:defRPr sz="2000" kern="1200" cap="none">
-                <a:solidFill>
-                  <a:schemeClr val="tx1"/>
-                </a:solidFill>
-                <a:effectLst/>
-                <a:latin typeface="+mn-lt"/>
-                <a:ea typeface="+mn-ea"/>
-                <a:cs typeface="+mn-cs"/>
-              </a:defRPr>
-            </a:lvl2pPr>
-            <a:lvl3pPr marL="1200150" indent="-285750" algn="l" defTabSz="457200" rtl="0" eaLnBrk="1" latinLnBrk="0" hangingPunct="1">
-              <a:spcBef>
-                <a:spcPct val="20000"/>
-              </a:spcBef>
-              <a:spcAft>
-                <a:spcPts val="600"/>
-              </a:spcAft>
-              <a:buClr>
-                <a:schemeClr val="accent1">
-                  <a:lumMod val="75000"/>
-                </a:schemeClr>
-              </a:buClr>
-              <a:buSzPct val="145000"/>
-              <a:buFont typeface="Arial"/>
-              <a:buChar char="•"/>
-              <a:defRPr sz="1800" kern="1200" cap="none">
-                <a:solidFill>
-                  <a:schemeClr val="tx1"/>
-                </a:solidFill>
-                <a:effectLst/>
-                <a:latin typeface="+mn-lt"/>
-                <a:ea typeface="+mn-ea"/>
-                <a:cs typeface="+mn-cs"/>
-              </a:defRPr>
-            </a:lvl3pPr>
-            <a:lvl4pPr marL="1543050" indent="-171450" algn="l" defTabSz="457200" rtl="0" eaLnBrk="1" latinLnBrk="0" hangingPunct="1">
-              <a:spcBef>
-                <a:spcPct val="20000"/>
-              </a:spcBef>
-              <a:spcAft>
-                <a:spcPts val="600"/>
-              </a:spcAft>
-              <a:buClr>
-                <a:schemeClr val="accent1">
-                  <a:lumMod val="75000"/>
-                </a:schemeClr>
-              </a:buClr>
-              <a:buSzPct val="145000"/>
-              <a:buFont typeface="Arial"/>
-              <a:buChar char="•"/>
-              <a:defRPr sz="1600" kern="1200" cap="none">
-                <a:solidFill>
-                  <a:schemeClr val="tx1"/>
-                </a:solidFill>
-                <a:effectLst/>
-                <a:latin typeface="+mn-lt"/>
-                <a:ea typeface="+mn-ea"/>
-                <a:cs typeface="+mn-cs"/>
-              </a:defRPr>
-            </a:lvl4pPr>
-            <a:lvl5pPr marL="2000250" indent="-171450" algn="l" defTabSz="457200" rtl="0" eaLnBrk="1" latinLnBrk="0" hangingPunct="1">
-              <a:spcBef>
-                <a:spcPct val="20000"/>
-              </a:spcBef>
-              <a:spcAft>
-                <a:spcPts val="600"/>
-              </a:spcAft>
-              <a:buClr>
-                <a:schemeClr val="accent1">
-                  <a:lumMod val="75000"/>
-                </a:schemeClr>
-              </a:buClr>
-              <a:buSzPct val="145000"/>
-              <a:buFont typeface="Arial"/>
-              <a:buChar char="•"/>
-              <a:defRPr sz="1400" kern="1200" cap="none">
-                <a:solidFill>
-                  <a:schemeClr val="tx1"/>
-                </a:solidFill>
-                <a:effectLst/>
-                <a:latin typeface="+mn-lt"/>
-                <a:ea typeface="+mn-ea"/>
-                <a:cs typeface="+mn-cs"/>
-              </a:defRPr>
-            </a:lvl5pPr>
-            <a:lvl6pPr marL="2514600" indent="-228600" algn="l" defTabSz="457200" rtl="0" eaLnBrk="1" latinLnBrk="0" hangingPunct="1">
-              <a:spcBef>
-                <a:spcPct val="20000"/>
-              </a:spcBef>
-              <a:spcAft>
-                <a:spcPts val="600"/>
-              </a:spcAft>
-              <a:buClr>
-                <a:schemeClr val="accent1">
-                  <a:lumMod val="75000"/>
-                </a:schemeClr>
-              </a:buClr>
-              <a:buSzPct val="145000"/>
-              <a:buFont typeface="Arial"/>
-              <a:buChar char="•"/>
-              <a:defRPr sz="1400" kern="1200" cap="none">
-                <a:solidFill>
-                  <a:schemeClr val="tx1"/>
-                </a:solidFill>
-                <a:effectLst/>
-                <a:latin typeface="+mn-lt"/>
-                <a:ea typeface="+mn-ea"/>
-                <a:cs typeface="+mn-cs"/>
-              </a:defRPr>
-            </a:lvl6pPr>
-            <a:lvl7pPr marL="2971800" indent="-228600" algn="l" defTabSz="457200" rtl="0" eaLnBrk="1" latinLnBrk="0" hangingPunct="1">
-              <a:spcBef>
-                <a:spcPct val="20000"/>
-              </a:spcBef>
-              <a:spcAft>
-                <a:spcPts val="600"/>
-              </a:spcAft>
-              <a:buClr>
-                <a:schemeClr val="accent1">
-                  <a:lumMod val="75000"/>
-                </a:schemeClr>
-              </a:buClr>
-              <a:buSzPct val="145000"/>
-              <a:buFont typeface="Arial"/>
-              <a:buChar char="•"/>
-              <a:defRPr sz="1400" kern="1200" cap="none">
-                <a:solidFill>
-                  <a:schemeClr val="tx1"/>
-                </a:solidFill>
-                <a:effectLst/>
-                <a:latin typeface="+mn-lt"/>
-                <a:ea typeface="+mn-ea"/>
-                <a:cs typeface="+mn-cs"/>
-              </a:defRPr>
-            </a:lvl7pPr>
-            <a:lvl8pPr marL="3429000" indent="-228600" algn="l" defTabSz="457200" rtl="0" eaLnBrk="1" latinLnBrk="0" hangingPunct="1">
-              <a:spcBef>
-                <a:spcPct val="20000"/>
-              </a:spcBef>
-              <a:spcAft>
-                <a:spcPts val="600"/>
-              </a:spcAft>
-              <a:buClr>
-                <a:schemeClr val="accent1">
-                  <a:lumMod val="75000"/>
-                </a:schemeClr>
-              </a:buClr>
-              <a:buSzPct val="145000"/>
-              <a:buFont typeface="Arial"/>
-              <a:buChar char="•"/>
-              <a:defRPr sz="1400" kern="1200" cap="none">
-                <a:solidFill>
-                  <a:schemeClr val="tx1"/>
-                </a:solidFill>
-                <a:effectLst/>
-                <a:latin typeface="+mn-lt"/>
-                <a:ea typeface="+mn-ea"/>
-                <a:cs typeface="+mn-cs"/>
-              </a:defRPr>
-            </a:lvl8pPr>
-            <a:lvl9pPr marL="3886200" indent="-228600" algn="l" defTabSz="457200" rtl="0" eaLnBrk="1" latinLnBrk="0" hangingPunct="1">
-              <a:spcBef>
-                <a:spcPct val="20000"/>
-              </a:spcBef>
-              <a:spcAft>
-                <a:spcPts val="600"/>
-              </a:spcAft>
-              <a:buClr>
-                <a:schemeClr val="accent1">
-                  <a:lumMod val="75000"/>
-                </a:schemeClr>
-              </a:buClr>
-              <a:buSzPct val="145000"/>
-              <a:buFont typeface="Arial"/>
-              <a:buChar char="•"/>
-              <a:defRPr sz="1400" kern="1200" cap="none">
-                <a:solidFill>
-                  <a:schemeClr val="tx1"/>
-                </a:solidFill>
-                <a:effectLst/>
-                <a:latin typeface="+mn-lt"/>
-                <a:ea typeface="+mn-ea"/>
-                <a:cs typeface="+mn-cs"/>
-              </a:defRPr>
-            </a:lvl9pPr>
-          </a:lstStyle>
-          <a:p>
-            <a:r>
-              <a:rPr lang="fr-FR" dirty="0"/>
-              <a:t>Une cohésion d'équipe renforcée</a:t>
-            </a:r>
-          </a:p>
-        </p:txBody>
-      </p:sp>
-      <p:sp>
-        <p:nvSpPr>
-          <p:cNvPr id="8" name="Espace réservé du contenu 2">
-            <a:extLst>
-              <a:ext uri="{FF2B5EF4-FFF2-40B4-BE49-F238E27FC236}">
-                <a16:creationId xmlns:a16="http://schemas.microsoft.com/office/drawing/2014/main" id="{5F968574-E080-40D6-AD56-976FC7ED50D5}"/>
-              </a:ext>
-            </a:extLst>
-          </p:cNvPr>
-          <p:cNvSpPr txBox="1">
-            <a:spLocks/>
-          </p:cNvSpPr>
-          <p:nvPr/>
-        </p:nvSpPr>
-        <p:spPr>
-          <a:xfrm>
-            <a:off x="1484310" y="4688839"/>
-            <a:ext cx="10018713" cy="513081"/>
-          </a:xfrm>
-          <a:prstGeom prst="rect">
-            <a:avLst/>
-          </a:prstGeom>
-        </p:spPr>
-        <p:txBody>
-          <a:bodyPr vert="horz" lIns="91440" tIns="45720" rIns="91440" bIns="45720" rtlCol="0" anchor="ctr">
-            <a:normAutofit/>
-          </a:bodyPr>
-          <a:lstStyle>
-            <a:lvl1pPr marL="285750" indent="-285750" algn="l" defTabSz="457200" rtl="0" eaLnBrk="1" latinLnBrk="0" hangingPunct="1">
-              <a:spcBef>
-                <a:spcPct val="20000"/>
-              </a:spcBef>
-              <a:spcAft>
-                <a:spcPts val="600"/>
-              </a:spcAft>
-              <a:buClr>
-                <a:schemeClr val="accent1">
-                  <a:lumMod val="75000"/>
-                </a:schemeClr>
-              </a:buClr>
-              <a:buSzPct val="145000"/>
-              <a:buFont typeface="Arial"/>
-              <a:buChar char="•"/>
-              <a:defRPr sz="2400" kern="1200" cap="none">
-                <a:solidFill>
-                  <a:schemeClr val="tx1"/>
-                </a:solidFill>
-                <a:effectLst/>
-                <a:latin typeface="+mn-lt"/>
-                <a:ea typeface="+mn-ea"/>
-                <a:cs typeface="+mn-cs"/>
-              </a:defRPr>
-            </a:lvl1pPr>
-            <a:lvl2pPr marL="742950" indent="-285750" algn="l" defTabSz="457200" rtl="0" eaLnBrk="1" latinLnBrk="0" hangingPunct="1">
-              <a:spcBef>
-                <a:spcPct val="20000"/>
-              </a:spcBef>
-              <a:spcAft>
-                <a:spcPts val="600"/>
-              </a:spcAft>
-              <a:buClr>
-                <a:schemeClr val="accent1">
-                  <a:lumMod val="75000"/>
-                </a:schemeClr>
-              </a:buClr>
-              <a:buSzPct val="145000"/>
-              <a:buFont typeface="Arial"/>
-              <a:buChar char="•"/>
-              <a:defRPr sz="2000" kern="1200" cap="none">
-                <a:solidFill>
-                  <a:schemeClr val="tx1"/>
-                </a:solidFill>
-                <a:effectLst/>
-                <a:latin typeface="+mn-lt"/>
-                <a:ea typeface="+mn-ea"/>
-                <a:cs typeface="+mn-cs"/>
-              </a:defRPr>
-            </a:lvl2pPr>
-            <a:lvl3pPr marL="1200150" indent="-285750" algn="l" defTabSz="457200" rtl="0" eaLnBrk="1" latinLnBrk="0" hangingPunct="1">
-              <a:spcBef>
-                <a:spcPct val="20000"/>
-              </a:spcBef>
-              <a:spcAft>
-                <a:spcPts val="600"/>
-              </a:spcAft>
-              <a:buClr>
-                <a:schemeClr val="accent1">
-                  <a:lumMod val="75000"/>
-                </a:schemeClr>
-              </a:buClr>
-              <a:buSzPct val="145000"/>
-              <a:buFont typeface="Arial"/>
-              <a:buChar char="•"/>
-              <a:defRPr sz="1800" kern="1200" cap="none">
-                <a:solidFill>
-                  <a:schemeClr val="tx1"/>
-                </a:solidFill>
-                <a:effectLst/>
-                <a:latin typeface="+mn-lt"/>
-                <a:ea typeface="+mn-ea"/>
-                <a:cs typeface="+mn-cs"/>
-              </a:defRPr>
-            </a:lvl3pPr>
-            <a:lvl4pPr marL="1543050" indent="-171450" algn="l" defTabSz="457200" rtl="0" eaLnBrk="1" latinLnBrk="0" hangingPunct="1">
-              <a:spcBef>
-                <a:spcPct val="20000"/>
-              </a:spcBef>
-              <a:spcAft>
-                <a:spcPts val="600"/>
-              </a:spcAft>
-              <a:buClr>
-                <a:schemeClr val="accent1">
-                  <a:lumMod val="75000"/>
-                </a:schemeClr>
-              </a:buClr>
-              <a:buSzPct val="145000"/>
-              <a:buFont typeface="Arial"/>
-              <a:buChar char="•"/>
-              <a:defRPr sz="1600" kern="1200" cap="none">
-                <a:solidFill>
-                  <a:schemeClr val="tx1"/>
-                </a:solidFill>
-                <a:effectLst/>
-                <a:latin typeface="+mn-lt"/>
-                <a:ea typeface="+mn-ea"/>
-                <a:cs typeface="+mn-cs"/>
-              </a:defRPr>
-            </a:lvl4pPr>
-            <a:lvl5pPr marL="2000250" indent="-171450" algn="l" defTabSz="457200" rtl="0" eaLnBrk="1" latinLnBrk="0" hangingPunct="1">
-              <a:spcBef>
-                <a:spcPct val="20000"/>
-              </a:spcBef>
-              <a:spcAft>
-                <a:spcPts val="600"/>
-              </a:spcAft>
-              <a:buClr>
-                <a:schemeClr val="accent1">
-                  <a:lumMod val="75000"/>
-                </a:schemeClr>
-              </a:buClr>
-              <a:buSzPct val="145000"/>
-              <a:buFont typeface="Arial"/>
-              <a:buChar char="•"/>
-              <a:defRPr sz="1400" kern="1200" cap="none">
-                <a:solidFill>
-                  <a:schemeClr val="tx1"/>
-                </a:solidFill>
-                <a:effectLst/>
-                <a:latin typeface="+mn-lt"/>
-                <a:ea typeface="+mn-ea"/>
-                <a:cs typeface="+mn-cs"/>
-              </a:defRPr>
-            </a:lvl5pPr>
-            <a:lvl6pPr marL="2514600" indent="-228600" algn="l" defTabSz="457200" rtl="0" eaLnBrk="1" latinLnBrk="0" hangingPunct="1">
-              <a:spcBef>
-                <a:spcPct val="20000"/>
-              </a:spcBef>
-              <a:spcAft>
-                <a:spcPts val="600"/>
-              </a:spcAft>
-              <a:buClr>
-                <a:schemeClr val="accent1">
-                  <a:lumMod val="75000"/>
-                </a:schemeClr>
-              </a:buClr>
-              <a:buSzPct val="145000"/>
-              <a:buFont typeface="Arial"/>
-              <a:buChar char="•"/>
-              <a:defRPr sz="1400" kern="1200" cap="none">
-                <a:solidFill>
-                  <a:schemeClr val="tx1"/>
-                </a:solidFill>
-                <a:effectLst/>
-                <a:latin typeface="+mn-lt"/>
-                <a:ea typeface="+mn-ea"/>
-                <a:cs typeface="+mn-cs"/>
-              </a:defRPr>
-            </a:lvl6pPr>
-            <a:lvl7pPr marL="2971800" indent="-228600" algn="l" defTabSz="457200" rtl="0" eaLnBrk="1" latinLnBrk="0" hangingPunct="1">
-              <a:spcBef>
-                <a:spcPct val="20000"/>
-              </a:spcBef>
-              <a:spcAft>
-                <a:spcPts val="600"/>
-              </a:spcAft>
-              <a:buClr>
-                <a:schemeClr val="accent1">
-                  <a:lumMod val="75000"/>
-                </a:schemeClr>
-              </a:buClr>
-              <a:buSzPct val="145000"/>
-              <a:buFont typeface="Arial"/>
-              <a:buChar char="•"/>
-              <a:defRPr sz="1400" kern="1200" cap="none">
-                <a:solidFill>
-                  <a:schemeClr val="tx1"/>
-                </a:solidFill>
-                <a:effectLst/>
-                <a:latin typeface="+mn-lt"/>
-                <a:ea typeface="+mn-ea"/>
-                <a:cs typeface="+mn-cs"/>
-              </a:defRPr>
-            </a:lvl7pPr>
-            <a:lvl8pPr marL="3429000" indent="-228600" algn="l" defTabSz="457200" rtl="0" eaLnBrk="1" latinLnBrk="0" hangingPunct="1">
-              <a:spcBef>
-                <a:spcPct val="20000"/>
-              </a:spcBef>
-              <a:spcAft>
-                <a:spcPts val="600"/>
-              </a:spcAft>
-              <a:buClr>
-                <a:schemeClr val="accent1">
-                  <a:lumMod val="75000"/>
-                </a:schemeClr>
-              </a:buClr>
-              <a:buSzPct val="145000"/>
-              <a:buFont typeface="Arial"/>
-              <a:buChar char="•"/>
-              <a:defRPr sz="1400" kern="1200" cap="none">
-                <a:solidFill>
-                  <a:schemeClr val="tx1"/>
-                </a:solidFill>
-                <a:effectLst/>
-                <a:latin typeface="+mn-lt"/>
-                <a:ea typeface="+mn-ea"/>
-                <a:cs typeface="+mn-cs"/>
-              </a:defRPr>
-            </a:lvl8pPr>
-            <a:lvl9pPr marL="3886200" indent="-228600" algn="l" defTabSz="457200" rtl="0" eaLnBrk="1" latinLnBrk="0" hangingPunct="1">
-              <a:spcBef>
-                <a:spcPct val="20000"/>
-              </a:spcBef>
-              <a:spcAft>
-                <a:spcPts val="600"/>
-              </a:spcAft>
-              <a:buClr>
-                <a:schemeClr val="accent1">
-                  <a:lumMod val="75000"/>
-                </a:schemeClr>
-              </a:buClr>
-              <a:buSzPct val="145000"/>
-              <a:buFont typeface="Arial"/>
-              <a:buChar char="•"/>
-              <a:defRPr sz="1400" kern="1200" cap="none">
-                <a:solidFill>
-                  <a:schemeClr val="tx1"/>
-                </a:solidFill>
-                <a:effectLst/>
-                <a:latin typeface="+mn-lt"/>
-                <a:ea typeface="+mn-ea"/>
-                <a:cs typeface="+mn-cs"/>
-              </a:defRPr>
-            </a:lvl9pPr>
-          </a:lstStyle>
-          <a:p>
-            <a:r>
-              <a:rPr lang="fr-FR" dirty="0"/>
-              <a:t>Une gestion des délais différente</a:t>
-            </a:r>
-          </a:p>
-        </p:txBody>
-      </p:sp>
-    </p:spTree>
-    <p:extLst>
-      <p:ext uri="{BB962C8B-B14F-4D97-AF65-F5344CB8AC3E}">
-        <p14:creationId xmlns:p14="http://schemas.microsoft.com/office/powerpoint/2010/main" val="2776957562"/>
-      </p:ext>
-    </p:extLst>
-  </p:cSld>
-  <p:clrMapOvr>
-    <a:masterClrMapping/>
-  </p:clrMapOvr>
-</p:sld>
-</file>
-
-<file path=ppt/slides/slide8.xml><?xml version="1.0" encoding="utf-8"?>
-<p:sld xmlns:a="http://schemas.openxmlformats.org/drawingml/2006/main" xmlns:r="http://schemas.openxmlformats.org/officeDocument/2006/relationships" xmlns:p="http://schemas.openxmlformats.org/presentationml/2006/main">
-  <p:cSld>
-    <p:spTree>
-      <p:nvGrpSpPr>
-        <p:cNvPr id="1" name=""/>
-        <p:cNvGrpSpPr/>
-        <p:nvPr/>
-      </p:nvGrpSpPr>
-      <p:grpSpPr>
-        <a:xfrm>
-          <a:off x="0" y="0"/>
-          <a:ext cx="0" cy="0"/>
-          <a:chOff x="0" y="0"/>
-          <a:chExt cx="0" cy="0"/>
-        </a:xfrm>
-      </p:grpSpPr>
-      <p:sp>
-        <p:nvSpPr>
-          <p:cNvPr id="2" name="Titre 1">
-            <a:extLst>
-              <a:ext uri="{FF2B5EF4-FFF2-40B4-BE49-F238E27FC236}">
                 <a16:creationId xmlns:a16="http://schemas.microsoft.com/office/drawing/2014/main" id="{9AF062FD-23BF-A944-9FD3-8FF06344FFDC}"/>
               </a:ext>
             </a:extLst>
@@ -11497,6 +10447,1460 @@
   <p:clrMapOvr>
     <a:masterClrMapping/>
   </p:clrMapOvr>
+</p:sld>
+</file>
+
+<file path=ppt/slides/slide8.xml><?xml version="1.0" encoding="utf-8"?>
+<p:sld xmlns:a="http://schemas.openxmlformats.org/drawingml/2006/main" xmlns:r="http://schemas.openxmlformats.org/officeDocument/2006/relationships" xmlns:p="http://schemas.openxmlformats.org/presentationml/2006/main">
+  <p:cSld>
+    <p:spTree>
+      <p:nvGrpSpPr>
+        <p:cNvPr id="1" name=""/>
+        <p:cNvGrpSpPr/>
+        <p:nvPr/>
+      </p:nvGrpSpPr>
+      <p:grpSpPr>
+        <a:xfrm>
+          <a:off x="0" y="0"/>
+          <a:ext cx="0" cy="0"/>
+          <a:chOff x="0" y="0"/>
+          <a:chExt cx="0" cy="0"/>
+        </a:xfrm>
+      </p:grpSpPr>
+      <p:sp>
+        <p:nvSpPr>
+          <p:cNvPr id="2" name="Titre 1">
+            <a:extLst>
+              <a:ext uri="{FF2B5EF4-FFF2-40B4-BE49-F238E27FC236}">
+                <a16:creationId xmlns:a16="http://schemas.microsoft.com/office/drawing/2014/main" id="{50A08348-FE10-4CC5-AB62-DB28F7E51380}"/>
+              </a:ext>
+            </a:extLst>
+          </p:cNvPr>
+          <p:cNvSpPr>
+            <a:spLocks noGrp="1"/>
+          </p:cNvSpPr>
+          <p:nvPr>
+            <p:ph type="title"/>
+          </p:nvPr>
+        </p:nvSpPr>
+        <p:spPr>
+          <a:xfrm>
+            <a:off x="1086643" y="0"/>
+            <a:ext cx="10018713" cy="1752599"/>
+          </a:xfrm>
+        </p:spPr>
+        <p:txBody>
+          <a:bodyPr/>
+          <a:lstStyle/>
+          <a:p>
+            <a:r>
+              <a:rPr lang="fr-FR" dirty="0"/>
+              <a:t>Pourquoi l'agilité ?</a:t>
+            </a:r>
+          </a:p>
+        </p:txBody>
+      </p:sp>
+      <p:sp>
+        <p:nvSpPr>
+          <p:cNvPr id="3" name="Espace réservé du contenu 2">
+            <a:extLst>
+              <a:ext uri="{FF2B5EF4-FFF2-40B4-BE49-F238E27FC236}">
+                <a16:creationId xmlns:a16="http://schemas.microsoft.com/office/drawing/2014/main" id="{00305290-5DE2-4A54-92FE-75957498674F}"/>
+              </a:ext>
+            </a:extLst>
+          </p:cNvPr>
+          <p:cNvSpPr>
+            <a:spLocks noGrp="1"/>
+          </p:cNvSpPr>
+          <p:nvPr>
+            <p:ph idx="1"/>
+          </p:nvPr>
+        </p:nvSpPr>
+        <p:spPr>
+          <a:xfrm>
+            <a:off x="1484310" y="2666999"/>
+            <a:ext cx="10018713" cy="513081"/>
+          </a:xfrm>
+        </p:spPr>
+        <p:txBody>
+          <a:bodyPr/>
+          <a:lstStyle/>
+          <a:p>
+            <a:r>
+              <a:rPr lang="fr-FR" dirty="0"/>
+              <a:t>Accroître la visibilité des projets avec le client</a:t>
+            </a:r>
+          </a:p>
+        </p:txBody>
+      </p:sp>
+      <p:sp>
+        <p:nvSpPr>
+          <p:cNvPr id="4" name="Espace réservé du contenu 2">
+            <a:extLst>
+              <a:ext uri="{FF2B5EF4-FFF2-40B4-BE49-F238E27FC236}">
+                <a16:creationId xmlns:a16="http://schemas.microsoft.com/office/drawing/2014/main" id="{4C0B5EE6-9F15-473E-A4EA-77EEEA4CE1F3}"/>
+              </a:ext>
+            </a:extLst>
+          </p:cNvPr>
+          <p:cNvSpPr txBox="1">
+            <a:spLocks/>
+          </p:cNvSpPr>
+          <p:nvPr/>
+        </p:nvSpPr>
+        <p:spPr>
+          <a:xfrm>
+            <a:off x="1484310" y="3172459"/>
+            <a:ext cx="10018713" cy="513081"/>
+          </a:xfrm>
+          <a:prstGeom prst="rect">
+            <a:avLst/>
+          </a:prstGeom>
+        </p:spPr>
+        <p:txBody>
+          <a:bodyPr vert="horz" lIns="91440" tIns="45720" rIns="91440" bIns="45720" rtlCol="0" anchor="ctr">
+            <a:normAutofit/>
+          </a:bodyPr>
+          <a:lstStyle>
+            <a:lvl1pPr marL="285750" indent="-285750" algn="l" defTabSz="457200" rtl="0" eaLnBrk="1" latinLnBrk="0" hangingPunct="1">
+              <a:spcBef>
+                <a:spcPct val="20000"/>
+              </a:spcBef>
+              <a:spcAft>
+                <a:spcPts val="600"/>
+              </a:spcAft>
+              <a:buClr>
+                <a:schemeClr val="accent1">
+                  <a:lumMod val="75000"/>
+                </a:schemeClr>
+              </a:buClr>
+              <a:buSzPct val="145000"/>
+              <a:buFont typeface="Arial"/>
+              <a:buChar char="•"/>
+              <a:defRPr sz="2400" kern="1200" cap="none">
+                <a:solidFill>
+                  <a:schemeClr val="tx1"/>
+                </a:solidFill>
+                <a:effectLst/>
+                <a:latin typeface="+mn-lt"/>
+                <a:ea typeface="+mn-ea"/>
+                <a:cs typeface="+mn-cs"/>
+              </a:defRPr>
+            </a:lvl1pPr>
+            <a:lvl2pPr marL="742950" indent="-285750" algn="l" defTabSz="457200" rtl="0" eaLnBrk="1" latinLnBrk="0" hangingPunct="1">
+              <a:spcBef>
+                <a:spcPct val="20000"/>
+              </a:spcBef>
+              <a:spcAft>
+                <a:spcPts val="600"/>
+              </a:spcAft>
+              <a:buClr>
+                <a:schemeClr val="accent1">
+                  <a:lumMod val="75000"/>
+                </a:schemeClr>
+              </a:buClr>
+              <a:buSzPct val="145000"/>
+              <a:buFont typeface="Arial"/>
+              <a:buChar char="•"/>
+              <a:defRPr sz="2000" kern="1200" cap="none">
+                <a:solidFill>
+                  <a:schemeClr val="tx1"/>
+                </a:solidFill>
+                <a:effectLst/>
+                <a:latin typeface="+mn-lt"/>
+                <a:ea typeface="+mn-ea"/>
+                <a:cs typeface="+mn-cs"/>
+              </a:defRPr>
+            </a:lvl2pPr>
+            <a:lvl3pPr marL="1200150" indent="-285750" algn="l" defTabSz="457200" rtl="0" eaLnBrk="1" latinLnBrk="0" hangingPunct="1">
+              <a:spcBef>
+                <a:spcPct val="20000"/>
+              </a:spcBef>
+              <a:spcAft>
+                <a:spcPts val="600"/>
+              </a:spcAft>
+              <a:buClr>
+                <a:schemeClr val="accent1">
+                  <a:lumMod val="75000"/>
+                </a:schemeClr>
+              </a:buClr>
+              <a:buSzPct val="145000"/>
+              <a:buFont typeface="Arial"/>
+              <a:buChar char="•"/>
+              <a:defRPr sz="1800" kern="1200" cap="none">
+                <a:solidFill>
+                  <a:schemeClr val="tx1"/>
+                </a:solidFill>
+                <a:effectLst/>
+                <a:latin typeface="+mn-lt"/>
+                <a:ea typeface="+mn-ea"/>
+                <a:cs typeface="+mn-cs"/>
+              </a:defRPr>
+            </a:lvl3pPr>
+            <a:lvl4pPr marL="1543050" indent="-171450" algn="l" defTabSz="457200" rtl="0" eaLnBrk="1" latinLnBrk="0" hangingPunct="1">
+              <a:spcBef>
+                <a:spcPct val="20000"/>
+              </a:spcBef>
+              <a:spcAft>
+                <a:spcPts val="600"/>
+              </a:spcAft>
+              <a:buClr>
+                <a:schemeClr val="accent1">
+                  <a:lumMod val="75000"/>
+                </a:schemeClr>
+              </a:buClr>
+              <a:buSzPct val="145000"/>
+              <a:buFont typeface="Arial"/>
+              <a:buChar char="•"/>
+              <a:defRPr sz="1600" kern="1200" cap="none">
+                <a:solidFill>
+                  <a:schemeClr val="tx1"/>
+                </a:solidFill>
+                <a:effectLst/>
+                <a:latin typeface="+mn-lt"/>
+                <a:ea typeface="+mn-ea"/>
+                <a:cs typeface="+mn-cs"/>
+              </a:defRPr>
+            </a:lvl4pPr>
+            <a:lvl5pPr marL="2000250" indent="-171450" algn="l" defTabSz="457200" rtl="0" eaLnBrk="1" latinLnBrk="0" hangingPunct="1">
+              <a:spcBef>
+                <a:spcPct val="20000"/>
+              </a:spcBef>
+              <a:spcAft>
+                <a:spcPts val="600"/>
+              </a:spcAft>
+              <a:buClr>
+                <a:schemeClr val="accent1">
+                  <a:lumMod val="75000"/>
+                </a:schemeClr>
+              </a:buClr>
+              <a:buSzPct val="145000"/>
+              <a:buFont typeface="Arial"/>
+              <a:buChar char="•"/>
+              <a:defRPr sz="1400" kern="1200" cap="none">
+                <a:solidFill>
+                  <a:schemeClr val="tx1"/>
+                </a:solidFill>
+                <a:effectLst/>
+                <a:latin typeface="+mn-lt"/>
+                <a:ea typeface="+mn-ea"/>
+                <a:cs typeface="+mn-cs"/>
+              </a:defRPr>
+            </a:lvl5pPr>
+            <a:lvl6pPr marL="2514600" indent="-228600" algn="l" defTabSz="457200" rtl="0" eaLnBrk="1" latinLnBrk="0" hangingPunct="1">
+              <a:spcBef>
+                <a:spcPct val="20000"/>
+              </a:spcBef>
+              <a:spcAft>
+                <a:spcPts val="600"/>
+              </a:spcAft>
+              <a:buClr>
+                <a:schemeClr val="accent1">
+                  <a:lumMod val="75000"/>
+                </a:schemeClr>
+              </a:buClr>
+              <a:buSzPct val="145000"/>
+              <a:buFont typeface="Arial"/>
+              <a:buChar char="•"/>
+              <a:defRPr sz="1400" kern="1200" cap="none">
+                <a:solidFill>
+                  <a:schemeClr val="tx1"/>
+                </a:solidFill>
+                <a:effectLst/>
+                <a:latin typeface="+mn-lt"/>
+                <a:ea typeface="+mn-ea"/>
+                <a:cs typeface="+mn-cs"/>
+              </a:defRPr>
+            </a:lvl6pPr>
+            <a:lvl7pPr marL="2971800" indent="-228600" algn="l" defTabSz="457200" rtl="0" eaLnBrk="1" latinLnBrk="0" hangingPunct="1">
+              <a:spcBef>
+                <a:spcPct val="20000"/>
+              </a:spcBef>
+              <a:spcAft>
+                <a:spcPts val="600"/>
+              </a:spcAft>
+              <a:buClr>
+                <a:schemeClr val="accent1">
+                  <a:lumMod val="75000"/>
+                </a:schemeClr>
+              </a:buClr>
+              <a:buSzPct val="145000"/>
+              <a:buFont typeface="Arial"/>
+              <a:buChar char="•"/>
+              <a:defRPr sz="1400" kern="1200" cap="none">
+                <a:solidFill>
+                  <a:schemeClr val="tx1"/>
+                </a:solidFill>
+                <a:effectLst/>
+                <a:latin typeface="+mn-lt"/>
+                <a:ea typeface="+mn-ea"/>
+                <a:cs typeface="+mn-cs"/>
+              </a:defRPr>
+            </a:lvl7pPr>
+            <a:lvl8pPr marL="3429000" indent="-228600" algn="l" defTabSz="457200" rtl="0" eaLnBrk="1" latinLnBrk="0" hangingPunct="1">
+              <a:spcBef>
+                <a:spcPct val="20000"/>
+              </a:spcBef>
+              <a:spcAft>
+                <a:spcPts val="600"/>
+              </a:spcAft>
+              <a:buClr>
+                <a:schemeClr val="accent1">
+                  <a:lumMod val="75000"/>
+                </a:schemeClr>
+              </a:buClr>
+              <a:buSzPct val="145000"/>
+              <a:buFont typeface="Arial"/>
+              <a:buChar char="•"/>
+              <a:defRPr sz="1400" kern="1200" cap="none">
+                <a:solidFill>
+                  <a:schemeClr val="tx1"/>
+                </a:solidFill>
+                <a:effectLst/>
+                <a:latin typeface="+mn-lt"/>
+                <a:ea typeface="+mn-ea"/>
+                <a:cs typeface="+mn-cs"/>
+              </a:defRPr>
+            </a:lvl8pPr>
+            <a:lvl9pPr marL="3886200" indent="-228600" algn="l" defTabSz="457200" rtl="0" eaLnBrk="1" latinLnBrk="0" hangingPunct="1">
+              <a:spcBef>
+                <a:spcPct val="20000"/>
+              </a:spcBef>
+              <a:spcAft>
+                <a:spcPts val="600"/>
+              </a:spcAft>
+              <a:buClr>
+                <a:schemeClr val="accent1">
+                  <a:lumMod val="75000"/>
+                </a:schemeClr>
+              </a:buClr>
+              <a:buSzPct val="145000"/>
+              <a:buFont typeface="Arial"/>
+              <a:buChar char="•"/>
+              <a:defRPr sz="1400" kern="1200" cap="none">
+                <a:solidFill>
+                  <a:schemeClr val="tx1"/>
+                </a:solidFill>
+                <a:effectLst/>
+                <a:latin typeface="+mn-lt"/>
+                <a:ea typeface="+mn-ea"/>
+                <a:cs typeface="+mn-cs"/>
+              </a:defRPr>
+            </a:lvl9pPr>
+          </a:lstStyle>
+          <a:p>
+            <a:r>
+              <a:rPr lang="fr-FR" dirty="0"/>
+              <a:t>Faire face à la conduite du changement</a:t>
+            </a:r>
+          </a:p>
+        </p:txBody>
+      </p:sp>
+      <p:sp>
+        <p:nvSpPr>
+          <p:cNvPr id="6" name="Espace réservé du contenu 2">
+            <a:extLst>
+              <a:ext uri="{FF2B5EF4-FFF2-40B4-BE49-F238E27FC236}">
+                <a16:creationId xmlns:a16="http://schemas.microsoft.com/office/drawing/2014/main" id="{BCBAFD2E-3BD9-4E39-874C-66B275D0F0DC}"/>
+              </a:ext>
+            </a:extLst>
+          </p:cNvPr>
+          <p:cNvSpPr txBox="1">
+            <a:spLocks/>
+          </p:cNvSpPr>
+          <p:nvPr/>
+        </p:nvSpPr>
+        <p:spPr>
+          <a:xfrm>
+            <a:off x="1484310" y="3677919"/>
+            <a:ext cx="10018713" cy="513081"/>
+          </a:xfrm>
+          <a:prstGeom prst="rect">
+            <a:avLst/>
+          </a:prstGeom>
+        </p:spPr>
+        <p:txBody>
+          <a:bodyPr vert="horz" lIns="91440" tIns="45720" rIns="91440" bIns="45720" rtlCol="0" anchor="ctr">
+            <a:normAutofit/>
+          </a:bodyPr>
+          <a:lstStyle>
+            <a:lvl1pPr marL="285750" indent="-285750" algn="l" defTabSz="457200" rtl="0" eaLnBrk="1" latinLnBrk="0" hangingPunct="1">
+              <a:spcBef>
+                <a:spcPct val="20000"/>
+              </a:spcBef>
+              <a:spcAft>
+                <a:spcPts val="600"/>
+              </a:spcAft>
+              <a:buClr>
+                <a:schemeClr val="accent1">
+                  <a:lumMod val="75000"/>
+                </a:schemeClr>
+              </a:buClr>
+              <a:buSzPct val="145000"/>
+              <a:buFont typeface="Arial"/>
+              <a:buChar char="•"/>
+              <a:defRPr sz="2400" kern="1200" cap="none">
+                <a:solidFill>
+                  <a:schemeClr val="tx1"/>
+                </a:solidFill>
+                <a:effectLst/>
+                <a:latin typeface="+mn-lt"/>
+                <a:ea typeface="+mn-ea"/>
+                <a:cs typeface="+mn-cs"/>
+              </a:defRPr>
+            </a:lvl1pPr>
+            <a:lvl2pPr marL="742950" indent="-285750" algn="l" defTabSz="457200" rtl="0" eaLnBrk="1" latinLnBrk="0" hangingPunct="1">
+              <a:spcBef>
+                <a:spcPct val="20000"/>
+              </a:spcBef>
+              <a:spcAft>
+                <a:spcPts val="600"/>
+              </a:spcAft>
+              <a:buClr>
+                <a:schemeClr val="accent1">
+                  <a:lumMod val="75000"/>
+                </a:schemeClr>
+              </a:buClr>
+              <a:buSzPct val="145000"/>
+              <a:buFont typeface="Arial"/>
+              <a:buChar char="•"/>
+              <a:defRPr sz="2000" kern="1200" cap="none">
+                <a:solidFill>
+                  <a:schemeClr val="tx1"/>
+                </a:solidFill>
+                <a:effectLst/>
+                <a:latin typeface="+mn-lt"/>
+                <a:ea typeface="+mn-ea"/>
+                <a:cs typeface="+mn-cs"/>
+              </a:defRPr>
+            </a:lvl2pPr>
+            <a:lvl3pPr marL="1200150" indent="-285750" algn="l" defTabSz="457200" rtl="0" eaLnBrk="1" latinLnBrk="0" hangingPunct="1">
+              <a:spcBef>
+                <a:spcPct val="20000"/>
+              </a:spcBef>
+              <a:spcAft>
+                <a:spcPts val="600"/>
+              </a:spcAft>
+              <a:buClr>
+                <a:schemeClr val="accent1">
+                  <a:lumMod val="75000"/>
+                </a:schemeClr>
+              </a:buClr>
+              <a:buSzPct val="145000"/>
+              <a:buFont typeface="Arial"/>
+              <a:buChar char="•"/>
+              <a:defRPr sz="1800" kern="1200" cap="none">
+                <a:solidFill>
+                  <a:schemeClr val="tx1"/>
+                </a:solidFill>
+                <a:effectLst/>
+                <a:latin typeface="+mn-lt"/>
+                <a:ea typeface="+mn-ea"/>
+                <a:cs typeface="+mn-cs"/>
+              </a:defRPr>
+            </a:lvl3pPr>
+            <a:lvl4pPr marL="1543050" indent="-171450" algn="l" defTabSz="457200" rtl="0" eaLnBrk="1" latinLnBrk="0" hangingPunct="1">
+              <a:spcBef>
+                <a:spcPct val="20000"/>
+              </a:spcBef>
+              <a:spcAft>
+                <a:spcPts val="600"/>
+              </a:spcAft>
+              <a:buClr>
+                <a:schemeClr val="accent1">
+                  <a:lumMod val="75000"/>
+                </a:schemeClr>
+              </a:buClr>
+              <a:buSzPct val="145000"/>
+              <a:buFont typeface="Arial"/>
+              <a:buChar char="•"/>
+              <a:defRPr sz="1600" kern="1200" cap="none">
+                <a:solidFill>
+                  <a:schemeClr val="tx1"/>
+                </a:solidFill>
+                <a:effectLst/>
+                <a:latin typeface="+mn-lt"/>
+                <a:ea typeface="+mn-ea"/>
+                <a:cs typeface="+mn-cs"/>
+              </a:defRPr>
+            </a:lvl4pPr>
+            <a:lvl5pPr marL="2000250" indent="-171450" algn="l" defTabSz="457200" rtl="0" eaLnBrk="1" latinLnBrk="0" hangingPunct="1">
+              <a:spcBef>
+                <a:spcPct val="20000"/>
+              </a:spcBef>
+              <a:spcAft>
+                <a:spcPts val="600"/>
+              </a:spcAft>
+              <a:buClr>
+                <a:schemeClr val="accent1">
+                  <a:lumMod val="75000"/>
+                </a:schemeClr>
+              </a:buClr>
+              <a:buSzPct val="145000"/>
+              <a:buFont typeface="Arial"/>
+              <a:buChar char="•"/>
+              <a:defRPr sz="1400" kern="1200" cap="none">
+                <a:solidFill>
+                  <a:schemeClr val="tx1"/>
+                </a:solidFill>
+                <a:effectLst/>
+                <a:latin typeface="+mn-lt"/>
+                <a:ea typeface="+mn-ea"/>
+                <a:cs typeface="+mn-cs"/>
+              </a:defRPr>
+            </a:lvl5pPr>
+            <a:lvl6pPr marL="2514600" indent="-228600" algn="l" defTabSz="457200" rtl="0" eaLnBrk="1" latinLnBrk="0" hangingPunct="1">
+              <a:spcBef>
+                <a:spcPct val="20000"/>
+              </a:spcBef>
+              <a:spcAft>
+                <a:spcPts val="600"/>
+              </a:spcAft>
+              <a:buClr>
+                <a:schemeClr val="accent1">
+                  <a:lumMod val="75000"/>
+                </a:schemeClr>
+              </a:buClr>
+              <a:buSzPct val="145000"/>
+              <a:buFont typeface="Arial"/>
+              <a:buChar char="•"/>
+              <a:defRPr sz="1400" kern="1200" cap="none">
+                <a:solidFill>
+                  <a:schemeClr val="tx1"/>
+                </a:solidFill>
+                <a:effectLst/>
+                <a:latin typeface="+mn-lt"/>
+                <a:ea typeface="+mn-ea"/>
+                <a:cs typeface="+mn-cs"/>
+              </a:defRPr>
+            </a:lvl6pPr>
+            <a:lvl7pPr marL="2971800" indent="-228600" algn="l" defTabSz="457200" rtl="0" eaLnBrk="1" latinLnBrk="0" hangingPunct="1">
+              <a:spcBef>
+                <a:spcPct val="20000"/>
+              </a:spcBef>
+              <a:spcAft>
+                <a:spcPts val="600"/>
+              </a:spcAft>
+              <a:buClr>
+                <a:schemeClr val="accent1">
+                  <a:lumMod val="75000"/>
+                </a:schemeClr>
+              </a:buClr>
+              <a:buSzPct val="145000"/>
+              <a:buFont typeface="Arial"/>
+              <a:buChar char="•"/>
+              <a:defRPr sz="1400" kern="1200" cap="none">
+                <a:solidFill>
+                  <a:schemeClr val="tx1"/>
+                </a:solidFill>
+                <a:effectLst/>
+                <a:latin typeface="+mn-lt"/>
+                <a:ea typeface="+mn-ea"/>
+                <a:cs typeface="+mn-cs"/>
+              </a:defRPr>
+            </a:lvl7pPr>
+            <a:lvl8pPr marL="3429000" indent="-228600" algn="l" defTabSz="457200" rtl="0" eaLnBrk="1" latinLnBrk="0" hangingPunct="1">
+              <a:spcBef>
+                <a:spcPct val="20000"/>
+              </a:spcBef>
+              <a:spcAft>
+                <a:spcPts val="600"/>
+              </a:spcAft>
+              <a:buClr>
+                <a:schemeClr val="accent1">
+                  <a:lumMod val="75000"/>
+                </a:schemeClr>
+              </a:buClr>
+              <a:buSzPct val="145000"/>
+              <a:buFont typeface="Arial"/>
+              <a:buChar char="•"/>
+              <a:defRPr sz="1400" kern="1200" cap="none">
+                <a:solidFill>
+                  <a:schemeClr val="tx1"/>
+                </a:solidFill>
+                <a:effectLst/>
+                <a:latin typeface="+mn-lt"/>
+                <a:ea typeface="+mn-ea"/>
+                <a:cs typeface="+mn-cs"/>
+              </a:defRPr>
+            </a:lvl8pPr>
+            <a:lvl9pPr marL="3886200" indent="-228600" algn="l" defTabSz="457200" rtl="0" eaLnBrk="1" latinLnBrk="0" hangingPunct="1">
+              <a:spcBef>
+                <a:spcPct val="20000"/>
+              </a:spcBef>
+              <a:spcAft>
+                <a:spcPts val="600"/>
+              </a:spcAft>
+              <a:buClr>
+                <a:schemeClr val="accent1">
+                  <a:lumMod val="75000"/>
+                </a:schemeClr>
+              </a:buClr>
+              <a:buSzPct val="145000"/>
+              <a:buFont typeface="Arial"/>
+              <a:buChar char="•"/>
+              <a:defRPr sz="1400" kern="1200" cap="none">
+                <a:solidFill>
+                  <a:schemeClr val="tx1"/>
+                </a:solidFill>
+                <a:effectLst/>
+                <a:latin typeface="+mn-lt"/>
+                <a:ea typeface="+mn-ea"/>
+                <a:cs typeface="+mn-cs"/>
+              </a:defRPr>
+            </a:lvl9pPr>
+          </a:lstStyle>
+          <a:p>
+            <a:r>
+              <a:rPr lang="fr-FR" dirty="0"/>
+              <a:t>Livraisons de meilleure qualité</a:t>
+            </a:r>
+          </a:p>
+        </p:txBody>
+      </p:sp>
+      <p:sp>
+        <p:nvSpPr>
+          <p:cNvPr id="7" name="Espace réservé du contenu 2">
+            <a:extLst>
+              <a:ext uri="{FF2B5EF4-FFF2-40B4-BE49-F238E27FC236}">
+                <a16:creationId xmlns:a16="http://schemas.microsoft.com/office/drawing/2014/main" id="{EFA4C839-E11C-48B6-9685-5AAC9827FCDF}"/>
+              </a:ext>
+            </a:extLst>
+          </p:cNvPr>
+          <p:cNvSpPr txBox="1">
+            <a:spLocks/>
+          </p:cNvSpPr>
+          <p:nvPr/>
+        </p:nvSpPr>
+        <p:spPr>
+          <a:xfrm>
+            <a:off x="1484310" y="4191000"/>
+            <a:ext cx="10018713" cy="513081"/>
+          </a:xfrm>
+          <a:prstGeom prst="rect">
+            <a:avLst/>
+          </a:prstGeom>
+        </p:spPr>
+        <p:txBody>
+          <a:bodyPr vert="horz" lIns="91440" tIns="45720" rIns="91440" bIns="45720" rtlCol="0" anchor="ctr">
+            <a:normAutofit/>
+          </a:bodyPr>
+          <a:lstStyle>
+            <a:lvl1pPr marL="285750" indent="-285750" algn="l" defTabSz="457200" rtl="0" eaLnBrk="1" latinLnBrk="0" hangingPunct="1">
+              <a:spcBef>
+                <a:spcPct val="20000"/>
+              </a:spcBef>
+              <a:spcAft>
+                <a:spcPts val="600"/>
+              </a:spcAft>
+              <a:buClr>
+                <a:schemeClr val="accent1">
+                  <a:lumMod val="75000"/>
+                </a:schemeClr>
+              </a:buClr>
+              <a:buSzPct val="145000"/>
+              <a:buFont typeface="Arial"/>
+              <a:buChar char="•"/>
+              <a:defRPr sz="2400" kern="1200" cap="none">
+                <a:solidFill>
+                  <a:schemeClr val="tx1"/>
+                </a:solidFill>
+                <a:effectLst/>
+                <a:latin typeface="+mn-lt"/>
+                <a:ea typeface="+mn-ea"/>
+                <a:cs typeface="+mn-cs"/>
+              </a:defRPr>
+            </a:lvl1pPr>
+            <a:lvl2pPr marL="742950" indent="-285750" algn="l" defTabSz="457200" rtl="0" eaLnBrk="1" latinLnBrk="0" hangingPunct="1">
+              <a:spcBef>
+                <a:spcPct val="20000"/>
+              </a:spcBef>
+              <a:spcAft>
+                <a:spcPts val="600"/>
+              </a:spcAft>
+              <a:buClr>
+                <a:schemeClr val="accent1">
+                  <a:lumMod val="75000"/>
+                </a:schemeClr>
+              </a:buClr>
+              <a:buSzPct val="145000"/>
+              <a:buFont typeface="Arial"/>
+              <a:buChar char="•"/>
+              <a:defRPr sz="2000" kern="1200" cap="none">
+                <a:solidFill>
+                  <a:schemeClr val="tx1"/>
+                </a:solidFill>
+                <a:effectLst/>
+                <a:latin typeface="+mn-lt"/>
+                <a:ea typeface="+mn-ea"/>
+                <a:cs typeface="+mn-cs"/>
+              </a:defRPr>
+            </a:lvl2pPr>
+            <a:lvl3pPr marL="1200150" indent="-285750" algn="l" defTabSz="457200" rtl="0" eaLnBrk="1" latinLnBrk="0" hangingPunct="1">
+              <a:spcBef>
+                <a:spcPct val="20000"/>
+              </a:spcBef>
+              <a:spcAft>
+                <a:spcPts val="600"/>
+              </a:spcAft>
+              <a:buClr>
+                <a:schemeClr val="accent1">
+                  <a:lumMod val="75000"/>
+                </a:schemeClr>
+              </a:buClr>
+              <a:buSzPct val="145000"/>
+              <a:buFont typeface="Arial"/>
+              <a:buChar char="•"/>
+              <a:defRPr sz="1800" kern="1200" cap="none">
+                <a:solidFill>
+                  <a:schemeClr val="tx1"/>
+                </a:solidFill>
+                <a:effectLst/>
+                <a:latin typeface="+mn-lt"/>
+                <a:ea typeface="+mn-ea"/>
+                <a:cs typeface="+mn-cs"/>
+              </a:defRPr>
+            </a:lvl3pPr>
+            <a:lvl4pPr marL="1543050" indent="-171450" algn="l" defTabSz="457200" rtl="0" eaLnBrk="1" latinLnBrk="0" hangingPunct="1">
+              <a:spcBef>
+                <a:spcPct val="20000"/>
+              </a:spcBef>
+              <a:spcAft>
+                <a:spcPts val="600"/>
+              </a:spcAft>
+              <a:buClr>
+                <a:schemeClr val="accent1">
+                  <a:lumMod val="75000"/>
+                </a:schemeClr>
+              </a:buClr>
+              <a:buSzPct val="145000"/>
+              <a:buFont typeface="Arial"/>
+              <a:buChar char="•"/>
+              <a:defRPr sz="1600" kern="1200" cap="none">
+                <a:solidFill>
+                  <a:schemeClr val="tx1"/>
+                </a:solidFill>
+                <a:effectLst/>
+                <a:latin typeface="+mn-lt"/>
+                <a:ea typeface="+mn-ea"/>
+                <a:cs typeface="+mn-cs"/>
+              </a:defRPr>
+            </a:lvl4pPr>
+            <a:lvl5pPr marL="2000250" indent="-171450" algn="l" defTabSz="457200" rtl="0" eaLnBrk="1" latinLnBrk="0" hangingPunct="1">
+              <a:spcBef>
+                <a:spcPct val="20000"/>
+              </a:spcBef>
+              <a:spcAft>
+                <a:spcPts val="600"/>
+              </a:spcAft>
+              <a:buClr>
+                <a:schemeClr val="accent1">
+                  <a:lumMod val="75000"/>
+                </a:schemeClr>
+              </a:buClr>
+              <a:buSzPct val="145000"/>
+              <a:buFont typeface="Arial"/>
+              <a:buChar char="•"/>
+              <a:defRPr sz="1400" kern="1200" cap="none">
+                <a:solidFill>
+                  <a:schemeClr val="tx1"/>
+                </a:solidFill>
+                <a:effectLst/>
+                <a:latin typeface="+mn-lt"/>
+                <a:ea typeface="+mn-ea"/>
+                <a:cs typeface="+mn-cs"/>
+              </a:defRPr>
+            </a:lvl5pPr>
+            <a:lvl6pPr marL="2514600" indent="-228600" algn="l" defTabSz="457200" rtl="0" eaLnBrk="1" latinLnBrk="0" hangingPunct="1">
+              <a:spcBef>
+                <a:spcPct val="20000"/>
+              </a:spcBef>
+              <a:spcAft>
+                <a:spcPts val="600"/>
+              </a:spcAft>
+              <a:buClr>
+                <a:schemeClr val="accent1">
+                  <a:lumMod val="75000"/>
+                </a:schemeClr>
+              </a:buClr>
+              <a:buSzPct val="145000"/>
+              <a:buFont typeface="Arial"/>
+              <a:buChar char="•"/>
+              <a:defRPr sz="1400" kern="1200" cap="none">
+                <a:solidFill>
+                  <a:schemeClr val="tx1"/>
+                </a:solidFill>
+                <a:effectLst/>
+                <a:latin typeface="+mn-lt"/>
+                <a:ea typeface="+mn-ea"/>
+                <a:cs typeface="+mn-cs"/>
+              </a:defRPr>
+            </a:lvl6pPr>
+            <a:lvl7pPr marL="2971800" indent="-228600" algn="l" defTabSz="457200" rtl="0" eaLnBrk="1" latinLnBrk="0" hangingPunct="1">
+              <a:spcBef>
+                <a:spcPct val="20000"/>
+              </a:spcBef>
+              <a:spcAft>
+                <a:spcPts val="600"/>
+              </a:spcAft>
+              <a:buClr>
+                <a:schemeClr val="accent1">
+                  <a:lumMod val="75000"/>
+                </a:schemeClr>
+              </a:buClr>
+              <a:buSzPct val="145000"/>
+              <a:buFont typeface="Arial"/>
+              <a:buChar char="•"/>
+              <a:defRPr sz="1400" kern="1200" cap="none">
+                <a:solidFill>
+                  <a:schemeClr val="tx1"/>
+                </a:solidFill>
+                <a:effectLst/>
+                <a:latin typeface="+mn-lt"/>
+                <a:ea typeface="+mn-ea"/>
+                <a:cs typeface="+mn-cs"/>
+              </a:defRPr>
+            </a:lvl7pPr>
+            <a:lvl8pPr marL="3429000" indent="-228600" algn="l" defTabSz="457200" rtl="0" eaLnBrk="1" latinLnBrk="0" hangingPunct="1">
+              <a:spcBef>
+                <a:spcPct val="20000"/>
+              </a:spcBef>
+              <a:spcAft>
+                <a:spcPts val="600"/>
+              </a:spcAft>
+              <a:buClr>
+                <a:schemeClr val="accent1">
+                  <a:lumMod val="75000"/>
+                </a:schemeClr>
+              </a:buClr>
+              <a:buSzPct val="145000"/>
+              <a:buFont typeface="Arial"/>
+              <a:buChar char="•"/>
+              <a:defRPr sz="1400" kern="1200" cap="none">
+                <a:solidFill>
+                  <a:schemeClr val="tx1"/>
+                </a:solidFill>
+                <a:effectLst/>
+                <a:latin typeface="+mn-lt"/>
+                <a:ea typeface="+mn-ea"/>
+                <a:cs typeface="+mn-cs"/>
+              </a:defRPr>
+            </a:lvl8pPr>
+            <a:lvl9pPr marL="3886200" indent="-228600" algn="l" defTabSz="457200" rtl="0" eaLnBrk="1" latinLnBrk="0" hangingPunct="1">
+              <a:spcBef>
+                <a:spcPct val="20000"/>
+              </a:spcBef>
+              <a:spcAft>
+                <a:spcPts val="600"/>
+              </a:spcAft>
+              <a:buClr>
+                <a:schemeClr val="accent1">
+                  <a:lumMod val="75000"/>
+                </a:schemeClr>
+              </a:buClr>
+              <a:buSzPct val="145000"/>
+              <a:buFont typeface="Arial"/>
+              <a:buChar char="•"/>
+              <a:defRPr sz="1400" kern="1200" cap="none">
+                <a:solidFill>
+                  <a:schemeClr val="tx1"/>
+                </a:solidFill>
+                <a:effectLst/>
+                <a:latin typeface="+mn-lt"/>
+                <a:ea typeface="+mn-ea"/>
+                <a:cs typeface="+mn-cs"/>
+              </a:defRPr>
+            </a:lvl9pPr>
+          </a:lstStyle>
+          <a:p>
+            <a:r>
+              <a:rPr lang="fr-FR" dirty="0"/>
+              <a:t>Une cohésion d'équipe renforcée</a:t>
+            </a:r>
+          </a:p>
+        </p:txBody>
+      </p:sp>
+      <p:sp>
+        <p:nvSpPr>
+          <p:cNvPr id="8" name="Espace réservé du contenu 2">
+            <a:extLst>
+              <a:ext uri="{FF2B5EF4-FFF2-40B4-BE49-F238E27FC236}">
+                <a16:creationId xmlns:a16="http://schemas.microsoft.com/office/drawing/2014/main" id="{5F968574-E080-40D6-AD56-976FC7ED50D5}"/>
+              </a:ext>
+            </a:extLst>
+          </p:cNvPr>
+          <p:cNvSpPr txBox="1">
+            <a:spLocks/>
+          </p:cNvSpPr>
+          <p:nvPr/>
+        </p:nvSpPr>
+        <p:spPr>
+          <a:xfrm>
+            <a:off x="1484310" y="4688839"/>
+            <a:ext cx="10018713" cy="513081"/>
+          </a:xfrm>
+          <a:prstGeom prst="rect">
+            <a:avLst/>
+          </a:prstGeom>
+        </p:spPr>
+        <p:txBody>
+          <a:bodyPr vert="horz" lIns="91440" tIns="45720" rIns="91440" bIns="45720" rtlCol="0" anchor="ctr">
+            <a:normAutofit/>
+          </a:bodyPr>
+          <a:lstStyle>
+            <a:lvl1pPr marL="285750" indent="-285750" algn="l" defTabSz="457200" rtl="0" eaLnBrk="1" latinLnBrk="0" hangingPunct="1">
+              <a:spcBef>
+                <a:spcPct val="20000"/>
+              </a:spcBef>
+              <a:spcAft>
+                <a:spcPts val="600"/>
+              </a:spcAft>
+              <a:buClr>
+                <a:schemeClr val="accent1">
+                  <a:lumMod val="75000"/>
+                </a:schemeClr>
+              </a:buClr>
+              <a:buSzPct val="145000"/>
+              <a:buFont typeface="Arial"/>
+              <a:buChar char="•"/>
+              <a:defRPr sz="2400" kern="1200" cap="none">
+                <a:solidFill>
+                  <a:schemeClr val="tx1"/>
+                </a:solidFill>
+                <a:effectLst/>
+                <a:latin typeface="+mn-lt"/>
+                <a:ea typeface="+mn-ea"/>
+                <a:cs typeface="+mn-cs"/>
+              </a:defRPr>
+            </a:lvl1pPr>
+            <a:lvl2pPr marL="742950" indent="-285750" algn="l" defTabSz="457200" rtl="0" eaLnBrk="1" latinLnBrk="0" hangingPunct="1">
+              <a:spcBef>
+                <a:spcPct val="20000"/>
+              </a:spcBef>
+              <a:spcAft>
+                <a:spcPts val="600"/>
+              </a:spcAft>
+              <a:buClr>
+                <a:schemeClr val="accent1">
+                  <a:lumMod val="75000"/>
+                </a:schemeClr>
+              </a:buClr>
+              <a:buSzPct val="145000"/>
+              <a:buFont typeface="Arial"/>
+              <a:buChar char="•"/>
+              <a:defRPr sz="2000" kern="1200" cap="none">
+                <a:solidFill>
+                  <a:schemeClr val="tx1"/>
+                </a:solidFill>
+                <a:effectLst/>
+                <a:latin typeface="+mn-lt"/>
+                <a:ea typeface="+mn-ea"/>
+                <a:cs typeface="+mn-cs"/>
+              </a:defRPr>
+            </a:lvl2pPr>
+            <a:lvl3pPr marL="1200150" indent="-285750" algn="l" defTabSz="457200" rtl="0" eaLnBrk="1" latinLnBrk="0" hangingPunct="1">
+              <a:spcBef>
+                <a:spcPct val="20000"/>
+              </a:spcBef>
+              <a:spcAft>
+                <a:spcPts val="600"/>
+              </a:spcAft>
+              <a:buClr>
+                <a:schemeClr val="accent1">
+                  <a:lumMod val="75000"/>
+                </a:schemeClr>
+              </a:buClr>
+              <a:buSzPct val="145000"/>
+              <a:buFont typeface="Arial"/>
+              <a:buChar char="•"/>
+              <a:defRPr sz="1800" kern="1200" cap="none">
+                <a:solidFill>
+                  <a:schemeClr val="tx1"/>
+                </a:solidFill>
+                <a:effectLst/>
+                <a:latin typeface="+mn-lt"/>
+                <a:ea typeface="+mn-ea"/>
+                <a:cs typeface="+mn-cs"/>
+              </a:defRPr>
+            </a:lvl3pPr>
+            <a:lvl4pPr marL="1543050" indent="-171450" algn="l" defTabSz="457200" rtl="0" eaLnBrk="1" latinLnBrk="0" hangingPunct="1">
+              <a:spcBef>
+                <a:spcPct val="20000"/>
+              </a:spcBef>
+              <a:spcAft>
+                <a:spcPts val="600"/>
+              </a:spcAft>
+              <a:buClr>
+                <a:schemeClr val="accent1">
+                  <a:lumMod val="75000"/>
+                </a:schemeClr>
+              </a:buClr>
+              <a:buSzPct val="145000"/>
+              <a:buFont typeface="Arial"/>
+              <a:buChar char="•"/>
+              <a:defRPr sz="1600" kern="1200" cap="none">
+                <a:solidFill>
+                  <a:schemeClr val="tx1"/>
+                </a:solidFill>
+                <a:effectLst/>
+                <a:latin typeface="+mn-lt"/>
+                <a:ea typeface="+mn-ea"/>
+                <a:cs typeface="+mn-cs"/>
+              </a:defRPr>
+            </a:lvl4pPr>
+            <a:lvl5pPr marL="2000250" indent="-171450" algn="l" defTabSz="457200" rtl="0" eaLnBrk="1" latinLnBrk="0" hangingPunct="1">
+              <a:spcBef>
+                <a:spcPct val="20000"/>
+              </a:spcBef>
+              <a:spcAft>
+                <a:spcPts val="600"/>
+              </a:spcAft>
+              <a:buClr>
+                <a:schemeClr val="accent1">
+                  <a:lumMod val="75000"/>
+                </a:schemeClr>
+              </a:buClr>
+              <a:buSzPct val="145000"/>
+              <a:buFont typeface="Arial"/>
+              <a:buChar char="•"/>
+              <a:defRPr sz="1400" kern="1200" cap="none">
+                <a:solidFill>
+                  <a:schemeClr val="tx1"/>
+                </a:solidFill>
+                <a:effectLst/>
+                <a:latin typeface="+mn-lt"/>
+                <a:ea typeface="+mn-ea"/>
+                <a:cs typeface="+mn-cs"/>
+              </a:defRPr>
+            </a:lvl5pPr>
+            <a:lvl6pPr marL="2514600" indent="-228600" algn="l" defTabSz="457200" rtl="0" eaLnBrk="1" latinLnBrk="0" hangingPunct="1">
+              <a:spcBef>
+                <a:spcPct val="20000"/>
+              </a:spcBef>
+              <a:spcAft>
+                <a:spcPts val="600"/>
+              </a:spcAft>
+              <a:buClr>
+                <a:schemeClr val="accent1">
+                  <a:lumMod val="75000"/>
+                </a:schemeClr>
+              </a:buClr>
+              <a:buSzPct val="145000"/>
+              <a:buFont typeface="Arial"/>
+              <a:buChar char="•"/>
+              <a:defRPr sz="1400" kern="1200" cap="none">
+                <a:solidFill>
+                  <a:schemeClr val="tx1"/>
+                </a:solidFill>
+                <a:effectLst/>
+                <a:latin typeface="+mn-lt"/>
+                <a:ea typeface="+mn-ea"/>
+                <a:cs typeface="+mn-cs"/>
+              </a:defRPr>
+            </a:lvl6pPr>
+            <a:lvl7pPr marL="2971800" indent="-228600" algn="l" defTabSz="457200" rtl="0" eaLnBrk="1" latinLnBrk="0" hangingPunct="1">
+              <a:spcBef>
+                <a:spcPct val="20000"/>
+              </a:spcBef>
+              <a:spcAft>
+                <a:spcPts val="600"/>
+              </a:spcAft>
+              <a:buClr>
+                <a:schemeClr val="accent1">
+                  <a:lumMod val="75000"/>
+                </a:schemeClr>
+              </a:buClr>
+              <a:buSzPct val="145000"/>
+              <a:buFont typeface="Arial"/>
+              <a:buChar char="•"/>
+              <a:defRPr sz="1400" kern="1200" cap="none">
+                <a:solidFill>
+                  <a:schemeClr val="tx1"/>
+                </a:solidFill>
+                <a:effectLst/>
+                <a:latin typeface="+mn-lt"/>
+                <a:ea typeface="+mn-ea"/>
+                <a:cs typeface="+mn-cs"/>
+              </a:defRPr>
+            </a:lvl7pPr>
+            <a:lvl8pPr marL="3429000" indent="-228600" algn="l" defTabSz="457200" rtl="0" eaLnBrk="1" latinLnBrk="0" hangingPunct="1">
+              <a:spcBef>
+                <a:spcPct val="20000"/>
+              </a:spcBef>
+              <a:spcAft>
+                <a:spcPts val="600"/>
+              </a:spcAft>
+              <a:buClr>
+                <a:schemeClr val="accent1">
+                  <a:lumMod val="75000"/>
+                </a:schemeClr>
+              </a:buClr>
+              <a:buSzPct val="145000"/>
+              <a:buFont typeface="Arial"/>
+              <a:buChar char="•"/>
+              <a:defRPr sz="1400" kern="1200" cap="none">
+                <a:solidFill>
+                  <a:schemeClr val="tx1"/>
+                </a:solidFill>
+                <a:effectLst/>
+                <a:latin typeface="+mn-lt"/>
+                <a:ea typeface="+mn-ea"/>
+                <a:cs typeface="+mn-cs"/>
+              </a:defRPr>
+            </a:lvl8pPr>
+            <a:lvl9pPr marL="3886200" indent="-228600" algn="l" defTabSz="457200" rtl="0" eaLnBrk="1" latinLnBrk="0" hangingPunct="1">
+              <a:spcBef>
+                <a:spcPct val="20000"/>
+              </a:spcBef>
+              <a:spcAft>
+                <a:spcPts val="600"/>
+              </a:spcAft>
+              <a:buClr>
+                <a:schemeClr val="accent1">
+                  <a:lumMod val="75000"/>
+                </a:schemeClr>
+              </a:buClr>
+              <a:buSzPct val="145000"/>
+              <a:buFont typeface="Arial"/>
+              <a:buChar char="•"/>
+              <a:defRPr sz="1400" kern="1200" cap="none">
+                <a:solidFill>
+                  <a:schemeClr val="tx1"/>
+                </a:solidFill>
+                <a:effectLst/>
+                <a:latin typeface="+mn-lt"/>
+                <a:ea typeface="+mn-ea"/>
+                <a:cs typeface="+mn-cs"/>
+              </a:defRPr>
+            </a:lvl9pPr>
+          </a:lstStyle>
+          <a:p>
+            <a:r>
+              <a:rPr lang="fr-FR" dirty="0"/>
+              <a:t>Une gestion des délais différente</a:t>
+            </a:r>
+          </a:p>
+        </p:txBody>
+      </p:sp>
+    </p:spTree>
+    <p:extLst>
+      <p:ext uri="{BB962C8B-B14F-4D97-AF65-F5344CB8AC3E}">
+        <p14:creationId xmlns:p14="http://schemas.microsoft.com/office/powerpoint/2010/main" val="2776957562"/>
+      </p:ext>
+    </p:extLst>
+  </p:cSld>
+  <p:clrMapOvr>
+    <a:masterClrMapping/>
+  </p:clrMapOvr>
+  <p:timing>
+    <p:tnLst>
+      <p:par>
+        <p:cTn id="1" dur="indefinite" restart="never" nodeType="tmRoot">
+          <p:childTnLst>
+            <p:seq concurrent="1" nextAc="seek">
+              <p:cTn id="2" dur="indefinite" nodeType="mainSeq">
+                <p:childTnLst>
+                  <p:par>
+                    <p:cTn id="3" fill="hold">
+                      <p:stCondLst>
+                        <p:cond delay="indefinite"/>
+                      </p:stCondLst>
+                      <p:childTnLst>
+                        <p:par>
+                          <p:cTn id="4" fill="hold">
+                            <p:stCondLst>
+                              <p:cond delay="0"/>
+                            </p:stCondLst>
+                            <p:childTnLst>
+                              <p:par>
+                                <p:cTn id="5" presetID="10" presetClass="entr" presetSubtype="0" fill="hold" grpId="0" nodeType="clickEffect">
+                                  <p:stCondLst>
+                                    <p:cond delay="0"/>
+                                  </p:stCondLst>
+                                  <p:childTnLst>
+                                    <p:set>
+                                      <p:cBhvr>
+                                        <p:cTn id="6" dur="1" fill="hold">
+                                          <p:stCondLst>
+                                            <p:cond delay="0"/>
+                                          </p:stCondLst>
+                                        </p:cTn>
+                                        <p:tgtEl>
+                                          <p:spTgt spid="3">
+                                            <p:txEl>
+                                              <p:pRg st="0" end="0"/>
+                                            </p:txEl>
+                                          </p:spTgt>
+                                        </p:tgtEl>
+                                        <p:attrNameLst>
+                                          <p:attrName>style.visibility</p:attrName>
+                                        </p:attrNameLst>
+                                      </p:cBhvr>
+                                      <p:to>
+                                        <p:strVal val="visible"/>
+                                      </p:to>
+                                    </p:set>
+                                    <p:animEffect transition="in" filter="fade">
+                                      <p:cBhvr>
+                                        <p:cTn id="7" dur="500"/>
+                                        <p:tgtEl>
+                                          <p:spTgt spid="3">
+                                            <p:txEl>
+                                              <p:pRg st="0" end="0"/>
+                                            </p:txEl>
+                                          </p:spTgt>
+                                        </p:tgtEl>
+                                      </p:cBhvr>
+                                    </p:animEffect>
+                                  </p:childTnLst>
+                                </p:cTn>
+                              </p:par>
+                            </p:childTnLst>
+                          </p:cTn>
+                        </p:par>
+                      </p:childTnLst>
+                    </p:cTn>
+                  </p:par>
+                  <p:par>
+                    <p:cTn id="8" fill="hold">
+                      <p:stCondLst>
+                        <p:cond delay="indefinite"/>
+                      </p:stCondLst>
+                      <p:childTnLst>
+                        <p:par>
+                          <p:cTn id="9" fill="hold">
+                            <p:stCondLst>
+                              <p:cond delay="0"/>
+                            </p:stCondLst>
+                            <p:childTnLst>
+                              <p:par>
+                                <p:cTn id="10" presetID="10" presetClass="entr" presetSubtype="0" fill="hold" grpId="0" nodeType="clickEffect">
+                                  <p:stCondLst>
+                                    <p:cond delay="0"/>
+                                  </p:stCondLst>
+                                  <p:childTnLst>
+                                    <p:set>
+                                      <p:cBhvr>
+                                        <p:cTn id="11" dur="1" fill="hold">
+                                          <p:stCondLst>
+                                            <p:cond delay="0"/>
+                                          </p:stCondLst>
+                                        </p:cTn>
+                                        <p:tgtEl>
+                                          <p:spTgt spid="4"/>
+                                        </p:tgtEl>
+                                        <p:attrNameLst>
+                                          <p:attrName>style.visibility</p:attrName>
+                                        </p:attrNameLst>
+                                      </p:cBhvr>
+                                      <p:to>
+                                        <p:strVal val="visible"/>
+                                      </p:to>
+                                    </p:set>
+                                    <p:animEffect transition="in" filter="fade">
+                                      <p:cBhvr>
+                                        <p:cTn id="12" dur="500"/>
+                                        <p:tgtEl>
+                                          <p:spTgt spid="4"/>
+                                        </p:tgtEl>
+                                      </p:cBhvr>
+                                    </p:animEffect>
+                                  </p:childTnLst>
+                                </p:cTn>
+                              </p:par>
+                            </p:childTnLst>
+                          </p:cTn>
+                        </p:par>
+                      </p:childTnLst>
+                    </p:cTn>
+                  </p:par>
+                  <p:par>
+                    <p:cTn id="13" fill="hold">
+                      <p:stCondLst>
+                        <p:cond delay="indefinite"/>
+                      </p:stCondLst>
+                      <p:childTnLst>
+                        <p:par>
+                          <p:cTn id="14" fill="hold">
+                            <p:stCondLst>
+                              <p:cond delay="0"/>
+                            </p:stCondLst>
+                            <p:childTnLst>
+                              <p:par>
+                                <p:cTn id="15" presetID="10" presetClass="entr" presetSubtype="0" fill="hold" grpId="0" nodeType="clickEffect">
+                                  <p:stCondLst>
+                                    <p:cond delay="0"/>
+                                  </p:stCondLst>
+                                  <p:childTnLst>
+                                    <p:set>
+                                      <p:cBhvr>
+                                        <p:cTn id="16" dur="1" fill="hold">
+                                          <p:stCondLst>
+                                            <p:cond delay="0"/>
+                                          </p:stCondLst>
+                                        </p:cTn>
+                                        <p:tgtEl>
+                                          <p:spTgt spid="6"/>
+                                        </p:tgtEl>
+                                        <p:attrNameLst>
+                                          <p:attrName>style.visibility</p:attrName>
+                                        </p:attrNameLst>
+                                      </p:cBhvr>
+                                      <p:to>
+                                        <p:strVal val="visible"/>
+                                      </p:to>
+                                    </p:set>
+                                    <p:animEffect transition="in" filter="fade">
+                                      <p:cBhvr>
+                                        <p:cTn id="17" dur="500"/>
+                                        <p:tgtEl>
+                                          <p:spTgt spid="6"/>
+                                        </p:tgtEl>
+                                      </p:cBhvr>
+                                    </p:animEffect>
+                                  </p:childTnLst>
+                                </p:cTn>
+                              </p:par>
+                            </p:childTnLst>
+                          </p:cTn>
+                        </p:par>
+                      </p:childTnLst>
+                    </p:cTn>
+                  </p:par>
+                  <p:par>
+                    <p:cTn id="18" fill="hold">
+                      <p:stCondLst>
+                        <p:cond delay="indefinite"/>
+                      </p:stCondLst>
+                      <p:childTnLst>
+                        <p:par>
+                          <p:cTn id="19" fill="hold">
+                            <p:stCondLst>
+                              <p:cond delay="0"/>
+                            </p:stCondLst>
+                            <p:childTnLst>
+                              <p:par>
+                                <p:cTn id="20" presetID="10" presetClass="entr" presetSubtype="0" fill="hold" grpId="0" nodeType="clickEffect">
+                                  <p:stCondLst>
+                                    <p:cond delay="0"/>
+                                  </p:stCondLst>
+                                  <p:childTnLst>
+                                    <p:set>
+                                      <p:cBhvr>
+                                        <p:cTn id="21" dur="1" fill="hold">
+                                          <p:stCondLst>
+                                            <p:cond delay="0"/>
+                                          </p:stCondLst>
+                                        </p:cTn>
+                                        <p:tgtEl>
+                                          <p:spTgt spid="7"/>
+                                        </p:tgtEl>
+                                        <p:attrNameLst>
+                                          <p:attrName>style.visibility</p:attrName>
+                                        </p:attrNameLst>
+                                      </p:cBhvr>
+                                      <p:to>
+                                        <p:strVal val="visible"/>
+                                      </p:to>
+                                    </p:set>
+                                    <p:animEffect transition="in" filter="fade">
+                                      <p:cBhvr>
+                                        <p:cTn id="22" dur="500"/>
+                                        <p:tgtEl>
+                                          <p:spTgt spid="7"/>
+                                        </p:tgtEl>
+                                      </p:cBhvr>
+                                    </p:animEffect>
+                                  </p:childTnLst>
+                                </p:cTn>
+                              </p:par>
+                            </p:childTnLst>
+                          </p:cTn>
+                        </p:par>
+                      </p:childTnLst>
+                    </p:cTn>
+                  </p:par>
+                  <p:par>
+                    <p:cTn id="23" fill="hold">
+                      <p:stCondLst>
+                        <p:cond delay="indefinite"/>
+                      </p:stCondLst>
+                      <p:childTnLst>
+                        <p:par>
+                          <p:cTn id="24" fill="hold">
+                            <p:stCondLst>
+                              <p:cond delay="0"/>
+                            </p:stCondLst>
+                            <p:childTnLst>
+                              <p:par>
+                                <p:cTn id="25" presetID="10" presetClass="entr" presetSubtype="0" fill="hold" grpId="0" nodeType="clickEffect">
+                                  <p:stCondLst>
+                                    <p:cond delay="0"/>
+                                  </p:stCondLst>
+                                  <p:childTnLst>
+                                    <p:set>
+                                      <p:cBhvr>
+                                        <p:cTn id="26" dur="1" fill="hold">
+                                          <p:stCondLst>
+                                            <p:cond delay="0"/>
+                                          </p:stCondLst>
+                                        </p:cTn>
+                                        <p:tgtEl>
+                                          <p:spTgt spid="8"/>
+                                        </p:tgtEl>
+                                        <p:attrNameLst>
+                                          <p:attrName>style.visibility</p:attrName>
+                                        </p:attrNameLst>
+                                      </p:cBhvr>
+                                      <p:to>
+                                        <p:strVal val="visible"/>
+                                      </p:to>
+                                    </p:set>
+                                    <p:animEffect transition="in" filter="fade">
+                                      <p:cBhvr>
+                                        <p:cTn id="27" dur="500"/>
+                                        <p:tgtEl>
+                                          <p:spTgt spid="8"/>
+                                        </p:tgtEl>
+                                      </p:cBhvr>
+                                    </p:animEffect>
+                                  </p:childTnLst>
+                                </p:cTn>
+                              </p:par>
+                            </p:childTnLst>
+                          </p:cTn>
+                        </p:par>
+                      </p:childTnLst>
+                    </p:cTn>
+                  </p:par>
+                </p:childTnLst>
+              </p:cTn>
+              <p:prevCondLst>
+                <p:cond evt="onPrev" delay="0">
+                  <p:tgtEl>
+                    <p:sldTgt/>
+                  </p:tgtEl>
+                </p:cond>
+              </p:prevCondLst>
+              <p:nextCondLst>
+                <p:cond evt="onNext" delay="0">
+                  <p:tgtEl>
+                    <p:sldTgt/>
+                  </p:tgtEl>
+                </p:cond>
+              </p:nextCondLst>
+            </p:seq>
+          </p:childTnLst>
+        </p:cTn>
+      </p:par>
+    </p:tnLst>
+    <p:bldLst>
+      <p:bldP spid="3" grpId="0" build="p"/>
+      <p:bldP spid="4" grpId="0"/>
+      <p:bldP spid="6" grpId="0"/>
+      <p:bldP spid="7" grpId="0"/>
+      <p:bldP spid="8" grpId="0"/>
+    </p:bldLst>
+  </p:timing>
 </p:sld>
 </file>
 

</xml_diff>